<commit_message>
stochastic matlab in presentation
</commit_message>
<xml_diff>
--- a/Presentation.pptx
+++ b/Presentation.pptx
@@ -5,11 +5,22 @@
     <p:sldMasterId id="2147483660" r:id="rId1"/>
   </p:sldMasterIdLst>
   <p:notesMasterIdLst>
-    <p:notesMasterId r:id="rId4"/>
+    <p:notesMasterId r:id="rId15"/>
   </p:notesMasterIdLst>
   <p:sldIdLst>
     <p:sldId id="256" r:id="rId2"/>
-    <p:sldId id="257" r:id="rId3"/>
+    <p:sldId id="261" r:id="rId3"/>
+    <p:sldId id="263" r:id="rId4"/>
+    <p:sldId id="259" r:id="rId5"/>
+    <p:sldId id="260" r:id="rId6"/>
+    <p:sldId id="257" r:id="rId7"/>
+    <p:sldId id="258" r:id="rId8"/>
+    <p:sldId id="265" r:id="rId9"/>
+    <p:sldId id="266" r:id="rId10"/>
+    <p:sldId id="267" r:id="rId11"/>
+    <p:sldId id="268" r:id="rId12"/>
+    <p:sldId id="269" r:id="rId13"/>
+    <p:sldId id="270" r:id="rId14"/>
   </p:sldIdLst>
   <p:sldSz cx="9144000" cy="6858000" type="screen4x3"/>
   <p:notesSz cx="6858000" cy="9144000"/>
@@ -193,7 +204,7 @@
           <a:p>
             <a:fld id="{B2014153-674E-42F2-B926-FA649665C89E}" type="datetimeFigureOut">
               <a:rPr lang="en-GB" smtClean="0"/>
-              <a:t>16/01/2013</a:t>
+              <a:t>17/01/2013</a:t>
             </a:fld>
             <a:endParaRPr lang="en-GB"/>
           </a:p>
@@ -1086,7 +1097,7 @@
           <a:p>
             <a:fld id="{CCAC0F4C-7C50-4D03-9158-986245769662}" type="datetime1">
               <a:rPr lang="en-GB" smtClean="0"/>
-              <a:t>16/01/2013</a:t>
+              <a:t>17/01/2013</a:t>
             </a:fld>
             <a:endParaRPr lang="en-GB"/>
           </a:p>
@@ -1282,7 +1293,7 @@
           <a:p>
             <a:fld id="{AF7499EF-0FF6-4B85-B04C-CAD010C097E3}" type="datetime1">
               <a:rPr lang="en-GB" smtClean="0"/>
-              <a:t>16/01/2013</a:t>
+              <a:t>17/01/2013</a:t>
             </a:fld>
             <a:endParaRPr lang="en-GB"/>
           </a:p>
@@ -1467,7 +1478,7 @@
           <a:p>
             <a:fld id="{E378A640-8591-4EBC-9E03-0887BA622806}" type="datetime1">
               <a:rPr lang="en-GB" smtClean="0"/>
-              <a:t>16/01/2013</a:t>
+              <a:t>17/01/2013</a:t>
             </a:fld>
             <a:endParaRPr lang="en-GB"/>
           </a:p>
@@ -1617,7 +1628,7 @@
           <a:p>
             <a:fld id="{6AABCCC4-AA31-4FAD-9A2F-FC5969CF6647}" type="datetime1">
               <a:rPr lang="en-GB" smtClean="0"/>
-              <a:t>16/01/2013</a:t>
+              <a:t>17/01/2013</a:t>
             </a:fld>
             <a:endParaRPr lang="en-GB" dirty="0"/>
           </a:p>
@@ -1891,7 +1902,7 @@
           <a:p>
             <a:fld id="{C6F94103-F12E-4F79-86A8-B2DA3F3AE14B}" type="datetime1">
               <a:rPr lang="en-GB" smtClean="0"/>
-              <a:t>16/01/2013</a:t>
+              <a:t>17/01/2013</a:t>
             </a:fld>
             <a:endParaRPr lang="en-GB"/>
           </a:p>
@@ -2300,7 +2311,7 @@
           <a:p>
             <a:fld id="{4CB16F40-84FB-427F-884A-CB32C26D5BCB}" type="datetime1">
               <a:rPr lang="en-GB" smtClean="0"/>
-              <a:t>16/01/2013</a:t>
+              <a:t>17/01/2013</a:t>
             </a:fld>
             <a:endParaRPr lang="en-GB"/>
           </a:p>
@@ -2746,7 +2757,7 @@
           <a:p>
             <a:fld id="{78872670-692A-4F41-83D8-513327A731FF}" type="datetime1">
               <a:rPr lang="en-GB" smtClean="0"/>
-              <a:t>16/01/2013</a:t>
+              <a:t>17/01/2013</a:t>
             </a:fld>
             <a:endParaRPr lang="en-GB"/>
           </a:p>
@@ -2847,7 +2858,7 @@
           <a:p>
             <a:fld id="{DCEBD64C-72C5-4F73-A0E3-69EAE10396D1}" type="datetime1">
               <a:rPr lang="en-GB" smtClean="0"/>
-              <a:t>16/01/2013</a:t>
+              <a:t>17/01/2013</a:t>
             </a:fld>
             <a:endParaRPr lang="en-GB"/>
           </a:p>
@@ -2968,7 +2979,7 @@
           <a:p>
             <a:fld id="{F70B75FB-66F6-49D1-8465-53801BDB8A25}" type="datetime1">
               <a:rPr lang="en-GB" smtClean="0"/>
-              <a:t>16/01/2013</a:t>
+              <a:t>17/01/2013</a:t>
             </a:fld>
             <a:endParaRPr lang="en-GB"/>
           </a:p>
@@ -3242,7 +3253,7 @@
           <a:p>
             <a:fld id="{CC74C73F-25A1-4849-BD30-0546CCB66BDD}" type="datetime1">
               <a:rPr lang="en-GB" smtClean="0"/>
-              <a:t>16/01/2013</a:t>
+              <a:t>17/01/2013</a:t>
             </a:fld>
             <a:endParaRPr lang="en-GB"/>
           </a:p>
@@ -3447,7 +3458,7 @@
           <a:p>
             <a:fld id="{2F27B4C5-62D5-4A1B-A4B5-C8C14E1AE00B}" type="datetime1">
               <a:rPr lang="en-GB" smtClean="0"/>
-              <a:t>16/01/2013</a:t>
+              <a:t>17/01/2013</a:t>
             </a:fld>
             <a:endParaRPr lang="en-GB"/>
           </a:p>
@@ -4556,7 +4567,7 @@
           <a:p>
             <a:fld id="{4391FB4E-AC24-4A5A-94A9-F5D180CA7182}" type="datetime1">
               <a:rPr lang="en-GB" smtClean="0"/>
-              <a:t>16/01/2013</a:t>
+              <a:t>17/01/2013</a:t>
             </a:fld>
             <a:endParaRPr lang="en-GB"/>
           </a:p>
@@ -5861,13 +5872,13 @@
   <p:clrMapOvr>
     <a:masterClrMapping/>
   </p:clrMapOvr>
-  <mc:AlternateContent xmlns:mc="http://schemas.openxmlformats.org/markup-compatibility/2006">
-    <mc:Choice xmlns:p14="http://schemas.microsoft.com/office/powerpoint/2010/main" Requires="p14">
+  <mc:AlternateContent xmlns:mc="http://schemas.openxmlformats.org/markup-compatibility/2006" xmlns:p14="http://schemas.microsoft.com/office/powerpoint/2010/main">
+    <mc:Choice Requires="p14">
       <p:transition spd="slow" p14:dur="1200">
         <p:dissolve/>
       </p:transition>
     </mc:Choice>
-    <mc:Fallback>
+    <mc:Fallback xmlns="">
       <p:transition spd="slow">
         <p:dissolve/>
       </p:transition>
@@ -6737,6 +6748,590 @@
 </p:sld>
 </file>
 
+<file path=ppt/slides/slide10.xml><?xml version="1.0" encoding="utf-8"?>
+<p:sld xmlns:a="http://schemas.openxmlformats.org/drawingml/2006/main" xmlns:r="http://schemas.openxmlformats.org/officeDocument/2006/relationships" xmlns:p="http://schemas.openxmlformats.org/presentationml/2006/main">
+  <p:cSld>
+    <p:spTree>
+      <p:nvGrpSpPr>
+        <p:cNvPr id="1" name=""/>
+        <p:cNvGrpSpPr/>
+        <p:nvPr/>
+      </p:nvGrpSpPr>
+      <p:grpSpPr>
+        <a:xfrm>
+          <a:off x="0" y="0"/>
+          <a:ext cx="0" cy="0"/>
+          <a:chOff x="0" y="0"/>
+          <a:chExt cx="0" cy="0"/>
+        </a:xfrm>
+      </p:grpSpPr>
+      <p:sp>
+        <p:nvSpPr>
+          <p:cNvPr id="2" name="Content Placeholder 1"/>
+          <p:cNvSpPr>
+            <a:spLocks noGrp="1"/>
+          </p:cNvSpPr>
+          <p:nvPr>
+            <p:ph idx="1"/>
+          </p:nvPr>
+        </p:nvSpPr>
+        <p:spPr/>
+        <p:txBody>
+          <a:bodyPr/>
+          <a:lstStyle/>
+          <a:p>
+            <a:r>
+              <a:rPr lang="en-GB" dirty="0" smtClean="0"/>
+              <a:t>These two approaches were coded into two separate solvers in </a:t>
+            </a:r>
+            <a:r>
+              <a:rPr lang="en-GB" dirty="0" err="1" smtClean="0"/>
+              <a:t>Matlab</a:t>
+            </a:r>
+            <a:endParaRPr lang="en-GB" dirty="0" smtClean="0"/>
+          </a:p>
+          <a:p>
+            <a:r>
+              <a:rPr lang="en-GB" dirty="0" smtClean="0"/>
+              <a:t>Noise function encoded such that:</a:t>
+            </a:r>
+          </a:p>
+          <a:p>
+            <a:endParaRPr lang="en-GB" dirty="0"/>
+          </a:p>
+          <a:p>
+            <a:r>
+              <a:rPr lang="en-GB" dirty="0" smtClean="0"/>
+              <a:t>Allows for a wide range of noise types</a:t>
+            </a:r>
+          </a:p>
+          <a:p>
+            <a:r>
+              <a:rPr lang="en-GB" dirty="0" smtClean="0"/>
+              <a:t>Zero-checking necessary to avoid highly divergent areas of phase space</a:t>
+            </a:r>
+          </a:p>
+          <a:p>
+            <a:r>
+              <a:rPr lang="en-GB" dirty="0" smtClean="0"/>
+              <a:t>Code ran fast enough for parameter testing</a:t>
+            </a:r>
+            <a:endParaRPr lang="en-GB" dirty="0"/>
+          </a:p>
+        </p:txBody>
+      </p:sp>
+      <p:sp>
+        <p:nvSpPr>
+          <p:cNvPr id="3" name="Title 2"/>
+          <p:cNvSpPr>
+            <a:spLocks noGrp="1"/>
+          </p:cNvSpPr>
+          <p:nvPr>
+            <p:ph type="title"/>
+          </p:nvPr>
+        </p:nvSpPr>
+        <p:spPr/>
+        <p:txBody>
+          <a:bodyPr/>
+          <a:lstStyle/>
+          <a:p>
+            <a:r>
+              <a:rPr lang="en-GB" dirty="0" smtClean="0"/>
+              <a:t>Implementation in </a:t>
+            </a:r>
+            <a:r>
+              <a:rPr lang="en-GB" dirty="0" err="1" smtClean="0"/>
+              <a:t>Matlab</a:t>
+            </a:r>
+            <a:r>
+              <a:rPr lang="en-GB" dirty="0" smtClean="0"/>
+              <a:t>®</a:t>
+            </a:r>
+            <a:endParaRPr lang="en-GB" dirty="0"/>
+          </a:p>
+        </p:txBody>
+      </p:sp>
+      <p:sp>
+        <p:nvSpPr>
+          <p:cNvPr id="4" name="Slide Number Placeholder 3"/>
+          <p:cNvSpPr>
+            <a:spLocks noGrp="1"/>
+          </p:cNvSpPr>
+          <p:nvPr>
+            <p:ph type="sldNum" sz="quarter" idx="4"/>
+          </p:nvPr>
+        </p:nvSpPr>
+        <p:spPr/>
+        <p:txBody>
+          <a:bodyPr/>
+          <a:lstStyle/>
+          <a:p>
+            <a:fld id="{57E314E1-448B-4E82-884A-39F65482640B}" type="slidenum">
+              <a:rPr lang="en-GB" smtClean="0"/>
+              <a:t>10</a:t>
+            </a:fld>
+            <a:endParaRPr lang="en-GB" dirty="0"/>
+          </a:p>
+        </p:txBody>
+      </p:sp>
+      <p:pic>
+        <p:nvPicPr>
+          <p:cNvPr id="4098" name="Picture 2"/>
+          <p:cNvPicPr>
+            <a:picLocks noChangeAspect="1" noChangeArrowheads="1"/>
+          </p:cNvPicPr>
+          <p:nvPr/>
+        </p:nvPicPr>
+        <p:blipFill>
+          <a:blip r:embed="rId2">
+            <a:extLst>
+              <a:ext uri="{28A0092B-C50C-407E-A947-70E740481C1C}">
+                <a14:useLocalDpi xmlns:a14="http://schemas.microsoft.com/office/drawing/2010/main" val="0"/>
+              </a:ext>
+            </a:extLst>
+          </a:blip>
+          <a:srcRect/>
+          <a:stretch>
+            <a:fillRect/>
+          </a:stretch>
+        </p:blipFill>
+        <p:spPr bwMode="auto">
+          <a:xfrm>
+            <a:off x="1547664" y="2805085"/>
+            <a:ext cx="5349215" cy="410145"/>
+          </a:xfrm>
+          <a:prstGeom prst="rect">
+            <a:avLst/>
+          </a:prstGeom>
+          <a:noFill/>
+          <a:ln>
+            <a:noFill/>
+          </a:ln>
+          <a:effectLst/>
+          <a:extLst>
+            <a:ext uri="{909E8E84-426E-40DD-AFC4-6F175D3DCCD1}">
+              <a14:hiddenFill xmlns:a14="http://schemas.microsoft.com/office/drawing/2010/main">
+                <a:solidFill>
+                  <a:schemeClr val="accent1"/>
+                </a:solidFill>
+              </a14:hiddenFill>
+            </a:ext>
+            <a:ext uri="{91240B29-F687-4F45-9708-019B960494DF}">
+              <a14:hiddenLine xmlns:a14="http://schemas.microsoft.com/office/drawing/2010/main" w="9525">
+                <a:solidFill>
+                  <a:schemeClr val="tx1"/>
+                </a:solidFill>
+                <a:miter lim="800000"/>
+                <a:headEnd/>
+                <a:tailEnd/>
+              </a14:hiddenLine>
+            </a:ext>
+            <a:ext uri="{AF507438-7753-43E0-B8FC-AC1667EBCBE1}">
+              <a14:hiddenEffects xmlns:a14="http://schemas.microsoft.com/office/drawing/2010/main">
+                <a:effectLst>
+                  <a:outerShdw dist="35921" dir="2700000" algn="ctr" rotWithShape="0">
+                    <a:schemeClr val="bg2"/>
+                  </a:outerShdw>
+                </a:effectLst>
+              </a14:hiddenEffects>
+            </a:ext>
+          </a:extLst>
+        </p:spPr>
+      </p:pic>
+    </p:spTree>
+    <p:extLst>
+      <p:ext uri="{BB962C8B-B14F-4D97-AF65-F5344CB8AC3E}">
+        <p14:creationId xmlns:p14="http://schemas.microsoft.com/office/powerpoint/2010/main" val="3558677953"/>
+      </p:ext>
+    </p:extLst>
+  </p:cSld>
+  <p:clrMapOvr>
+    <a:masterClrMapping/>
+  </p:clrMapOvr>
+</p:sld>
+</file>
+
+<file path=ppt/slides/slide11.xml><?xml version="1.0" encoding="utf-8"?>
+<p:sld xmlns:a="http://schemas.openxmlformats.org/drawingml/2006/main" xmlns:r="http://schemas.openxmlformats.org/officeDocument/2006/relationships" xmlns:p="http://schemas.openxmlformats.org/presentationml/2006/main">
+  <p:cSld>
+    <p:spTree>
+      <p:nvGrpSpPr>
+        <p:cNvPr id="1" name=""/>
+        <p:cNvGrpSpPr/>
+        <p:nvPr/>
+      </p:nvGrpSpPr>
+      <p:grpSpPr>
+        <a:xfrm>
+          <a:off x="0" y="0"/>
+          <a:ext cx="0" cy="0"/>
+          <a:chOff x="0" y="0"/>
+          <a:chExt cx="0" cy="0"/>
+        </a:xfrm>
+      </p:grpSpPr>
+      <p:sp>
+        <p:nvSpPr>
+          <p:cNvPr id="2" name="Content Placeholder 1"/>
+          <p:cNvSpPr>
+            <a:spLocks noGrp="1"/>
+          </p:cNvSpPr>
+          <p:nvPr>
+            <p:ph idx="1"/>
+          </p:nvPr>
+        </p:nvSpPr>
+        <p:spPr/>
+        <p:txBody>
+          <a:bodyPr/>
+          <a:lstStyle/>
+          <a:p>
+            <a:r>
+              <a:rPr lang="en-GB" dirty="0" smtClean="0"/>
+              <a:t>Adding noise to affinity maturation rate had little appreciable effect on other outputs</a:t>
+            </a:r>
+          </a:p>
+          <a:p>
+            <a:pPr lvl="1"/>
+            <a:r>
+              <a:rPr lang="en-GB" dirty="0" smtClean="0"/>
+              <a:t>It only really functions as a Boolean, anyway.</a:t>
+            </a:r>
+          </a:p>
+          <a:p>
+            <a:r>
+              <a:rPr lang="en-GB" dirty="0" smtClean="0"/>
+              <a:t>Adding </a:t>
+            </a:r>
+            <a:r>
+              <a:rPr lang="en-GB" dirty="0" err="1" smtClean="0"/>
+              <a:t>stochasticity</a:t>
+            </a:r>
+            <a:r>
+              <a:rPr lang="en-GB" dirty="0" smtClean="0"/>
+              <a:t> to virus production produced some exciting results</a:t>
+            </a:r>
+          </a:p>
+          <a:p>
+            <a:r>
+              <a:rPr lang="en-GB" dirty="0" smtClean="0"/>
+              <a:t>Brings about the possibility of several waves of infection.</a:t>
+            </a:r>
+          </a:p>
+        </p:txBody>
+      </p:sp>
+      <p:sp>
+        <p:nvSpPr>
+          <p:cNvPr id="3" name="Title 2"/>
+          <p:cNvSpPr>
+            <a:spLocks noGrp="1"/>
+          </p:cNvSpPr>
+          <p:nvPr>
+            <p:ph type="title"/>
+          </p:nvPr>
+        </p:nvSpPr>
+        <p:spPr/>
+        <p:txBody>
+          <a:bodyPr/>
+          <a:lstStyle/>
+          <a:p>
+            <a:r>
+              <a:rPr lang="en-GB" dirty="0" smtClean="0"/>
+              <a:t>Stochastic </a:t>
+            </a:r>
+            <a:r>
+              <a:rPr lang="en-GB" dirty="0" err="1" smtClean="0"/>
+              <a:t>Matlab</a:t>
+            </a:r>
+            <a:r>
+              <a:rPr lang="en-GB" dirty="0" smtClean="0"/>
+              <a:t>® Results</a:t>
+            </a:r>
+            <a:endParaRPr lang="en-GB" dirty="0"/>
+          </a:p>
+        </p:txBody>
+      </p:sp>
+      <p:sp>
+        <p:nvSpPr>
+          <p:cNvPr id="4" name="Slide Number Placeholder 3"/>
+          <p:cNvSpPr>
+            <a:spLocks noGrp="1"/>
+          </p:cNvSpPr>
+          <p:nvPr>
+            <p:ph type="sldNum" sz="quarter" idx="4"/>
+          </p:nvPr>
+        </p:nvSpPr>
+        <p:spPr/>
+        <p:txBody>
+          <a:bodyPr/>
+          <a:lstStyle/>
+          <a:p>
+            <a:fld id="{57E314E1-448B-4E82-884A-39F65482640B}" type="slidenum">
+              <a:rPr lang="en-GB" smtClean="0"/>
+              <a:t>11</a:t>
+            </a:fld>
+            <a:endParaRPr lang="en-GB" dirty="0"/>
+          </a:p>
+        </p:txBody>
+      </p:sp>
+    </p:spTree>
+    <p:extLst>
+      <p:ext uri="{BB962C8B-B14F-4D97-AF65-F5344CB8AC3E}">
+        <p14:creationId xmlns:p14="http://schemas.microsoft.com/office/powerpoint/2010/main" val="2877546663"/>
+      </p:ext>
+    </p:extLst>
+  </p:cSld>
+  <p:clrMapOvr>
+    <a:masterClrMapping/>
+  </p:clrMapOvr>
+</p:sld>
+</file>
+
+<file path=ppt/slides/slide12.xml><?xml version="1.0" encoding="utf-8"?>
+<p:sld xmlns:a="http://schemas.openxmlformats.org/drawingml/2006/main" xmlns:r="http://schemas.openxmlformats.org/officeDocument/2006/relationships" xmlns:p="http://schemas.openxmlformats.org/presentationml/2006/main">
+  <p:cSld>
+    <p:spTree>
+      <p:nvGrpSpPr>
+        <p:cNvPr id="1" name=""/>
+        <p:cNvGrpSpPr/>
+        <p:nvPr/>
+      </p:nvGrpSpPr>
+      <p:grpSpPr>
+        <a:xfrm>
+          <a:off x="0" y="0"/>
+          <a:ext cx="0" cy="0"/>
+          <a:chOff x="0" y="0"/>
+          <a:chExt cx="0" cy="0"/>
+        </a:xfrm>
+      </p:grpSpPr>
+      <p:sp>
+        <p:nvSpPr>
+          <p:cNvPr id="2" name="Content Placeholder 1"/>
+          <p:cNvSpPr>
+            <a:spLocks noGrp="1"/>
+          </p:cNvSpPr>
+          <p:nvPr>
+            <p:ph idx="1"/>
+          </p:nvPr>
+        </p:nvSpPr>
+        <p:spPr>
+          <a:xfrm>
+            <a:off x="457200" y="1481328"/>
+            <a:ext cx="4834880" cy="4525963"/>
+          </a:xfrm>
+        </p:spPr>
+        <p:txBody>
+          <a:bodyPr/>
+          <a:lstStyle/>
+          <a:p>
+            <a:r>
+              <a:rPr lang="en-GB" dirty="0" smtClean="0"/>
+              <a:t>Noise in V allows infection to re-emerge when antibody count decays away</a:t>
+            </a:r>
+          </a:p>
+          <a:p>
+            <a:r>
+              <a:rPr lang="en-GB" dirty="0" smtClean="0"/>
+              <a:t>Antibody Efficacy grows each time</a:t>
+            </a:r>
+          </a:p>
+          <a:p>
+            <a:r>
+              <a:rPr lang="en-GB" dirty="0" smtClean="0"/>
+              <a:t>Population “remembers” how to fight disease, finding it easier to rebuff</a:t>
+            </a:r>
+            <a:endParaRPr lang="en-GB" dirty="0"/>
+          </a:p>
+        </p:txBody>
+      </p:sp>
+      <p:sp>
+        <p:nvSpPr>
+          <p:cNvPr id="3" name="Title 2"/>
+          <p:cNvSpPr>
+            <a:spLocks noGrp="1"/>
+          </p:cNvSpPr>
+          <p:nvPr>
+            <p:ph type="title"/>
+          </p:nvPr>
+        </p:nvSpPr>
+        <p:spPr/>
+        <p:txBody>
+          <a:bodyPr/>
+          <a:lstStyle/>
+          <a:p>
+            <a:r>
+              <a:rPr lang="en-GB" dirty="0" smtClean="0"/>
+              <a:t>Multiple Waves</a:t>
+            </a:r>
+            <a:endParaRPr lang="en-GB" dirty="0"/>
+          </a:p>
+        </p:txBody>
+      </p:sp>
+      <p:sp>
+        <p:nvSpPr>
+          <p:cNvPr id="4" name="Slide Number Placeholder 3"/>
+          <p:cNvSpPr>
+            <a:spLocks noGrp="1"/>
+          </p:cNvSpPr>
+          <p:nvPr>
+            <p:ph type="sldNum" sz="quarter" idx="4"/>
+          </p:nvPr>
+        </p:nvSpPr>
+        <p:spPr/>
+        <p:txBody>
+          <a:bodyPr/>
+          <a:lstStyle/>
+          <a:p>
+            <a:fld id="{57E314E1-448B-4E82-884A-39F65482640B}" type="slidenum">
+              <a:rPr lang="en-GB" smtClean="0"/>
+              <a:t>12</a:t>
+            </a:fld>
+            <a:endParaRPr lang="en-GB" dirty="0"/>
+          </a:p>
+        </p:txBody>
+      </p:sp>
+      <p:pic>
+        <p:nvPicPr>
+          <p:cNvPr id="5" name="Picture 2" descr="C:\Users\thomas\Downloads\Resurgance_scissored_150x150_p1.png"/>
+          <p:cNvPicPr>
+            <a:picLocks noChangeAspect="1" noChangeArrowheads="1"/>
+          </p:cNvPicPr>
+          <p:nvPr/>
+        </p:nvPicPr>
+        <p:blipFill>
+          <a:blip r:embed="rId2">
+            <a:extLst>
+              <a:ext uri="{28A0092B-C50C-407E-A947-70E740481C1C}">
+                <a14:useLocalDpi xmlns:a14="http://schemas.microsoft.com/office/drawing/2010/main" val="0"/>
+              </a:ext>
+            </a:extLst>
+          </a:blip>
+          <a:srcRect/>
+          <a:stretch>
+            <a:fillRect/>
+          </a:stretch>
+        </p:blipFill>
+        <p:spPr bwMode="auto">
+          <a:xfrm>
+            <a:off x="5292080" y="149257"/>
+            <a:ext cx="3399379" cy="6681891"/>
+          </a:xfrm>
+          <a:prstGeom prst="rect">
+            <a:avLst/>
+          </a:prstGeom>
+          <a:noFill/>
+          <a:extLst>
+            <a:ext uri="{909E8E84-426E-40DD-AFC4-6F175D3DCCD1}">
+              <a14:hiddenFill xmlns:a14="http://schemas.microsoft.com/office/drawing/2010/main">
+                <a:solidFill>
+                  <a:srgbClr val="FFFFFF"/>
+                </a:solidFill>
+              </a14:hiddenFill>
+            </a:ext>
+          </a:extLst>
+        </p:spPr>
+      </p:pic>
+    </p:spTree>
+    <p:extLst>
+      <p:ext uri="{BB962C8B-B14F-4D97-AF65-F5344CB8AC3E}">
+        <p14:creationId xmlns:p14="http://schemas.microsoft.com/office/powerpoint/2010/main" val="3178360666"/>
+      </p:ext>
+    </p:extLst>
+  </p:cSld>
+  <p:clrMapOvr>
+    <a:masterClrMapping/>
+  </p:clrMapOvr>
+</p:sld>
+</file>
+
+<file path=ppt/slides/slide13.xml><?xml version="1.0" encoding="utf-8"?>
+<p:sld xmlns:a="http://schemas.openxmlformats.org/drawingml/2006/main" xmlns:r="http://schemas.openxmlformats.org/officeDocument/2006/relationships" xmlns:p="http://schemas.openxmlformats.org/presentationml/2006/main">
+  <p:cSld>
+    <p:spTree>
+      <p:nvGrpSpPr>
+        <p:cNvPr id="1" name=""/>
+        <p:cNvGrpSpPr/>
+        <p:nvPr/>
+      </p:nvGrpSpPr>
+      <p:grpSpPr>
+        <a:xfrm>
+          <a:off x="0" y="0"/>
+          <a:ext cx="0" cy="0"/>
+          <a:chOff x="0" y="0"/>
+          <a:chExt cx="0" cy="0"/>
+        </a:xfrm>
+      </p:grpSpPr>
+      <p:sp>
+        <p:nvSpPr>
+          <p:cNvPr id="2" name="Content Placeholder 1"/>
+          <p:cNvSpPr>
+            <a:spLocks noGrp="1"/>
+          </p:cNvSpPr>
+          <p:nvPr>
+            <p:ph idx="1"/>
+          </p:nvPr>
+        </p:nvSpPr>
+        <p:spPr/>
+        <p:txBody>
+          <a:bodyPr/>
+          <a:lstStyle/>
+          <a:p>
+            <a:endParaRPr lang="en-GB"/>
+          </a:p>
+        </p:txBody>
+      </p:sp>
+      <p:sp>
+        <p:nvSpPr>
+          <p:cNvPr id="3" name="Title 2"/>
+          <p:cNvSpPr>
+            <a:spLocks noGrp="1"/>
+          </p:cNvSpPr>
+          <p:nvPr>
+            <p:ph type="title"/>
+          </p:nvPr>
+        </p:nvSpPr>
+        <p:spPr/>
+        <p:txBody>
+          <a:bodyPr/>
+          <a:lstStyle/>
+          <a:p>
+            <a:endParaRPr lang="en-GB" dirty="0"/>
+          </a:p>
+        </p:txBody>
+      </p:sp>
+      <p:sp>
+        <p:nvSpPr>
+          <p:cNvPr id="4" name="Slide Number Placeholder 3"/>
+          <p:cNvSpPr>
+            <a:spLocks noGrp="1"/>
+          </p:cNvSpPr>
+          <p:nvPr>
+            <p:ph type="sldNum" sz="quarter" idx="4"/>
+          </p:nvPr>
+        </p:nvSpPr>
+        <p:spPr/>
+        <p:txBody>
+          <a:bodyPr/>
+          <a:lstStyle/>
+          <a:p>
+            <a:fld id="{57E314E1-448B-4E82-884A-39F65482640B}" type="slidenum">
+              <a:rPr lang="en-GB" smtClean="0"/>
+              <a:t>13</a:t>
+            </a:fld>
+            <a:endParaRPr lang="en-GB" dirty="0"/>
+          </a:p>
+        </p:txBody>
+      </p:sp>
+    </p:spTree>
+    <p:extLst>
+      <p:ext uri="{BB962C8B-B14F-4D97-AF65-F5344CB8AC3E}">
+        <p14:creationId xmlns:p14="http://schemas.microsoft.com/office/powerpoint/2010/main" val="3261310763"/>
+      </p:ext>
+    </p:extLst>
+  </p:cSld>
+  <p:clrMapOvr>
+    <a:masterClrMapping/>
+  </p:clrMapOvr>
+</p:sld>
+</file>
+
 <file path=ppt/slides/slide2.xml><?xml version="1.0" encoding="utf-8"?>
 <p:sld xmlns:a="http://schemas.openxmlformats.org/drawingml/2006/main" xmlns:r="http://schemas.openxmlformats.org/officeDocument/2006/relationships" xmlns:p="http://schemas.openxmlformats.org/presentationml/2006/main">
   <p:cSld>
@@ -6756,7 +7351,7 @@
       </p:grpSpPr>
       <p:sp>
         <p:nvSpPr>
-          <p:cNvPr id="3" name="Content Placeholder 2"/>
+          <p:cNvPr id="2" name="Content Placeholder 1"/>
           <p:cNvSpPr>
             <a:spLocks noGrp="1"/>
           </p:cNvSpPr>
@@ -6769,18 +7364,112 @@
           <a:bodyPr/>
           <a:lstStyle/>
           <a:p>
-            <a:endParaRPr lang="en-GB" dirty="0"/>
-          </a:p>
-        </p:txBody>
-      </p:sp>
-      <p:sp>
-        <p:nvSpPr>
-          <p:cNvPr id="2" name="Title 1"/>
+            <a:pPr marL="109728" indent="0">
+              <a:buNone/>
+            </a:pPr>
+            <a:endParaRPr lang="en-GB" dirty="0" smtClean="0"/>
+          </a:p>
+          <a:p>
+            <a:r>
+              <a:rPr lang="en-GB" dirty="0" smtClean="0"/>
+              <a:t>The human immune system is a complicated entity</a:t>
+            </a:r>
+          </a:p>
+          <a:p>
+            <a:r>
+              <a:rPr lang="en-GB" dirty="0" smtClean="0"/>
+              <a:t>The model of </a:t>
+            </a:r>
+            <a:r>
+              <a:rPr lang="en-GB" dirty="0" err="1" smtClean="0"/>
+              <a:t>Hancioglu</a:t>
+            </a:r>
+            <a:r>
+              <a:rPr lang="en-GB" dirty="0" smtClean="0"/>
+              <a:t> </a:t>
+            </a:r>
+            <a:r>
+              <a:rPr lang="en-GB" i="1" dirty="0" smtClean="0"/>
+              <a:t>et al. </a:t>
+            </a:r>
+            <a:r>
+              <a:rPr lang="en-GB" dirty="0" smtClean="0"/>
+              <a:t>(2007) seeks to capture some of its behaviour…</a:t>
+            </a:r>
+          </a:p>
+          <a:p>
+            <a:r>
+              <a:rPr lang="en-GB" dirty="0" smtClean="0"/>
+              <a:t>… specifically the interplay between innate and adaptive immunity</a:t>
+            </a:r>
+          </a:p>
+          <a:p>
+            <a:r>
+              <a:rPr lang="en-GB" dirty="0" smtClean="0"/>
+              <a:t>Group G (Pearce </a:t>
+            </a:r>
+            <a:r>
+              <a:rPr lang="en-GB" i="1" dirty="0" smtClean="0"/>
+              <a:t>et al.</a:t>
+            </a:r>
+            <a:r>
+              <a:rPr lang="en-GB" dirty="0" smtClean="0"/>
+              <a:t>) were tasked with implementing model in </a:t>
+            </a:r>
+            <a:r>
+              <a:rPr lang="en-GB" dirty="0" err="1" smtClean="0"/>
+              <a:t>MatLab</a:t>
+            </a:r>
+            <a:r>
+              <a:rPr lang="en-GB" dirty="0" smtClean="0"/>
+              <a:t>®</a:t>
+            </a:r>
+          </a:p>
+          <a:p>
+            <a:pPr marL="109728" indent="0">
+              <a:buNone/>
+            </a:pPr>
+            <a:endParaRPr lang="en-GB" dirty="0" smtClean="0"/>
+          </a:p>
+        </p:txBody>
+      </p:sp>
+      <p:sp>
+        <p:nvSpPr>
+          <p:cNvPr id="3" name="Title 2"/>
           <p:cNvSpPr>
             <a:spLocks noGrp="1"/>
           </p:cNvSpPr>
           <p:nvPr>
             <p:ph type="title"/>
+          </p:nvPr>
+        </p:nvSpPr>
+        <p:spPr/>
+        <p:txBody>
+          <a:bodyPr>
+            <a:normAutofit fontScale="90000"/>
+          </a:bodyPr>
+          <a:lstStyle/>
+          <a:p>
+            <a:r>
+              <a:rPr lang="en-GB" dirty="0" smtClean="0"/>
+              <a:t>The Problem – </a:t>
+            </a:r>
+            <a:r>
+              <a:rPr lang="en-GB" b="0" dirty="0" smtClean="0"/>
+              <a:t>Human Immune Response Modelling</a:t>
+            </a:r>
+            <a:endParaRPr lang="en-GB" b="0" dirty="0"/>
+          </a:p>
+        </p:txBody>
+      </p:sp>
+      <p:sp>
+        <p:nvSpPr>
+          <p:cNvPr id="4" name="Slide Number Placeholder 3"/>
+          <p:cNvSpPr>
+            <a:spLocks noGrp="1"/>
+          </p:cNvSpPr>
+          <p:nvPr>
+            <p:ph type="sldNum" sz="quarter" idx="4"/>
           </p:nvPr>
         </p:nvSpPr>
         <p:spPr/>
@@ -6788,6 +7477,1391 @@
           <a:bodyPr/>
           <a:lstStyle/>
           <a:p>
+            <a:fld id="{57E314E1-448B-4E82-884A-39F65482640B}" type="slidenum">
+              <a:rPr lang="en-GB" smtClean="0"/>
+              <a:t>2</a:t>
+            </a:fld>
+            <a:endParaRPr lang="en-GB" dirty="0"/>
+          </a:p>
+        </p:txBody>
+      </p:sp>
+    </p:spTree>
+    <p:extLst>
+      <p:ext uri="{BB962C8B-B14F-4D97-AF65-F5344CB8AC3E}">
+        <p14:creationId xmlns:p14="http://schemas.microsoft.com/office/powerpoint/2010/main" val="303740058"/>
+      </p:ext>
+    </p:extLst>
+  </p:cSld>
+  <p:clrMapOvr>
+    <a:masterClrMapping/>
+  </p:clrMapOvr>
+</p:sld>
+</file>
+
+<file path=ppt/slides/slide3.xml><?xml version="1.0" encoding="utf-8"?>
+<p:sld xmlns:a="http://schemas.openxmlformats.org/drawingml/2006/main" xmlns:r="http://schemas.openxmlformats.org/officeDocument/2006/relationships" xmlns:p="http://schemas.openxmlformats.org/presentationml/2006/main">
+  <p:cSld>
+    <p:spTree>
+      <p:nvGrpSpPr>
+        <p:cNvPr id="1" name=""/>
+        <p:cNvGrpSpPr/>
+        <p:nvPr/>
+      </p:nvGrpSpPr>
+      <p:grpSpPr>
+        <a:xfrm>
+          <a:off x="0" y="0"/>
+          <a:ext cx="0" cy="0"/>
+          <a:chOff x="0" y="0"/>
+          <a:chExt cx="0" cy="0"/>
+        </a:xfrm>
+      </p:grpSpPr>
+      <p:sp>
+        <p:nvSpPr>
+          <p:cNvPr id="3" name="Title 2"/>
+          <p:cNvSpPr>
+            <a:spLocks noGrp="1"/>
+          </p:cNvSpPr>
+          <p:nvPr>
+            <p:ph type="title"/>
+          </p:nvPr>
+        </p:nvSpPr>
+        <p:spPr/>
+        <p:txBody>
+          <a:bodyPr/>
+          <a:lstStyle/>
+          <a:p>
+            <a:r>
+              <a:rPr lang="en-GB" dirty="0" smtClean="0"/>
+              <a:t>The </a:t>
+            </a:r>
+            <a:r>
+              <a:rPr lang="en-GB" dirty="0" err="1" smtClean="0"/>
+              <a:t>Hancioglu</a:t>
+            </a:r>
+            <a:r>
+              <a:rPr lang="en-GB" dirty="0" smtClean="0"/>
+              <a:t> model</a:t>
+            </a:r>
+            <a:endParaRPr lang="en-GB" dirty="0"/>
+          </a:p>
+        </p:txBody>
+      </p:sp>
+      <p:sp>
+        <p:nvSpPr>
+          <p:cNvPr id="4" name="Slide Number Placeholder 3"/>
+          <p:cNvSpPr>
+            <a:spLocks noGrp="1"/>
+          </p:cNvSpPr>
+          <p:nvPr>
+            <p:ph type="sldNum" sz="quarter" idx="4"/>
+          </p:nvPr>
+        </p:nvSpPr>
+        <p:spPr/>
+        <p:txBody>
+          <a:bodyPr/>
+          <a:lstStyle/>
+          <a:p>
+            <a:fld id="{57E314E1-448B-4E82-884A-39F65482640B}" type="slidenum">
+              <a:rPr lang="en-GB" smtClean="0"/>
+              <a:t>3</a:t>
+            </a:fld>
+            <a:endParaRPr lang="en-GB" dirty="0"/>
+          </a:p>
+        </p:txBody>
+      </p:sp>
+      <p:pic>
+        <p:nvPicPr>
+          <p:cNvPr id="9" name="Picture 3"/>
+          <p:cNvPicPr>
+            <a:picLocks noChangeAspect="1" noChangeArrowheads="1"/>
+          </p:cNvPicPr>
+          <p:nvPr/>
+        </p:nvPicPr>
+        <p:blipFill rotWithShape="1">
+          <a:blip r:embed="rId2" cstate="print">
+            <a:extLst>
+              <a:ext uri="{28A0092B-C50C-407E-A947-70E740481C1C}">
+                <a14:useLocalDpi xmlns:a14="http://schemas.microsoft.com/office/drawing/2010/main" val="0"/>
+              </a:ext>
+            </a:extLst>
+          </a:blip>
+          <a:srcRect l="26159" t="9591" r="12117" b="12267"/>
+          <a:stretch/>
+        </p:blipFill>
+        <p:spPr bwMode="auto">
+          <a:xfrm>
+            <a:off x="4208943" y="1700808"/>
+            <a:ext cx="4806669" cy="3422931"/>
+          </a:xfrm>
+          <a:prstGeom prst="rect">
+            <a:avLst/>
+          </a:prstGeom>
+          <a:noFill/>
+          <a:ln>
+            <a:noFill/>
+          </a:ln>
+          <a:effectLst/>
+          <a:extLst>
+            <a:ext uri="{909E8E84-426E-40DD-AFC4-6F175D3DCCD1}">
+              <a14:hiddenFill xmlns:a14="http://schemas.microsoft.com/office/drawing/2010/main">
+                <a:solidFill>
+                  <a:schemeClr val="accent1"/>
+                </a:solidFill>
+              </a14:hiddenFill>
+            </a:ext>
+            <a:ext uri="{91240B29-F687-4F45-9708-019B960494DF}">
+              <a14:hiddenLine xmlns:a14="http://schemas.microsoft.com/office/drawing/2010/main" w="9525">
+                <a:solidFill>
+                  <a:schemeClr val="tx1"/>
+                </a:solidFill>
+                <a:miter lim="800000"/>
+                <a:headEnd/>
+                <a:tailEnd/>
+              </a14:hiddenLine>
+            </a:ext>
+            <a:ext uri="{AF507438-7753-43E0-B8FC-AC1667EBCBE1}">
+              <a14:hiddenEffects xmlns:a14="http://schemas.microsoft.com/office/drawing/2010/main">
+                <a:effectLst>
+                  <a:outerShdw dist="35921" dir="2700000" algn="ctr" rotWithShape="0">
+                    <a:schemeClr val="bg2"/>
+                  </a:outerShdw>
+                </a:effectLst>
+              </a14:hiddenEffects>
+            </a:ext>
+          </a:extLst>
+        </p:spPr>
+      </p:pic>
+      <p:pic>
+        <p:nvPicPr>
+          <p:cNvPr id="1026" name="Picture 2"/>
+          <p:cNvPicPr>
+            <a:picLocks noChangeAspect="1" noChangeArrowheads="1"/>
+          </p:cNvPicPr>
+          <p:nvPr/>
+        </p:nvPicPr>
+        <p:blipFill>
+          <a:blip r:embed="rId3" cstate="print">
+            <a:extLst>
+              <a:ext uri="{28A0092B-C50C-407E-A947-70E740481C1C}">
+                <a14:useLocalDpi xmlns:a14="http://schemas.microsoft.com/office/drawing/2010/main" val="0"/>
+              </a:ext>
+            </a:extLst>
+          </a:blip>
+          <a:srcRect/>
+          <a:stretch>
+            <a:fillRect/>
+          </a:stretch>
+        </p:blipFill>
+        <p:spPr bwMode="auto">
+          <a:xfrm>
+            <a:off x="467544" y="1858712"/>
+            <a:ext cx="3918614" cy="2996951"/>
+          </a:xfrm>
+          <a:prstGeom prst="rect">
+            <a:avLst/>
+          </a:prstGeom>
+          <a:noFill/>
+          <a:ln>
+            <a:noFill/>
+          </a:ln>
+          <a:effectLst/>
+          <a:extLst>
+            <a:ext uri="{909E8E84-426E-40DD-AFC4-6F175D3DCCD1}">
+              <a14:hiddenFill xmlns:a14="http://schemas.microsoft.com/office/drawing/2010/main">
+                <a:solidFill>
+                  <a:schemeClr val="accent1"/>
+                </a:solidFill>
+              </a14:hiddenFill>
+            </a:ext>
+            <a:ext uri="{91240B29-F687-4F45-9708-019B960494DF}">
+              <a14:hiddenLine xmlns:a14="http://schemas.microsoft.com/office/drawing/2010/main" w="9525">
+                <a:solidFill>
+                  <a:schemeClr val="tx1"/>
+                </a:solidFill>
+                <a:miter lim="800000"/>
+                <a:headEnd/>
+                <a:tailEnd/>
+              </a14:hiddenLine>
+            </a:ext>
+            <a:ext uri="{AF507438-7753-43E0-B8FC-AC1667EBCBE1}">
+              <a14:hiddenEffects xmlns:a14="http://schemas.microsoft.com/office/drawing/2010/main">
+                <a:effectLst>
+                  <a:outerShdw dist="35921" dir="2700000" algn="ctr" rotWithShape="0">
+                    <a:schemeClr val="bg2"/>
+                  </a:outerShdw>
+                </a:effectLst>
+              </a14:hiddenEffects>
+            </a:ext>
+          </a:extLst>
+        </p:spPr>
+      </p:pic>
+    </p:spTree>
+    <p:extLst>
+      <p:ext uri="{BB962C8B-B14F-4D97-AF65-F5344CB8AC3E}">
+        <p14:creationId xmlns:p14="http://schemas.microsoft.com/office/powerpoint/2010/main" val="314568644"/>
+      </p:ext>
+    </p:extLst>
+  </p:cSld>
+  <p:clrMapOvr>
+    <a:masterClrMapping/>
+  </p:clrMapOvr>
+</p:sld>
+</file>
+
+<file path=ppt/slides/slide4.xml><?xml version="1.0" encoding="utf-8"?>
+<p:sld xmlns:a="http://schemas.openxmlformats.org/drawingml/2006/main" xmlns:r="http://schemas.openxmlformats.org/officeDocument/2006/relationships" xmlns:p="http://schemas.openxmlformats.org/presentationml/2006/main">
+  <p:cSld>
+    <p:spTree>
+      <p:nvGrpSpPr>
+        <p:cNvPr id="1" name=""/>
+        <p:cNvGrpSpPr/>
+        <p:nvPr/>
+      </p:nvGrpSpPr>
+      <p:grpSpPr>
+        <a:xfrm>
+          <a:off x="0" y="0"/>
+          <a:ext cx="0" cy="0"/>
+          <a:chOff x="0" y="0"/>
+          <a:chExt cx="0" cy="0"/>
+        </a:xfrm>
+      </p:grpSpPr>
+      <p:sp>
+        <p:nvSpPr>
+          <p:cNvPr id="3" name="Title 2"/>
+          <p:cNvSpPr>
+            <a:spLocks noGrp="1"/>
+          </p:cNvSpPr>
+          <p:nvPr>
+            <p:ph type="title"/>
+          </p:nvPr>
+        </p:nvSpPr>
+        <p:spPr/>
+        <p:txBody>
+          <a:bodyPr/>
+          <a:lstStyle/>
+          <a:p>
+            <a:pPr algn="ctr"/>
+            <a:r>
+              <a:rPr lang="en-GB" dirty="0" smtClean="0"/>
+              <a:t>Phase 2 – Inherited Code</a:t>
+            </a:r>
+            <a:endParaRPr lang="en-GB" dirty="0"/>
+          </a:p>
+        </p:txBody>
+      </p:sp>
+      <p:sp>
+        <p:nvSpPr>
+          <p:cNvPr id="5" name="Text Placeholder 4"/>
+          <p:cNvSpPr>
+            <a:spLocks noGrp="1"/>
+          </p:cNvSpPr>
+          <p:nvPr>
+            <p:ph type="body" idx="1"/>
+          </p:nvPr>
+        </p:nvSpPr>
+        <p:spPr/>
+        <p:txBody>
+          <a:bodyPr/>
+          <a:lstStyle/>
+          <a:p>
+            <a:r>
+              <a:rPr lang="en-GB" dirty="0"/>
+              <a:t>So, how did they </a:t>
+            </a:r>
+            <a:r>
+              <a:rPr lang="en-GB" dirty="0" smtClean="0"/>
+              <a:t>do?</a:t>
+            </a:r>
+            <a:endParaRPr lang="en-GB" dirty="0"/>
+          </a:p>
+        </p:txBody>
+      </p:sp>
+      <p:sp>
+        <p:nvSpPr>
+          <p:cNvPr id="4" name="Slide Number Placeholder 3"/>
+          <p:cNvSpPr>
+            <a:spLocks noGrp="1"/>
+          </p:cNvSpPr>
+          <p:nvPr>
+            <p:ph type="sldNum" sz="quarter" idx="12"/>
+          </p:nvPr>
+        </p:nvSpPr>
+        <p:spPr/>
+        <p:txBody>
+          <a:bodyPr/>
+          <a:lstStyle/>
+          <a:p>
+            <a:fld id="{57E314E1-448B-4E82-884A-39F65482640B}" type="slidenum">
+              <a:rPr lang="en-GB" smtClean="0"/>
+              <a:t>4</a:t>
+            </a:fld>
+            <a:endParaRPr lang="en-GB" dirty="0"/>
+          </a:p>
+        </p:txBody>
+      </p:sp>
+    </p:spTree>
+    <p:extLst>
+      <p:ext uri="{BB962C8B-B14F-4D97-AF65-F5344CB8AC3E}">
+        <p14:creationId xmlns:p14="http://schemas.microsoft.com/office/powerpoint/2010/main" val="2309345364"/>
+      </p:ext>
+    </p:extLst>
+  </p:cSld>
+  <p:clrMapOvr>
+    <a:masterClrMapping/>
+  </p:clrMapOvr>
+</p:sld>
+</file>
+
+<file path=ppt/slides/slide5.xml><?xml version="1.0" encoding="utf-8"?>
+<p:sld xmlns:a="http://schemas.openxmlformats.org/drawingml/2006/main" xmlns:r="http://schemas.openxmlformats.org/officeDocument/2006/relationships" xmlns:p="http://schemas.openxmlformats.org/presentationml/2006/main">
+  <p:cSld>
+    <p:spTree>
+      <p:nvGrpSpPr>
+        <p:cNvPr id="1" name=""/>
+        <p:cNvGrpSpPr/>
+        <p:nvPr/>
+      </p:nvGrpSpPr>
+      <p:grpSpPr>
+        <a:xfrm>
+          <a:off x="0" y="0"/>
+          <a:ext cx="0" cy="0"/>
+          <a:chOff x="0" y="0"/>
+          <a:chExt cx="0" cy="0"/>
+        </a:xfrm>
+      </p:grpSpPr>
+      <p:graphicFrame>
+        <p:nvGraphicFramePr>
+          <p:cNvPr id="5" name="Content Placeholder 4"/>
+          <p:cNvGraphicFramePr>
+            <a:graphicFrameLocks noGrp="1"/>
+          </p:cNvGraphicFramePr>
+          <p:nvPr>
+            <p:ph idx="1"/>
+            <p:extLst>
+              <p:ext uri="{D42A27DB-BD31-4B8C-83A1-F6EECF244321}">
+                <p14:modId xmlns:p14="http://schemas.microsoft.com/office/powerpoint/2010/main" val="3586217241"/>
+              </p:ext>
+            </p:extLst>
+          </p:nvPr>
+        </p:nvGraphicFramePr>
+        <p:xfrm>
+          <a:off x="630872" y="1781016"/>
+          <a:ext cx="7882255" cy="3926205"/>
+        </p:xfrm>
+        <a:graphic>
+          <a:graphicData uri="http://schemas.openxmlformats.org/drawingml/2006/table">
+            <a:tbl>
+              <a:tblPr firstRow="1" firstCol="1" bandRow="1">
+                <a:tableStyleId>{5C22544A-7EE6-4342-B048-85BDC9FD1C3A}</a:tableStyleId>
+              </a:tblPr>
+              <a:tblGrid>
+                <a:gridCol w="2499360"/>
+                <a:gridCol w="1259840"/>
+                <a:gridCol w="4123055"/>
+              </a:tblGrid>
+              <a:tr h="311785">
+                <a:tc>
+                  <a:txBody>
+                    <a:bodyPr/>
+                    <a:lstStyle/>
+                    <a:p>
+                      <a:pPr algn="ctr">
+                        <a:lnSpc>
+                          <a:spcPct val="115000"/>
+                        </a:lnSpc>
+                        <a:spcAft>
+                          <a:spcPts val="0"/>
+                        </a:spcAft>
+                      </a:pPr>
+                      <a:r>
+                        <a:rPr lang="en-GB" sz="1100" dirty="0">
+                          <a:effectLst/>
+                        </a:rPr>
+                        <a:t>What</a:t>
+                      </a:r>
+                      <a:endParaRPr lang="en-GB" sz="1100" dirty="0">
+                        <a:solidFill>
+                          <a:srgbClr val="31849B"/>
+                        </a:solidFill>
+                        <a:effectLst/>
+                        <a:latin typeface="Calibri"/>
+                        <a:ea typeface="Calibri"/>
+                        <a:cs typeface="Times New Roman"/>
+                      </a:endParaRPr>
+                    </a:p>
+                  </a:txBody>
+                  <a:tcPr marL="68580" marR="68580" marT="0" marB="0"/>
+                </a:tc>
+                <a:tc>
+                  <a:txBody>
+                    <a:bodyPr/>
+                    <a:lstStyle/>
+                    <a:p>
+                      <a:pPr algn="ctr">
+                        <a:lnSpc>
+                          <a:spcPct val="115000"/>
+                        </a:lnSpc>
+                        <a:spcAft>
+                          <a:spcPts val="0"/>
+                        </a:spcAft>
+                      </a:pPr>
+                      <a:r>
+                        <a:rPr lang="en-GB" sz="1100">
+                          <a:effectLst/>
+                        </a:rPr>
+                        <a:t>Check</a:t>
+                      </a:r>
+                      <a:endParaRPr lang="en-GB" sz="1100">
+                        <a:solidFill>
+                          <a:srgbClr val="31849B"/>
+                        </a:solidFill>
+                        <a:effectLst/>
+                        <a:latin typeface="Calibri"/>
+                        <a:ea typeface="Calibri"/>
+                        <a:cs typeface="Times New Roman"/>
+                      </a:endParaRPr>
+                    </a:p>
+                  </a:txBody>
+                  <a:tcPr marL="68580" marR="68580" marT="0" marB="0"/>
+                </a:tc>
+                <a:tc>
+                  <a:txBody>
+                    <a:bodyPr/>
+                    <a:lstStyle/>
+                    <a:p>
+                      <a:pPr algn="ctr">
+                        <a:lnSpc>
+                          <a:spcPct val="115000"/>
+                        </a:lnSpc>
+                        <a:spcAft>
+                          <a:spcPts val="0"/>
+                        </a:spcAft>
+                      </a:pPr>
+                      <a:r>
+                        <a:rPr lang="en-GB" sz="1100">
+                          <a:effectLst/>
+                        </a:rPr>
+                        <a:t>Comments</a:t>
+                      </a:r>
+                      <a:endParaRPr lang="en-GB" sz="1100">
+                        <a:solidFill>
+                          <a:srgbClr val="31849B"/>
+                        </a:solidFill>
+                        <a:effectLst/>
+                        <a:latin typeface="Calibri"/>
+                        <a:ea typeface="Calibri"/>
+                        <a:cs typeface="Times New Roman"/>
+                      </a:endParaRPr>
+                    </a:p>
+                  </a:txBody>
+                  <a:tcPr marL="68580" marR="68580" marT="0" marB="0"/>
+                </a:tc>
+              </a:tr>
+              <a:tr h="706120">
+                <a:tc>
+                  <a:txBody>
+                    <a:bodyPr/>
+                    <a:lstStyle/>
+                    <a:p>
+                      <a:pPr marL="342900" lvl="0" indent="-342900">
+                        <a:spcAft>
+                          <a:spcPts val="0"/>
+                        </a:spcAft>
+                        <a:buFont typeface="Wingdings 3"/>
+                        <a:buChar char=""/>
+                        <a:tabLst>
+                          <a:tab pos="457200" algn="l"/>
+                        </a:tabLst>
+                      </a:pPr>
+                      <a:r>
+                        <a:rPr lang="en-GB" sz="1800" kern="1200">
+                          <a:effectLst/>
+                        </a:rPr>
+                        <a:t>Clear report?</a:t>
+                      </a:r>
+                      <a:endParaRPr lang="en-GB" sz="1200">
+                        <a:solidFill>
+                          <a:srgbClr val="31849B"/>
+                        </a:solidFill>
+                        <a:effectLst/>
+                        <a:latin typeface="Times New Roman"/>
+                        <a:ea typeface="Times New Roman"/>
+                      </a:endParaRPr>
+                    </a:p>
+                  </a:txBody>
+                  <a:tcPr marL="68580" marR="68580" marT="0" marB="0"/>
+                </a:tc>
+                <a:tc>
+                  <a:txBody>
+                    <a:bodyPr/>
+                    <a:lstStyle/>
+                    <a:p>
+                      <a:pPr algn="ctr">
+                        <a:lnSpc>
+                          <a:spcPct val="115000"/>
+                        </a:lnSpc>
+                        <a:spcAft>
+                          <a:spcPts val="0"/>
+                        </a:spcAft>
+                      </a:pPr>
+                      <a:endParaRPr lang="en-GB" sz="1100">
+                        <a:solidFill>
+                          <a:srgbClr val="31849B"/>
+                        </a:solidFill>
+                        <a:effectLst/>
+                        <a:latin typeface="Calibri"/>
+                        <a:ea typeface="Calibri"/>
+                        <a:cs typeface="Times New Roman"/>
+                      </a:endParaRPr>
+                    </a:p>
+                  </a:txBody>
+                  <a:tcPr marL="68580" marR="68580" marT="0" marB="0"/>
+                </a:tc>
+                <a:tc>
+                  <a:txBody>
+                    <a:bodyPr/>
+                    <a:lstStyle/>
+                    <a:p>
+                      <a:pPr>
+                        <a:lnSpc>
+                          <a:spcPct val="115000"/>
+                        </a:lnSpc>
+                        <a:spcAft>
+                          <a:spcPts val="0"/>
+                        </a:spcAft>
+                      </a:pPr>
+                      <a:r>
+                        <a:rPr lang="en-GB" sz="1100" dirty="0">
+                          <a:effectLst/>
+                        </a:rPr>
+                        <a:t>Well-explained mathematics and good documentation of results. Authorship clear.</a:t>
+                      </a:r>
+                      <a:endParaRPr lang="en-GB" sz="1100" dirty="0">
+                        <a:solidFill>
+                          <a:srgbClr val="31849B"/>
+                        </a:solidFill>
+                        <a:effectLst/>
+                        <a:latin typeface="Calibri"/>
+                        <a:ea typeface="Calibri"/>
+                        <a:cs typeface="Times New Roman"/>
+                      </a:endParaRPr>
+                    </a:p>
+                  </a:txBody>
+                  <a:tcPr marL="68580" marR="68580" marT="0" marB="0"/>
+                </a:tc>
+              </a:tr>
+              <a:tr h="748030">
+                <a:tc>
+                  <a:txBody>
+                    <a:bodyPr/>
+                    <a:lstStyle/>
+                    <a:p>
+                      <a:pPr marL="342900" lvl="0" indent="-342900">
+                        <a:spcAft>
+                          <a:spcPts val="0"/>
+                        </a:spcAft>
+                        <a:buFont typeface="Wingdings 3"/>
+                        <a:buChar char=""/>
+                        <a:tabLst>
+                          <a:tab pos="457200" algn="l"/>
+                        </a:tabLst>
+                      </a:pPr>
+                      <a:r>
+                        <a:rPr lang="en-GB" sz="1800" kern="1200">
+                          <a:effectLst/>
+                        </a:rPr>
+                        <a:t>User-friendly GUI?</a:t>
+                      </a:r>
+                      <a:endParaRPr lang="en-GB" sz="1200">
+                        <a:solidFill>
+                          <a:srgbClr val="31849B"/>
+                        </a:solidFill>
+                        <a:effectLst/>
+                        <a:latin typeface="Times New Roman"/>
+                        <a:ea typeface="Times New Roman"/>
+                      </a:endParaRPr>
+                    </a:p>
+                  </a:txBody>
+                  <a:tcPr marL="68580" marR="68580" marT="0" marB="0"/>
+                </a:tc>
+                <a:tc>
+                  <a:txBody>
+                    <a:bodyPr/>
+                    <a:lstStyle/>
+                    <a:p>
+                      <a:pPr algn="ctr">
+                        <a:lnSpc>
+                          <a:spcPct val="115000"/>
+                        </a:lnSpc>
+                        <a:spcAft>
+                          <a:spcPts val="0"/>
+                        </a:spcAft>
+                      </a:pPr>
+                      <a:endParaRPr lang="en-GB" sz="1100">
+                        <a:solidFill>
+                          <a:srgbClr val="31849B"/>
+                        </a:solidFill>
+                        <a:effectLst/>
+                        <a:latin typeface="Calibri"/>
+                        <a:ea typeface="Calibri"/>
+                        <a:cs typeface="Times New Roman"/>
+                      </a:endParaRPr>
+                    </a:p>
+                  </a:txBody>
+                  <a:tcPr marL="68580" marR="68580" marT="0" marB="0"/>
+                </a:tc>
+                <a:tc>
+                  <a:txBody>
+                    <a:bodyPr/>
+                    <a:lstStyle/>
+                    <a:p>
+                      <a:pPr>
+                        <a:lnSpc>
+                          <a:spcPct val="115000"/>
+                        </a:lnSpc>
+                        <a:spcAft>
+                          <a:spcPts val="0"/>
+                        </a:spcAft>
+                      </a:pPr>
+                      <a:r>
+                        <a:rPr lang="en-GB" sz="1100" dirty="0">
+                          <a:effectLst/>
+                        </a:rPr>
+                        <a:t>Beautiful GUI. Drop-down menus are a good solution to the multi-parameter problem. Needs a ‘running ’ bar and a reset key.</a:t>
+                      </a:r>
+                      <a:endParaRPr lang="en-GB" sz="1100" dirty="0">
+                        <a:solidFill>
+                          <a:srgbClr val="31849B"/>
+                        </a:solidFill>
+                        <a:effectLst/>
+                        <a:latin typeface="Calibri"/>
+                        <a:ea typeface="Calibri"/>
+                        <a:cs typeface="Times New Roman"/>
+                      </a:endParaRPr>
+                    </a:p>
+                  </a:txBody>
+                  <a:tcPr marL="68580" marR="68580" marT="0" marB="0"/>
+                </a:tc>
+              </a:tr>
+              <a:tr h="706120">
+                <a:tc>
+                  <a:txBody>
+                    <a:bodyPr/>
+                    <a:lstStyle/>
+                    <a:p>
+                      <a:pPr marL="342900" lvl="0" indent="-342900">
+                        <a:spcAft>
+                          <a:spcPts val="0"/>
+                        </a:spcAft>
+                        <a:buFont typeface="Wingdings 3"/>
+                        <a:buChar char=""/>
+                        <a:tabLst>
+                          <a:tab pos="457200" algn="l"/>
+                        </a:tabLst>
+                      </a:pPr>
+                      <a:r>
+                        <a:rPr lang="en-GB" sz="1800" kern="1200">
+                          <a:effectLst/>
+                        </a:rPr>
+                        <a:t>Clear Licencing?</a:t>
+                      </a:r>
+                      <a:endParaRPr lang="en-GB" sz="1200">
+                        <a:solidFill>
+                          <a:srgbClr val="31849B"/>
+                        </a:solidFill>
+                        <a:effectLst/>
+                        <a:latin typeface="Times New Roman"/>
+                        <a:ea typeface="Times New Roman"/>
+                      </a:endParaRPr>
+                    </a:p>
+                  </a:txBody>
+                  <a:tcPr marL="68580" marR="68580" marT="0" marB="0"/>
+                </a:tc>
+                <a:tc>
+                  <a:txBody>
+                    <a:bodyPr/>
+                    <a:lstStyle/>
+                    <a:p>
+                      <a:pPr algn="ctr">
+                        <a:lnSpc>
+                          <a:spcPct val="115000"/>
+                        </a:lnSpc>
+                        <a:spcAft>
+                          <a:spcPts val="0"/>
+                        </a:spcAft>
+                      </a:pPr>
+                      <a:endParaRPr lang="en-GB" sz="1100">
+                        <a:solidFill>
+                          <a:srgbClr val="31849B"/>
+                        </a:solidFill>
+                        <a:effectLst/>
+                        <a:latin typeface="Calibri"/>
+                        <a:ea typeface="Calibri"/>
+                        <a:cs typeface="Times New Roman"/>
+                      </a:endParaRPr>
+                    </a:p>
+                  </a:txBody>
+                  <a:tcPr marL="68580" marR="68580" marT="0" marB="0"/>
+                </a:tc>
+                <a:tc>
+                  <a:txBody>
+                    <a:bodyPr/>
+                    <a:lstStyle/>
+                    <a:p>
+                      <a:pPr>
+                        <a:lnSpc>
+                          <a:spcPct val="115000"/>
+                        </a:lnSpc>
+                        <a:spcAft>
+                          <a:spcPts val="0"/>
+                        </a:spcAft>
+                      </a:pPr>
+                      <a:r>
+                        <a:rPr lang="en-GB" sz="1100" dirty="0">
+                          <a:effectLst/>
+                        </a:rPr>
+                        <a:t>Yes, throughout. Immaculate spelling of CC-BY-3.0. We all felt thoroughly safe.</a:t>
+                      </a:r>
+                      <a:endParaRPr lang="en-GB" sz="1100" dirty="0">
+                        <a:solidFill>
+                          <a:srgbClr val="31849B"/>
+                        </a:solidFill>
+                        <a:effectLst/>
+                        <a:latin typeface="Calibri"/>
+                        <a:ea typeface="Calibri"/>
+                        <a:cs typeface="Times New Roman"/>
+                      </a:endParaRPr>
+                    </a:p>
+                  </a:txBody>
+                  <a:tcPr marL="68580" marR="68580" marT="0" marB="0"/>
+                </a:tc>
+              </a:tr>
+              <a:tr h="748030">
+                <a:tc>
+                  <a:txBody>
+                    <a:bodyPr/>
+                    <a:lstStyle/>
+                    <a:p>
+                      <a:pPr marL="342900" lvl="0" indent="-342900">
+                        <a:spcAft>
+                          <a:spcPts val="0"/>
+                        </a:spcAft>
+                        <a:buFont typeface="Wingdings 3"/>
+                        <a:buChar char=""/>
+                        <a:tabLst>
+                          <a:tab pos="457200" algn="l"/>
+                        </a:tabLst>
+                      </a:pPr>
+                      <a:r>
+                        <a:rPr lang="en-GB" sz="1800" kern="1200">
+                          <a:effectLst/>
+                        </a:rPr>
+                        <a:t>Code Commenting?</a:t>
+                      </a:r>
+                      <a:endParaRPr lang="en-GB" sz="1200">
+                        <a:solidFill>
+                          <a:srgbClr val="31849B"/>
+                        </a:solidFill>
+                        <a:effectLst/>
+                        <a:latin typeface="Times New Roman"/>
+                        <a:ea typeface="Times New Roman"/>
+                      </a:endParaRPr>
+                    </a:p>
+                  </a:txBody>
+                  <a:tcPr marL="68580" marR="68580" marT="0" marB="0"/>
+                </a:tc>
+                <a:tc>
+                  <a:txBody>
+                    <a:bodyPr/>
+                    <a:lstStyle/>
+                    <a:p>
+                      <a:pPr algn="ctr">
+                        <a:lnSpc>
+                          <a:spcPct val="115000"/>
+                        </a:lnSpc>
+                        <a:spcAft>
+                          <a:spcPts val="0"/>
+                        </a:spcAft>
+                      </a:pPr>
+                      <a:endParaRPr lang="en-GB" sz="1100">
+                        <a:solidFill>
+                          <a:srgbClr val="31849B"/>
+                        </a:solidFill>
+                        <a:effectLst/>
+                        <a:latin typeface="Calibri"/>
+                        <a:ea typeface="Calibri"/>
+                        <a:cs typeface="Times New Roman"/>
+                      </a:endParaRPr>
+                    </a:p>
+                  </a:txBody>
+                  <a:tcPr marL="68580" marR="68580" marT="0" marB="0"/>
+                </a:tc>
+                <a:tc>
+                  <a:txBody>
+                    <a:bodyPr/>
+                    <a:lstStyle/>
+                    <a:p>
+                      <a:pPr>
+                        <a:lnSpc>
+                          <a:spcPct val="115000"/>
+                        </a:lnSpc>
+                        <a:spcAft>
+                          <a:spcPts val="0"/>
+                        </a:spcAft>
+                      </a:pPr>
+                      <a:r>
+                        <a:rPr lang="en-GB" sz="1100" dirty="0">
+                          <a:effectLst/>
+                        </a:rPr>
+                        <a:t>Quite thorough</a:t>
+                      </a:r>
+                      <a:r>
+                        <a:rPr lang="en-GB" sz="1100" dirty="0" smtClean="0">
+                          <a:effectLst/>
+                        </a:rPr>
+                        <a:t>. </a:t>
+                      </a:r>
+                      <a:r>
+                        <a:rPr lang="en-GB" sz="1100" dirty="0" err="1" smtClean="0">
+                          <a:effectLst/>
+                        </a:rPr>
+                        <a:t>Autocomments</a:t>
+                      </a:r>
+                      <a:r>
+                        <a:rPr lang="en-GB" sz="1100" dirty="0" smtClean="0">
+                          <a:effectLst/>
+                        </a:rPr>
+                        <a:t> left by GUIDE of dubious value.</a:t>
+                      </a:r>
+                      <a:endParaRPr lang="en-GB" sz="1100" dirty="0">
+                        <a:solidFill>
+                          <a:srgbClr val="31849B"/>
+                        </a:solidFill>
+                        <a:effectLst/>
+                        <a:latin typeface="Calibri"/>
+                        <a:ea typeface="Calibri"/>
+                        <a:cs typeface="Times New Roman"/>
+                      </a:endParaRPr>
+                    </a:p>
+                  </a:txBody>
+                  <a:tcPr marL="68580" marR="68580" marT="0" marB="0"/>
+                </a:tc>
+              </a:tr>
+              <a:tr h="706120">
+                <a:tc>
+                  <a:txBody>
+                    <a:bodyPr/>
+                    <a:lstStyle/>
+                    <a:p>
+                      <a:pPr marL="342900" lvl="0" indent="-342900">
+                        <a:spcAft>
+                          <a:spcPts val="0"/>
+                        </a:spcAft>
+                        <a:buFont typeface="Wingdings 3"/>
+                        <a:buChar char=""/>
+                        <a:tabLst>
+                          <a:tab pos="457200" algn="l"/>
+                        </a:tabLst>
+                      </a:pPr>
+                      <a:r>
+                        <a:rPr lang="en-GB" sz="1800" kern="1200">
+                          <a:effectLst/>
+                        </a:rPr>
+                        <a:t>Code Structure?</a:t>
+                      </a:r>
+                      <a:endParaRPr lang="en-GB" sz="1200">
+                        <a:solidFill>
+                          <a:srgbClr val="31849B"/>
+                        </a:solidFill>
+                        <a:effectLst/>
+                        <a:latin typeface="Times New Roman"/>
+                        <a:ea typeface="Times New Roman"/>
+                      </a:endParaRPr>
+                    </a:p>
+                  </a:txBody>
+                  <a:tcPr marL="68580" marR="68580" marT="0" marB="0"/>
+                </a:tc>
+                <a:tc>
+                  <a:txBody>
+                    <a:bodyPr/>
+                    <a:lstStyle/>
+                    <a:p>
+                      <a:pPr algn="ctr">
+                        <a:lnSpc>
+                          <a:spcPct val="115000"/>
+                        </a:lnSpc>
+                        <a:spcAft>
+                          <a:spcPts val="0"/>
+                        </a:spcAft>
+                      </a:pPr>
+                      <a:endParaRPr lang="en-GB" sz="1100">
+                        <a:solidFill>
+                          <a:srgbClr val="31849B"/>
+                        </a:solidFill>
+                        <a:effectLst/>
+                        <a:latin typeface="Calibri"/>
+                        <a:ea typeface="Calibri"/>
+                        <a:cs typeface="Times New Roman"/>
+                      </a:endParaRPr>
+                    </a:p>
+                  </a:txBody>
+                  <a:tcPr marL="68580" marR="68580" marT="0" marB="0"/>
+                </a:tc>
+                <a:tc>
+                  <a:txBody>
+                    <a:bodyPr/>
+                    <a:lstStyle/>
+                    <a:p>
+                      <a:pPr>
+                        <a:lnSpc>
+                          <a:spcPct val="115000"/>
+                        </a:lnSpc>
+                        <a:spcAft>
+                          <a:spcPts val="0"/>
+                        </a:spcAft>
+                      </a:pPr>
+                      <a:r>
+                        <a:rPr lang="en-GB" sz="1100" dirty="0">
+                          <a:effectLst/>
+                        </a:rPr>
+                        <a:t> </a:t>
+                      </a:r>
+                      <a:r>
+                        <a:rPr lang="en-GB" sz="1100" dirty="0" smtClean="0">
+                          <a:effectLst/>
+                        </a:rPr>
+                        <a:t>Clear,</a:t>
+                      </a:r>
+                      <a:r>
+                        <a:rPr lang="en-GB" sz="1100" baseline="0" dirty="0" smtClean="0">
+                          <a:effectLst/>
+                        </a:rPr>
+                        <a:t> well structured, but incorporation of new variables proved difficult, owing to GUIDE’s heavily nested data stream.</a:t>
+                      </a:r>
+                      <a:endParaRPr lang="en-GB" sz="1100" dirty="0">
+                        <a:solidFill>
+                          <a:srgbClr val="31849B"/>
+                        </a:solidFill>
+                        <a:effectLst/>
+                        <a:latin typeface="Calibri"/>
+                        <a:ea typeface="Calibri"/>
+                        <a:cs typeface="Times New Roman"/>
+                      </a:endParaRPr>
+                    </a:p>
+                  </a:txBody>
+                  <a:tcPr marL="68580" marR="68580" marT="0" marB="0"/>
+                </a:tc>
+              </a:tr>
+            </a:tbl>
+          </a:graphicData>
+        </a:graphic>
+      </p:graphicFrame>
+      <p:sp>
+        <p:nvSpPr>
+          <p:cNvPr id="3" name="Title 2"/>
+          <p:cNvSpPr>
+            <a:spLocks noGrp="1"/>
+          </p:cNvSpPr>
+          <p:nvPr>
+            <p:ph type="title"/>
+          </p:nvPr>
+        </p:nvSpPr>
+        <p:spPr/>
+        <p:txBody>
+          <a:bodyPr/>
+          <a:lstStyle/>
+          <a:p>
+            <a:r>
+              <a:rPr lang="en-GB" dirty="0" smtClean="0"/>
+              <a:t>Inherited Material - Checklist</a:t>
+            </a:r>
+            <a:endParaRPr lang="en-GB" dirty="0"/>
+          </a:p>
+        </p:txBody>
+      </p:sp>
+      <p:sp>
+        <p:nvSpPr>
+          <p:cNvPr id="4" name="Slide Number Placeholder 3"/>
+          <p:cNvSpPr>
+            <a:spLocks noGrp="1"/>
+          </p:cNvSpPr>
+          <p:nvPr>
+            <p:ph type="sldNum" sz="quarter" idx="4"/>
+          </p:nvPr>
+        </p:nvSpPr>
+        <p:spPr/>
+        <p:txBody>
+          <a:bodyPr/>
+          <a:lstStyle/>
+          <a:p>
+            <a:fld id="{57E314E1-448B-4E82-884A-39F65482640B}" type="slidenum">
+              <a:rPr lang="en-GB" smtClean="0"/>
+              <a:t>5</a:t>
+            </a:fld>
+            <a:endParaRPr lang="en-GB" dirty="0"/>
+          </a:p>
+        </p:txBody>
+      </p:sp>
+      <p:pic>
+        <p:nvPicPr>
+          <p:cNvPr id="2053" name="Picture 1" descr="http://ts2.mm.bing.net/th?id=H.5024803320954941&amp;pid=1.7&amp;w=199&amp;h=148&amp;c=7&amp;rs=1">
+            <a:hlinkClick r:id="rId2"/>
+          </p:cNvPr>
+          <p:cNvPicPr>
+            <a:picLocks noChangeAspect="1" noChangeArrowheads="1"/>
+          </p:cNvPicPr>
+          <p:nvPr/>
+        </p:nvPicPr>
+        <p:blipFill>
+          <a:blip r:embed="rId3">
+            <a:extLst>
+              <a:ext uri="{28A0092B-C50C-407E-A947-70E740481C1C}">
+                <a14:useLocalDpi xmlns:a14="http://schemas.microsoft.com/office/drawing/2010/main" val="0"/>
+              </a:ext>
+            </a:extLst>
+          </a:blip>
+          <a:srcRect/>
+          <a:stretch>
+            <a:fillRect/>
+          </a:stretch>
+        </p:blipFill>
+        <p:spPr bwMode="auto">
+          <a:xfrm>
+            <a:off x="3347864" y="5013176"/>
+            <a:ext cx="838200" cy="619125"/>
+          </a:xfrm>
+          <a:prstGeom prst="rect">
+            <a:avLst/>
+          </a:prstGeom>
+          <a:noFill/>
+          <a:extLst>
+            <a:ext uri="{909E8E84-426E-40DD-AFC4-6F175D3DCCD1}">
+              <a14:hiddenFill xmlns:a14="http://schemas.microsoft.com/office/drawing/2010/main">
+                <a:solidFill>
+                  <a:srgbClr val="FFFFFF"/>
+                </a:solidFill>
+              </a14:hiddenFill>
+            </a:ext>
+          </a:extLst>
+        </p:spPr>
+      </p:pic>
+      <p:pic>
+        <p:nvPicPr>
+          <p:cNvPr id="2052" name="Picture 2" descr="http://ts2.mm.bing.net/th?id=H.5024803320954941&amp;pid=1.7&amp;w=199&amp;h=148&amp;c=7&amp;rs=1">
+            <a:hlinkClick r:id="rId2"/>
+          </p:cNvPr>
+          <p:cNvPicPr>
+            <a:picLocks noChangeAspect="1" noChangeArrowheads="1"/>
+          </p:cNvPicPr>
+          <p:nvPr/>
+        </p:nvPicPr>
+        <p:blipFill>
+          <a:blip r:embed="rId3">
+            <a:extLst>
+              <a:ext uri="{28A0092B-C50C-407E-A947-70E740481C1C}">
+                <a14:useLocalDpi xmlns:a14="http://schemas.microsoft.com/office/drawing/2010/main" val="0"/>
+              </a:ext>
+            </a:extLst>
+          </a:blip>
+          <a:srcRect/>
+          <a:stretch>
+            <a:fillRect/>
+          </a:stretch>
+        </p:blipFill>
+        <p:spPr bwMode="auto">
+          <a:xfrm>
+            <a:off x="3347864" y="4293096"/>
+            <a:ext cx="838200" cy="619125"/>
+          </a:xfrm>
+          <a:prstGeom prst="rect">
+            <a:avLst/>
+          </a:prstGeom>
+          <a:noFill/>
+          <a:extLst>
+            <a:ext uri="{909E8E84-426E-40DD-AFC4-6F175D3DCCD1}">
+              <a14:hiddenFill xmlns:a14="http://schemas.microsoft.com/office/drawing/2010/main">
+                <a:solidFill>
+                  <a:srgbClr val="FFFFFF"/>
+                </a:solidFill>
+              </a14:hiddenFill>
+            </a:ext>
+          </a:extLst>
+        </p:spPr>
+      </p:pic>
+      <p:pic>
+        <p:nvPicPr>
+          <p:cNvPr id="2051" name="Picture 3" descr="http://ts2.mm.bing.net/th?id=H.5024803320954941&amp;pid=1.7&amp;w=199&amp;h=148&amp;c=7&amp;rs=1">
+            <a:hlinkClick r:id="rId2"/>
+          </p:cNvPr>
+          <p:cNvPicPr>
+            <a:picLocks noChangeAspect="1" noChangeArrowheads="1"/>
+          </p:cNvPicPr>
+          <p:nvPr/>
+        </p:nvPicPr>
+        <p:blipFill>
+          <a:blip r:embed="rId3">
+            <a:extLst>
+              <a:ext uri="{28A0092B-C50C-407E-A947-70E740481C1C}">
+                <a14:useLocalDpi xmlns:a14="http://schemas.microsoft.com/office/drawing/2010/main" val="0"/>
+              </a:ext>
+            </a:extLst>
+          </a:blip>
+          <a:srcRect/>
+          <a:stretch>
+            <a:fillRect/>
+          </a:stretch>
+        </p:blipFill>
+        <p:spPr bwMode="auto">
+          <a:xfrm>
+            <a:off x="3347864" y="3573016"/>
+            <a:ext cx="838200" cy="619125"/>
+          </a:xfrm>
+          <a:prstGeom prst="rect">
+            <a:avLst/>
+          </a:prstGeom>
+          <a:noFill/>
+          <a:extLst>
+            <a:ext uri="{909E8E84-426E-40DD-AFC4-6F175D3DCCD1}">
+              <a14:hiddenFill xmlns:a14="http://schemas.microsoft.com/office/drawing/2010/main">
+                <a:solidFill>
+                  <a:srgbClr val="FFFFFF"/>
+                </a:solidFill>
+              </a14:hiddenFill>
+            </a:ext>
+          </a:extLst>
+        </p:spPr>
+      </p:pic>
+      <p:pic>
+        <p:nvPicPr>
+          <p:cNvPr id="2050" name="Picture 4" descr="http://ts2.mm.bing.net/th?id=H.5024803320954941&amp;pid=1.7&amp;w=199&amp;h=148&amp;c=7&amp;rs=1">
+            <a:hlinkClick r:id="rId2"/>
+          </p:cNvPr>
+          <p:cNvPicPr>
+            <a:picLocks noChangeAspect="1" noChangeArrowheads="1"/>
+          </p:cNvPicPr>
+          <p:nvPr/>
+        </p:nvPicPr>
+        <p:blipFill>
+          <a:blip r:embed="rId3">
+            <a:extLst>
+              <a:ext uri="{28A0092B-C50C-407E-A947-70E740481C1C}">
+                <a14:useLocalDpi xmlns:a14="http://schemas.microsoft.com/office/drawing/2010/main" val="0"/>
+              </a:ext>
+            </a:extLst>
+          </a:blip>
+          <a:srcRect/>
+          <a:stretch>
+            <a:fillRect/>
+          </a:stretch>
+        </p:blipFill>
+        <p:spPr bwMode="auto">
+          <a:xfrm>
+            <a:off x="3329775" y="2852936"/>
+            <a:ext cx="838200" cy="619125"/>
+          </a:xfrm>
+          <a:prstGeom prst="rect">
+            <a:avLst/>
+          </a:prstGeom>
+          <a:noFill/>
+          <a:extLst>
+            <a:ext uri="{909E8E84-426E-40DD-AFC4-6F175D3DCCD1}">
+              <a14:hiddenFill xmlns:a14="http://schemas.microsoft.com/office/drawing/2010/main">
+                <a:solidFill>
+                  <a:srgbClr val="FFFFFF"/>
+                </a:solidFill>
+              </a14:hiddenFill>
+            </a:ext>
+          </a:extLst>
+        </p:spPr>
+      </p:pic>
+      <p:pic>
+        <p:nvPicPr>
+          <p:cNvPr id="2049" name="Picture 5" descr="http://ts2.mm.bing.net/th?id=H.5024803320954941&amp;pid=1.7&amp;w=199&amp;h=148&amp;c=7&amp;rs=1">
+            <a:hlinkClick r:id="rId2"/>
+          </p:cNvPr>
+          <p:cNvPicPr>
+            <a:picLocks noChangeAspect="1" noChangeArrowheads="1"/>
+          </p:cNvPicPr>
+          <p:nvPr/>
+        </p:nvPicPr>
+        <p:blipFill>
+          <a:blip r:embed="rId3">
+            <a:extLst>
+              <a:ext uri="{28A0092B-C50C-407E-A947-70E740481C1C}">
+                <a14:useLocalDpi xmlns:a14="http://schemas.microsoft.com/office/drawing/2010/main" val="0"/>
+              </a:ext>
+            </a:extLst>
+          </a:blip>
+          <a:srcRect/>
+          <a:stretch>
+            <a:fillRect/>
+          </a:stretch>
+        </p:blipFill>
+        <p:spPr bwMode="auto">
+          <a:xfrm>
+            <a:off x="3347864" y="2142281"/>
+            <a:ext cx="838200" cy="619125"/>
+          </a:xfrm>
+          <a:prstGeom prst="rect">
+            <a:avLst/>
+          </a:prstGeom>
+          <a:noFill/>
+          <a:extLst>
+            <a:ext uri="{909E8E84-426E-40DD-AFC4-6F175D3DCCD1}">
+              <a14:hiddenFill xmlns:a14="http://schemas.microsoft.com/office/drawing/2010/main">
+                <a:solidFill>
+                  <a:srgbClr val="FFFFFF"/>
+                </a:solidFill>
+              </a14:hiddenFill>
+            </a:ext>
+          </a:extLst>
+        </p:spPr>
+      </p:pic>
+    </p:spTree>
+    <p:extLst>
+      <p:ext uri="{BB962C8B-B14F-4D97-AF65-F5344CB8AC3E}">
+        <p14:creationId xmlns:p14="http://schemas.microsoft.com/office/powerpoint/2010/main" val="1708588299"/>
+      </p:ext>
+    </p:extLst>
+  </p:cSld>
+  <p:clrMapOvr>
+    <a:masterClrMapping/>
+  </p:clrMapOvr>
+</p:sld>
+</file>
+
+<file path=ppt/slides/slide6.xml><?xml version="1.0" encoding="utf-8"?>
+<p:sld xmlns:a="http://schemas.openxmlformats.org/drawingml/2006/main" xmlns:r="http://schemas.openxmlformats.org/officeDocument/2006/relationships" xmlns:p="http://schemas.openxmlformats.org/presentationml/2006/main">
+  <p:cSld>
+    <p:spTree>
+      <p:nvGrpSpPr>
+        <p:cNvPr id="1" name=""/>
+        <p:cNvGrpSpPr/>
+        <p:nvPr/>
+      </p:nvGrpSpPr>
+      <p:grpSpPr>
+        <a:xfrm>
+          <a:off x="0" y="0"/>
+          <a:ext cx="0" cy="0"/>
+          <a:chOff x="0" y="0"/>
+          <a:chExt cx="0" cy="0"/>
+        </a:xfrm>
+      </p:grpSpPr>
+      <p:sp>
+        <p:nvSpPr>
+          <p:cNvPr id="3" name="Content Placeholder 2"/>
+          <p:cNvSpPr>
+            <a:spLocks noGrp="1"/>
+          </p:cNvSpPr>
+          <p:nvPr>
+            <p:ph idx="1"/>
+          </p:nvPr>
+        </p:nvSpPr>
+        <p:spPr/>
+        <p:txBody>
+          <a:bodyPr/>
+          <a:lstStyle/>
+          <a:p>
+            <a:r>
+              <a:rPr lang="en-GB" dirty="0" smtClean="0"/>
+              <a:t>Introduction of </a:t>
+            </a:r>
+            <a:r>
+              <a:rPr lang="en-GB" dirty="0" err="1" smtClean="0"/>
+              <a:t>Stochasticity</a:t>
+            </a:r>
+            <a:endParaRPr lang="en-GB" dirty="0" smtClean="0"/>
+          </a:p>
+          <a:p>
+            <a:pPr lvl="1"/>
+            <a:r>
+              <a:rPr lang="en-GB" dirty="0" smtClean="0"/>
+              <a:t>In both </a:t>
+            </a:r>
+            <a:r>
+              <a:rPr lang="en-GB" dirty="0" err="1" smtClean="0"/>
+              <a:t>Matlab</a:t>
+            </a:r>
+            <a:r>
+              <a:rPr lang="en-GB" dirty="0" smtClean="0"/>
+              <a:t> (Owen) and C++ </a:t>
+            </a:r>
+            <a:r>
+              <a:rPr lang="en-GB" dirty="0" err="1" smtClean="0"/>
+              <a:t>Mex</a:t>
+            </a:r>
+            <a:r>
+              <a:rPr lang="en-GB" dirty="0" smtClean="0"/>
+              <a:t> Files (</a:t>
+            </a:r>
+            <a:r>
+              <a:rPr lang="en-GB" dirty="0" err="1" smtClean="0"/>
+              <a:t>Malte</a:t>
+            </a:r>
+            <a:r>
+              <a:rPr lang="en-GB" dirty="0" smtClean="0"/>
+              <a:t>)</a:t>
+            </a:r>
+          </a:p>
+          <a:p>
+            <a:r>
+              <a:rPr lang="en-GB" dirty="0" smtClean="0"/>
+              <a:t>Addition of Drug Response</a:t>
+            </a:r>
+          </a:p>
+          <a:p>
+            <a:pPr lvl="1"/>
+            <a:r>
+              <a:rPr lang="en-GB" dirty="0" smtClean="0"/>
+              <a:t>Will, </a:t>
+            </a:r>
+            <a:r>
+              <a:rPr lang="en-GB" dirty="0" err="1" smtClean="0"/>
+              <a:t>Antonietta</a:t>
+            </a:r>
+            <a:endParaRPr lang="en-GB" dirty="0" smtClean="0"/>
+          </a:p>
+          <a:p>
+            <a:r>
+              <a:rPr lang="en-GB" dirty="0" smtClean="0"/>
+              <a:t>Refinement of Biological Accuracy of Model</a:t>
+            </a:r>
+          </a:p>
+          <a:p>
+            <a:pPr lvl="1"/>
+            <a:r>
+              <a:rPr lang="en-GB" dirty="0" smtClean="0"/>
+              <a:t>Jin</a:t>
+            </a:r>
+          </a:p>
+          <a:p>
+            <a:r>
+              <a:rPr lang="en-GB" dirty="0" smtClean="0"/>
+              <a:t>Incorporation of new features into GUI</a:t>
+            </a:r>
+            <a:endParaRPr lang="en-GB" dirty="0"/>
+          </a:p>
+        </p:txBody>
+      </p:sp>
+      <p:sp>
+        <p:nvSpPr>
+          <p:cNvPr id="2" name="Title 1"/>
+          <p:cNvSpPr>
+            <a:spLocks noGrp="1"/>
+          </p:cNvSpPr>
+          <p:nvPr>
+            <p:ph type="title"/>
+          </p:nvPr>
+        </p:nvSpPr>
+        <p:spPr/>
+        <p:txBody>
+          <a:bodyPr/>
+          <a:lstStyle/>
+          <a:p>
+            <a:r>
+              <a:rPr lang="en-GB" dirty="0" smtClean="0"/>
+              <a:t>Phase 2 Modifications</a:t>
+            </a:r>
             <a:endParaRPr lang="en-GB" dirty="0"/>
           </a:p>
         </p:txBody>
@@ -6809,6 +8883,741 @@
       </p:par>
     </p:tnLst>
   </p:timing>
+</p:sld>
+</file>
+
+<file path=ppt/slides/slide7.xml><?xml version="1.0" encoding="utf-8"?>
+<p:sld xmlns:a="http://schemas.openxmlformats.org/drawingml/2006/main" xmlns:r="http://schemas.openxmlformats.org/officeDocument/2006/relationships" xmlns:p="http://schemas.openxmlformats.org/presentationml/2006/main">
+  <p:cSld>
+    <p:spTree>
+      <p:nvGrpSpPr>
+        <p:cNvPr id="1" name=""/>
+        <p:cNvGrpSpPr/>
+        <p:nvPr/>
+      </p:nvGrpSpPr>
+      <p:grpSpPr>
+        <a:xfrm>
+          <a:off x="0" y="0"/>
+          <a:ext cx="0" cy="0"/>
+          <a:chOff x="0" y="0"/>
+          <a:chExt cx="0" cy="0"/>
+        </a:xfrm>
+      </p:grpSpPr>
+      <p:sp>
+        <p:nvSpPr>
+          <p:cNvPr id="2" name="Content Placeholder 1"/>
+          <p:cNvSpPr>
+            <a:spLocks noGrp="1"/>
+          </p:cNvSpPr>
+          <p:nvPr>
+            <p:ph idx="1"/>
+          </p:nvPr>
+        </p:nvSpPr>
+        <p:spPr>
+          <a:xfrm>
+            <a:off x="395536" y="1484784"/>
+            <a:ext cx="8229600" cy="4525963"/>
+          </a:xfrm>
+        </p:spPr>
+        <p:txBody>
+          <a:bodyPr/>
+          <a:lstStyle/>
+          <a:p>
+            <a:r>
+              <a:rPr lang="en-GB" dirty="0" smtClean="0"/>
+              <a:t>We established two points at which adding stochastic noise would be biologically justified</a:t>
+            </a:r>
+          </a:p>
+          <a:p>
+            <a:r>
+              <a:rPr lang="en-GB" dirty="0" smtClean="0"/>
+              <a:t>Production rates of virus from infected cells</a:t>
+            </a:r>
+          </a:p>
+          <a:p>
+            <a:pPr lvl="1"/>
+            <a:r>
+              <a:rPr lang="en-GB" dirty="0" smtClean="0"/>
+              <a:t>Variation in burst size is known to be significant (Mitchell et al. 2011)</a:t>
+            </a:r>
+          </a:p>
+          <a:p>
+            <a:r>
+              <a:rPr lang="en-GB" dirty="0" smtClean="0"/>
+              <a:t>Affinity Maturation process will be stochastic in nature</a:t>
+            </a:r>
+          </a:p>
+          <a:p>
+            <a:pPr lvl="1"/>
+            <a:r>
+              <a:rPr lang="en-GB" dirty="0" smtClean="0"/>
+              <a:t>Selection of most successful antibody from series of candidates (</a:t>
+            </a:r>
+            <a:r>
+              <a:rPr lang="en-GB" dirty="0" err="1" smtClean="0"/>
+              <a:t>Grimaldi</a:t>
+            </a:r>
+            <a:r>
+              <a:rPr lang="en-GB" dirty="0" smtClean="0"/>
+              <a:t> et al. 2005)</a:t>
+            </a:r>
+          </a:p>
+        </p:txBody>
+      </p:sp>
+      <p:sp>
+        <p:nvSpPr>
+          <p:cNvPr id="3" name="Title 2"/>
+          <p:cNvSpPr>
+            <a:spLocks noGrp="1"/>
+          </p:cNvSpPr>
+          <p:nvPr>
+            <p:ph type="title"/>
+          </p:nvPr>
+        </p:nvSpPr>
+        <p:spPr/>
+        <p:txBody>
+          <a:bodyPr>
+            <a:normAutofit/>
+          </a:bodyPr>
+          <a:lstStyle/>
+          <a:p>
+            <a:r>
+              <a:rPr lang="en-GB" dirty="0" smtClean="0"/>
+              <a:t>Stochastic modelling</a:t>
+            </a:r>
+            <a:endParaRPr lang="en-GB" dirty="0"/>
+          </a:p>
+        </p:txBody>
+      </p:sp>
+      <p:sp>
+        <p:nvSpPr>
+          <p:cNvPr id="4" name="Slide Number Placeholder 3"/>
+          <p:cNvSpPr>
+            <a:spLocks noGrp="1"/>
+          </p:cNvSpPr>
+          <p:nvPr>
+            <p:ph type="sldNum" sz="quarter" idx="4"/>
+          </p:nvPr>
+        </p:nvSpPr>
+        <p:spPr/>
+        <p:txBody>
+          <a:bodyPr/>
+          <a:lstStyle/>
+          <a:p>
+            <a:fld id="{57E314E1-448B-4E82-884A-39F65482640B}" type="slidenum">
+              <a:rPr lang="en-GB" smtClean="0"/>
+              <a:t>7</a:t>
+            </a:fld>
+            <a:endParaRPr lang="en-GB" dirty="0"/>
+          </a:p>
+        </p:txBody>
+      </p:sp>
+    </p:spTree>
+    <p:extLst>
+      <p:ext uri="{BB962C8B-B14F-4D97-AF65-F5344CB8AC3E}">
+        <p14:creationId xmlns:p14="http://schemas.microsoft.com/office/powerpoint/2010/main" val="829547771"/>
+      </p:ext>
+    </p:extLst>
+  </p:cSld>
+  <p:clrMapOvr>
+    <a:masterClrMapping/>
+  </p:clrMapOvr>
+</p:sld>
+</file>
+
+<file path=ppt/slides/slide8.xml><?xml version="1.0" encoding="utf-8"?>
+<p:sld xmlns:a="http://schemas.openxmlformats.org/drawingml/2006/main" xmlns:r="http://schemas.openxmlformats.org/officeDocument/2006/relationships" xmlns:p="http://schemas.openxmlformats.org/presentationml/2006/main">
+  <p:cSld>
+    <p:spTree>
+      <p:nvGrpSpPr>
+        <p:cNvPr id="1" name=""/>
+        <p:cNvGrpSpPr/>
+        <p:nvPr/>
+      </p:nvGrpSpPr>
+      <p:grpSpPr>
+        <a:xfrm>
+          <a:off x="0" y="0"/>
+          <a:ext cx="0" cy="0"/>
+          <a:chOff x="0" y="0"/>
+          <a:chExt cx="0" cy="0"/>
+        </a:xfrm>
+      </p:grpSpPr>
+      <p:sp>
+        <p:nvSpPr>
+          <p:cNvPr id="2" name="Content Placeholder 1"/>
+          <p:cNvSpPr>
+            <a:spLocks noGrp="1"/>
+          </p:cNvSpPr>
+          <p:nvPr>
+            <p:ph idx="1"/>
+          </p:nvPr>
+        </p:nvSpPr>
+        <p:spPr>
+          <a:xfrm>
+            <a:off x="395536" y="1484784"/>
+            <a:ext cx="8229600" cy="4525963"/>
+          </a:xfrm>
+        </p:spPr>
+        <p:txBody>
+          <a:bodyPr>
+            <a:normAutofit fontScale="92500" lnSpcReduction="10000"/>
+          </a:bodyPr>
+          <a:lstStyle/>
+          <a:p>
+            <a:r>
+              <a:rPr lang="en-GB" dirty="0" smtClean="0"/>
+              <a:t>Add noise into population ODE</a:t>
+            </a:r>
+          </a:p>
+          <a:p>
+            <a:pPr marL="109728" indent="0">
+              <a:buNone/>
+            </a:pPr>
+            <a:endParaRPr lang="en-GB" dirty="0" smtClean="0"/>
+          </a:p>
+          <a:p>
+            <a:pPr marL="109728" indent="0">
+              <a:buNone/>
+            </a:pPr>
+            <a:endParaRPr lang="en-GB" dirty="0"/>
+          </a:p>
+          <a:p>
+            <a:r>
+              <a:rPr lang="en-GB" dirty="0" smtClean="0"/>
+              <a:t>Adapt Euler method to give Euler-Maruyama method</a:t>
+            </a:r>
+          </a:p>
+          <a:p>
+            <a:endParaRPr lang="en-GB" dirty="0" smtClean="0"/>
+          </a:p>
+          <a:p>
+            <a:endParaRPr lang="en-GB" dirty="0"/>
+          </a:p>
+          <a:p>
+            <a:endParaRPr lang="en-GB" dirty="0" smtClean="0"/>
+          </a:p>
+          <a:p>
+            <a:r>
+              <a:rPr lang="en-GB" dirty="0" smtClean="0"/>
+              <a:t>f(X) is the “drift function”</a:t>
+            </a:r>
+          </a:p>
+          <a:p>
+            <a:r>
+              <a:rPr lang="en-GB" dirty="0" smtClean="0"/>
+              <a:t>G(X) the “diffusion function”</a:t>
+            </a:r>
+          </a:p>
+          <a:p>
+            <a:r>
+              <a:rPr lang="en-GB" dirty="0" err="1"/>
+              <a:t>δ</a:t>
+            </a:r>
+            <a:r>
+              <a:rPr lang="en-GB" dirty="0" err="1" smtClean="0"/>
+              <a:t>t</a:t>
+            </a:r>
+            <a:r>
+              <a:rPr lang="en-GB" dirty="0" smtClean="0"/>
+              <a:t> is the </a:t>
+            </a:r>
+            <a:r>
+              <a:rPr lang="en-GB" dirty="0" err="1" smtClean="0"/>
+              <a:t>timestep</a:t>
+            </a:r>
+            <a:endParaRPr lang="en-GB" dirty="0" smtClean="0"/>
+          </a:p>
+        </p:txBody>
+      </p:sp>
+      <p:sp>
+        <p:nvSpPr>
+          <p:cNvPr id="3" name="Title 2"/>
+          <p:cNvSpPr>
+            <a:spLocks noGrp="1"/>
+          </p:cNvSpPr>
+          <p:nvPr>
+            <p:ph type="title"/>
+          </p:nvPr>
+        </p:nvSpPr>
+        <p:spPr/>
+        <p:txBody>
+          <a:bodyPr>
+            <a:normAutofit/>
+          </a:bodyPr>
+          <a:lstStyle/>
+          <a:p>
+            <a:r>
+              <a:rPr lang="en-GB" dirty="0" smtClean="0"/>
+              <a:t>Adding noise to populations</a:t>
+            </a:r>
+            <a:endParaRPr lang="en-GB" dirty="0"/>
+          </a:p>
+        </p:txBody>
+      </p:sp>
+      <p:sp>
+        <p:nvSpPr>
+          <p:cNvPr id="4" name="Slide Number Placeholder 3"/>
+          <p:cNvSpPr>
+            <a:spLocks noGrp="1"/>
+          </p:cNvSpPr>
+          <p:nvPr>
+            <p:ph type="sldNum" sz="quarter" idx="4"/>
+          </p:nvPr>
+        </p:nvSpPr>
+        <p:spPr/>
+        <p:txBody>
+          <a:bodyPr/>
+          <a:lstStyle/>
+          <a:p>
+            <a:fld id="{57E314E1-448B-4E82-884A-39F65482640B}" type="slidenum">
+              <a:rPr lang="en-GB" smtClean="0"/>
+              <a:t>8</a:t>
+            </a:fld>
+            <a:endParaRPr lang="en-GB" dirty="0"/>
+          </a:p>
+        </p:txBody>
+      </p:sp>
+      <p:pic>
+        <p:nvPicPr>
+          <p:cNvPr id="1027" name="Picture 3"/>
+          <p:cNvPicPr>
+            <a:picLocks noChangeAspect="1" noChangeArrowheads="1"/>
+          </p:cNvPicPr>
+          <p:nvPr/>
+        </p:nvPicPr>
+        <p:blipFill>
+          <a:blip r:embed="rId2">
+            <a:extLst>
+              <a:ext uri="{28A0092B-C50C-407E-A947-70E740481C1C}">
+                <a14:useLocalDpi xmlns:a14="http://schemas.microsoft.com/office/drawing/2010/main" val="0"/>
+              </a:ext>
+            </a:extLst>
+          </a:blip>
+          <a:srcRect/>
+          <a:stretch>
+            <a:fillRect/>
+          </a:stretch>
+        </p:blipFill>
+        <p:spPr bwMode="auto">
+          <a:xfrm>
+            <a:off x="587637" y="3374236"/>
+            <a:ext cx="7571551" cy="611398"/>
+          </a:xfrm>
+          <a:prstGeom prst="rect">
+            <a:avLst/>
+          </a:prstGeom>
+          <a:noFill/>
+          <a:ln>
+            <a:noFill/>
+          </a:ln>
+          <a:effectLst/>
+          <a:extLst>
+            <a:ext uri="{909E8E84-426E-40DD-AFC4-6F175D3DCCD1}">
+              <a14:hiddenFill xmlns:a14="http://schemas.microsoft.com/office/drawing/2010/main">
+                <a:solidFill>
+                  <a:schemeClr val="accent1"/>
+                </a:solidFill>
+              </a14:hiddenFill>
+            </a:ext>
+            <a:ext uri="{91240B29-F687-4F45-9708-019B960494DF}">
+              <a14:hiddenLine xmlns:a14="http://schemas.microsoft.com/office/drawing/2010/main" w="9525">
+                <a:solidFill>
+                  <a:schemeClr val="tx1"/>
+                </a:solidFill>
+                <a:miter lim="800000"/>
+                <a:headEnd/>
+                <a:tailEnd/>
+              </a14:hiddenLine>
+            </a:ext>
+            <a:ext uri="{AF507438-7753-43E0-B8FC-AC1667EBCBE1}">
+              <a14:hiddenEffects xmlns:a14="http://schemas.microsoft.com/office/drawing/2010/main">
+                <a:effectLst>
+                  <a:outerShdw dist="35921" dir="2700000" algn="ctr" rotWithShape="0">
+                    <a:schemeClr val="bg2"/>
+                  </a:outerShdw>
+                </a:effectLst>
+              </a14:hiddenEffects>
+            </a:ext>
+          </a:extLst>
+        </p:spPr>
+      </p:pic>
+      <p:pic>
+        <p:nvPicPr>
+          <p:cNvPr id="2050" name="Picture 2"/>
+          <p:cNvPicPr>
+            <a:picLocks noChangeAspect="1" noChangeArrowheads="1"/>
+          </p:cNvPicPr>
+          <p:nvPr/>
+        </p:nvPicPr>
+        <p:blipFill>
+          <a:blip r:embed="rId3">
+            <a:extLst>
+              <a:ext uri="{28A0092B-C50C-407E-A947-70E740481C1C}">
+                <a14:useLocalDpi xmlns:a14="http://schemas.microsoft.com/office/drawing/2010/main" val="0"/>
+              </a:ext>
+            </a:extLst>
+          </a:blip>
+          <a:srcRect/>
+          <a:stretch>
+            <a:fillRect/>
+          </a:stretch>
+        </p:blipFill>
+        <p:spPr bwMode="auto">
+          <a:xfrm>
+            <a:off x="2483768" y="1797240"/>
+            <a:ext cx="3437381" cy="890353"/>
+          </a:xfrm>
+          <a:prstGeom prst="rect">
+            <a:avLst/>
+          </a:prstGeom>
+          <a:noFill/>
+          <a:ln>
+            <a:noFill/>
+          </a:ln>
+          <a:effectLst/>
+          <a:extLst>
+            <a:ext uri="{909E8E84-426E-40DD-AFC4-6F175D3DCCD1}">
+              <a14:hiddenFill xmlns:a14="http://schemas.microsoft.com/office/drawing/2010/main">
+                <a:solidFill>
+                  <a:schemeClr val="accent1"/>
+                </a:solidFill>
+              </a14:hiddenFill>
+            </a:ext>
+            <a:ext uri="{91240B29-F687-4F45-9708-019B960494DF}">
+              <a14:hiddenLine xmlns:a14="http://schemas.microsoft.com/office/drawing/2010/main" w="9525">
+                <a:solidFill>
+                  <a:schemeClr val="tx1"/>
+                </a:solidFill>
+                <a:miter lim="800000"/>
+                <a:headEnd/>
+                <a:tailEnd/>
+              </a14:hiddenLine>
+            </a:ext>
+            <a:ext uri="{AF507438-7753-43E0-B8FC-AC1667EBCBE1}">
+              <a14:hiddenEffects xmlns:a14="http://schemas.microsoft.com/office/drawing/2010/main">
+                <a:effectLst>
+                  <a:outerShdw dist="35921" dir="2700000" algn="ctr" rotWithShape="0">
+                    <a:schemeClr val="bg2"/>
+                  </a:outerShdw>
+                </a:effectLst>
+              </a14:hiddenEffects>
+            </a:ext>
+          </a:extLst>
+        </p:spPr>
+      </p:pic>
+      <p:pic>
+        <p:nvPicPr>
+          <p:cNvPr id="2051" name="Picture 3"/>
+          <p:cNvPicPr>
+            <a:picLocks noChangeAspect="1" noChangeArrowheads="1"/>
+          </p:cNvPicPr>
+          <p:nvPr/>
+        </p:nvPicPr>
+        <p:blipFill>
+          <a:blip r:embed="rId4">
+            <a:extLst>
+              <a:ext uri="{28A0092B-C50C-407E-A947-70E740481C1C}">
+                <a14:useLocalDpi xmlns:a14="http://schemas.microsoft.com/office/drawing/2010/main" val="0"/>
+              </a:ext>
+            </a:extLst>
+          </a:blip>
+          <a:srcRect/>
+          <a:stretch>
+            <a:fillRect/>
+          </a:stretch>
+        </p:blipFill>
+        <p:spPr bwMode="auto">
+          <a:xfrm>
+            <a:off x="2485322" y="3985634"/>
+            <a:ext cx="3202310" cy="500896"/>
+          </a:xfrm>
+          <a:prstGeom prst="rect">
+            <a:avLst/>
+          </a:prstGeom>
+          <a:noFill/>
+          <a:ln>
+            <a:noFill/>
+          </a:ln>
+          <a:effectLst/>
+          <a:extLst>
+            <a:ext uri="{909E8E84-426E-40DD-AFC4-6F175D3DCCD1}">
+              <a14:hiddenFill xmlns:a14="http://schemas.microsoft.com/office/drawing/2010/main">
+                <a:solidFill>
+                  <a:schemeClr val="accent1"/>
+                </a:solidFill>
+              </a14:hiddenFill>
+            </a:ext>
+            <a:ext uri="{91240B29-F687-4F45-9708-019B960494DF}">
+              <a14:hiddenLine xmlns:a14="http://schemas.microsoft.com/office/drawing/2010/main" w="9525">
+                <a:solidFill>
+                  <a:schemeClr val="tx1"/>
+                </a:solidFill>
+                <a:miter lim="800000"/>
+                <a:headEnd/>
+                <a:tailEnd/>
+              </a14:hiddenLine>
+            </a:ext>
+            <a:ext uri="{AF507438-7753-43E0-B8FC-AC1667EBCBE1}">
+              <a14:hiddenEffects xmlns:a14="http://schemas.microsoft.com/office/drawing/2010/main">
+                <a:effectLst>
+                  <a:outerShdw dist="35921" dir="2700000" algn="ctr" rotWithShape="0">
+                    <a:schemeClr val="bg2"/>
+                  </a:outerShdw>
+                </a:effectLst>
+              </a14:hiddenEffects>
+            </a:ext>
+          </a:extLst>
+        </p:spPr>
+      </p:pic>
+    </p:spTree>
+    <p:extLst>
+      <p:ext uri="{BB962C8B-B14F-4D97-AF65-F5344CB8AC3E}">
+        <p14:creationId xmlns:p14="http://schemas.microsoft.com/office/powerpoint/2010/main" val="1204785620"/>
+      </p:ext>
+    </p:extLst>
+  </p:cSld>
+  <p:clrMapOvr>
+    <a:masterClrMapping/>
+  </p:clrMapOvr>
+</p:sld>
+</file>
+
+<file path=ppt/slides/slide9.xml><?xml version="1.0" encoding="utf-8"?>
+<p:sld xmlns:a="http://schemas.openxmlformats.org/drawingml/2006/main" xmlns:r="http://schemas.openxmlformats.org/officeDocument/2006/relationships" xmlns:p="http://schemas.openxmlformats.org/presentationml/2006/main">
+  <p:cSld>
+    <p:spTree>
+      <p:nvGrpSpPr>
+        <p:cNvPr id="1" name=""/>
+        <p:cNvGrpSpPr/>
+        <p:nvPr/>
+      </p:nvGrpSpPr>
+      <p:grpSpPr>
+        <a:xfrm>
+          <a:off x="0" y="0"/>
+          <a:ext cx="0" cy="0"/>
+          <a:chOff x="0" y="0"/>
+          <a:chExt cx="0" cy="0"/>
+        </a:xfrm>
+      </p:grpSpPr>
+      <p:sp>
+        <p:nvSpPr>
+          <p:cNvPr id="2" name="Content Placeholder 1"/>
+          <p:cNvSpPr>
+            <a:spLocks noGrp="1"/>
+          </p:cNvSpPr>
+          <p:nvPr>
+            <p:ph idx="1"/>
+          </p:nvPr>
+        </p:nvSpPr>
+        <p:spPr/>
+        <p:txBody>
+          <a:bodyPr/>
+          <a:lstStyle/>
+          <a:p>
+            <a:r>
+              <a:rPr lang="en-GB" dirty="0" smtClean="0"/>
+              <a:t>Alternatively, we can add noise to specific processes</a:t>
+            </a:r>
+          </a:p>
+          <a:p>
+            <a:r>
+              <a:rPr lang="en-GB" dirty="0" smtClean="0"/>
+              <a:t>This demands adding of noise functions within the drift function f(X)</a:t>
+            </a:r>
+          </a:p>
+          <a:p>
+            <a:r>
+              <a:rPr lang="en-GB" dirty="0" smtClean="0"/>
+              <a:t>We can adapt regular ODE solver:</a:t>
+            </a:r>
+            <a:endParaRPr lang="en-GB" dirty="0"/>
+          </a:p>
+        </p:txBody>
+      </p:sp>
+      <p:sp>
+        <p:nvSpPr>
+          <p:cNvPr id="3" name="Title 2"/>
+          <p:cNvSpPr>
+            <a:spLocks noGrp="1"/>
+          </p:cNvSpPr>
+          <p:nvPr>
+            <p:ph type="title"/>
+          </p:nvPr>
+        </p:nvSpPr>
+        <p:spPr/>
+        <p:txBody>
+          <a:bodyPr/>
+          <a:lstStyle/>
+          <a:p>
+            <a:r>
+              <a:rPr lang="en-GB" dirty="0" smtClean="0"/>
+              <a:t>Adding noise to rates</a:t>
+            </a:r>
+            <a:endParaRPr lang="en-GB" dirty="0"/>
+          </a:p>
+        </p:txBody>
+      </p:sp>
+      <p:sp>
+        <p:nvSpPr>
+          <p:cNvPr id="4" name="Slide Number Placeholder 3"/>
+          <p:cNvSpPr>
+            <a:spLocks noGrp="1"/>
+          </p:cNvSpPr>
+          <p:nvPr>
+            <p:ph type="sldNum" sz="quarter" idx="4"/>
+          </p:nvPr>
+        </p:nvSpPr>
+        <p:spPr/>
+        <p:txBody>
+          <a:bodyPr/>
+          <a:lstStyle/>
+          <a:p>
+            <a:fld id="{57E314E1-448B-4E82-884A-39F65482640B}" type="slidenum">
+              <a:rPr lang="en-GB" smtClean="0"/>
+              <a:t>9</a:t>
+            </a:fld>
+            <a:endParaRPr lang="en-GB" dirty="0"/>
+          </a:p>
+        </p:txBody>
+      </p:sp>
+      <p:pic>
+        <p:nvPicPr>
+          <p:cNvPr id="3074" name="Picture 2"/>
+          <p:cNvPicPr>
+            <a:picLocks noChangeAspect="1" noChangeArrowheads="1"/>
+          </p:cNvPicPr>
+          <p:nvPr/>
+        </p:nvPicPr>
+        <p:blipFill>
+          <a:blip r:embed="rId2">
+            <a:extLst>
+              <a:ext uri="{28A0092B-C50C-407E-A947-70E740481C1C}">
+                <a14:useLocalDpi xmlns:a14="http://schemas.microsoft.com/office/drawing/2010/main" val="0"/>
+              </a:ext>
+            </a:extLst>
+          </a:blip>
+          <a:srcRect/>
+          <a:stretch>
+            <a:fillRect/>
+          </a:stretch>
+        </p:blipFill>
+        <p:spPr bwMode="auto">
+          <a:xfrm>
+            <a:off x="1907704" y="3696116"/>
+            <a:ext cx="4905375" cy="581025"/>
+          </a:xfrm>
+          <a:prstGeom prst="rect">
+            <a:avLst/>
+          </a:prstGeom>
+          <a:noFill/>
+          <a:ln>
+            <a:noFill/>
+          </a:ln>
+          <a:effectLst/>
+          <a:extLst>
+            <a:ext uri="{909E8E84-426E-40DD-AFC4-6F175D3DCCD1}">
+              <a14:hiddenFill xmlns:a14="http://schemas.microsoft.com/office/drawing/2010/main">
+                <a:solidFill>
+                  <a:schemeClr val="accent1"/>
+                </a:solidFill>
+              </a14:hiddenFill>
+            </a:ext>
+            <a:ext uri="{91240B29-F687-4F45-9708-019B960494DF}">
+              <a14:hiddenLine xmlns:a14="http://schemas.microsoft.com/office/drawing/2010/main" w="9525">
+                <a:solidFill>
+                  <a:schemeClr val="tx1"/>
+                </a:solidFill>
+                <a:miter lim="800000"/>
+                <a:headEnd/>
+                <a:tailEnd/>
+              </a14:hiddenLine>
+            </a:ext>
+            <a:ext uri="{AF507438-7753-43E0-B8FC-AC1667EBCBE1}">
+              <a14:hiddenEffects xmlns:a14="http://schemas.microsoft.com/office/drawing/2010/main">
+                <a:effectLst>
+                  <a:outerShdw dist="35921" dir="2700000" algn="ctr" rotWithShape="0">
+                    <a:schemeClr val="bg2"/>
+                  </a:outerShdw>
+                </a:effectLst>
+              </a14:hiddenEffects>
+            </a:ext>
+          </a:extLst>
+        </p:spPr>
+      </p:pic>
+      <p:pic>
+        <p:nvPicPr>
+          <p:cNvPr id="3077" name="Picture 5"/>
+          <p:cNvPicPr>
+            <a:picLocks noChangeAspect="1" noChangeArrowheads="1"/>
+          </p:cNvPicPr>
+          <p:nvPr/>
+        </p:nvPicPr>
+        <p:blipFill>
+          <a:blip r:embed="rId3">
+            <a:extLst>
+              <a:ext uri="{28A0092B-C50C-407E-A947-70E740481C1C}">
+                <a14:useLocalDpi xmlns:a14="http://schemas.microsoft.com/office/drawing/2010/main" val="0"/>
+              </a:ext>
+            </a:extLst>
+          </a:blip>
+          <a:srcRect/>
+          <a:stretch>
+            <a:fillRect/>
+          </a:stretch>
+        </p:blipFill>
+        <p:spPr bwMode="auto">
+          <a:xfrm>
+            <a:off x="1337636" y="4437112"/>
+            <a:ext cx="6045509" cy="509294"/>
+          </a:xfrm>
+          <a:prstGeom prst="rect">
+            <a:avLst/>
+          </a:prstGeom>
+          <a:noFill/>
+          <a:ln>
+            <a:noFill/>
+          </a:ln>
+          <a:effectLst/>
+          <a:extLst>
+            <a:ext uri="{909E8E84-426E-40DD-AFC4-6F175D3DCCD1}">
+              <a14:hiddenFill xmlns:a14="http://schemas.microsoft.com/office/drawing/2010/main">
+                <a:solidFill>
+                  <a:schemeClr val="accent1"/>
+                </a:solidFill>
+              </a14:hiddenFill>
+            </a:ext>
+            <a:ext uri="{91240B29-F687-4F45-9708-019B960494DF}">
+              <a14:hiddenLine xmlns:a14="http://schemas.microsoft.com/office/drawing/2010/main" w="9525">
+                <a:solidFill>
+                  <a:schemeClr val="tx1"/>
+                </a:solidFill>
+                <a:miter lim="800000"/>
+                <a:headEnd/>
+                <a:tailEnd/>
+              </a14:hiddenLine>
+            </a:ext>
+            <a:ext uri="{AF507438-7753-43E0-B8FC-AC1667EBCBE1}">
+              <a14:hiddenEffects xmlns:a14="http://schemas.microsoft.com/office/drawing/2010/main">
+                <a:effectLst>
+                  <a:outerShdw dist="35921" dir="2700000" algn="ctr" rotWithShape="0">
+                    <a:schemeClr val="bg2"/>
+                  </a:outerShdw>
+                </a:effectLst>
+              </a14:hiddenEffects>
+            </a:ext>
+          </a:extLst>
+        </p:spPr>
+      </p:pic>
+    </p:spTree>
+    <p:extLst>
+      <p:ext uri="{BB962C8B-B14F-4D97-AF65-F5344CB8AC3E}">
+        <p14:creationId xmlns:p14="http://schemas.microsoft.com/office/powerpoint/2010/main" val="3254139937"/>
+      </p:ext>
+    </p:extLst>
+  </p:cSld>
+  <p:clrMapOvr>
+    <a:masterClrMapping/>
+  </p:clrMapOvr>
 </p:sld>
 </file>
 

</xml_diff>

<commit_message>
Added Drugs section to Phase 2 ppt
</commit_message>
<xml_diff>
--- a/Presentation.pptx
+++ b/Presentation.pptx
@@ -5,7 +5,7 @@
     <p:sldMasterId id="2147483660" r:id="rId1"/>
   </p:sldMasterIdLst>
   <p:notesMasterIdLst>
-    <p:notesMasterId r:id="rId15"/>
+    <p:notesMasterId r:id="rId20"/>
   </p:notesMasterIdLst>
   <p:sldIdLst>
     <p:sldId id="256" r:id="rId2"/>
@@ -14,13 +14,18 @@
     <p:sldId id="259" r:id="rId5"/>
     <p:sldId id="260" r:id="rId6"/>
     <p:sldId id="257" r:id="rId7"/>
-    <p:sldId id="258" r:id="rId8"/>
-    <p:sldId id="265" r:id="rId9"/>
-    <p:sldId id="266" r:id="rId10"/>
-    <p:sldId id="267" r:id="rId11"/>
-    <p:sldId id="268" r:id="rId12"/>
-    <p:sldId id="269" r:id="rId13"/>
-    <p:sldId id="270" r:id="rId14"/>
+    <p:sldId id="275" r:id="rId8"/>
+    <p:sldId id="258" r:id="rId9"/>
+    <p:sldId id="265" r:id="rId10"/>
+    <p:sldId id="266" r:id="rId11"/>
+    <p:sldId id="267" r:id="rId12"/>
+    <p:sldId id="268" r:id="rId13"/>
+    <p:sldId id="269" r:id="rId14"/>
+    <p:sldId id="270" r:id="rId15"/>
+    <p:sldId id="271" r:id="rId16"/>
+    <p:sldId id="272" r:id="rId17"/>
+    <p:sldId id="273" r:id="rId18"/>
+    <p:sldId id="274" r:id="rId19"/>
   </p:sldIdLst>
   <p:sldSz cx="9144000" cy="6858000" type="screen4x3"/>
   <p:notesSz cx="6858000" cy="9144000"/>
@@ -470,6 +475,190 @@
     </a:lvl9pPr>
   </p:notesStyle>
 </p:notesMaster>
+</file>
+
+<file path=ppt/notesSlides/notesSlide1.xml><?xml version="1.0" encoding="utf-8"?>
+<p:notes xmlns:a="http://schemas.openxmlformats.org/drawingml/2006/main" xmlns:r="http://schemas.openxmlformats.org/officeDocument/2006/relationships" xmlns:p="http://schemas.openxmlformats.org/presentationml/2006/main">
+  <p:cSld>
+    <p:spTree>
+      <p:nvGrpSpPr>
+        <p:cNvPr id="1" name=""/>
+        <p:cNvGrpSpPr/>
+        <p:nvPr/>
+      </p:nvGrpSpPr>
+      <p:grpSpPr>
+        <a:xfrm>
+          <a:off x="0" y="0"/>
+          <a:ext cx="0" cy="0"/>
+          <a:chOff x="0" y="0"/>
+          <a:chExt cx="0" cy="0"/>
+        </a:xfrm>
+      </p:grpSpPr>
+      <p:sp>
+        <p:nvSpPr>
+          <p:cNvPr id="2" name="Slide Image Placeholder 1"/>
+          <p:cNvSpPr>
+            <a:spLocks noGrp="1" noRot="1" noChangeAspect="1"/>
+          </p:cNvSpPr>
+          <p:nvPr>
+            <p:ph type="sldImg"/>
+          </p:nvPr>
+        </p:nvSpPr>
+        <p:spPr/>
+      </p:sp>
+      <p:sp>
+        <p:nvSpPr>
+          <p:cNvPr id="3" name="Notes Placeholder 2"/>
+          <p:cNvSpPr>
+            <a:spLocks noGrp="1"/>
+          </p:cNvSpPr>
+          <p:nvPr>
+            <p:ph type="body" idx="1"/>
+          </p:nvPr>
+        </p:nvSpPr>
+        <p:spPr/>
+        <p:txBody>
+          <a:bodyPr/>
+          <a:lstStyle/>
+          <a:p>
+            <a:r>
+              <a:rPr lang="en-GB" dirty="0" smtClean="0"/>
+              <a:t>The question</a:t>
+            </a:r>
+            <a:r>
+              <a:rPr lang="en-GB" baseline="0" dirty="0" smtClean="0"/>
+              <a:t> here is how to represent the change in drug concentration as a function of time. The drug is moving in to the tissues from the bloodstream, having been converted into its active form in the liver. Simultaneously, the drug is being </a:t>
+            </a:r>
+            <a:r>
+              <a:rPr lang="en-GB" i="1" baseline="0" dirty="0" smtClean="0"/>
+              <a:t>removed</a:t>
+            </a:r>
+            <a:r>
+              <a:rPr lang="en-GB" i="0" baseline="0" dirty="0" smtClean="0"/>
+              <a:t> from the bloodstream by the kidneys. The balance of the two effects tends to produce a characteristic profile – fast influx followed by slow, exponential purge.</a:t>
+            </a:r>
+            <a:endParaRPr lang="en-GB" dirty="0"/>
+          </a:p>
+        </p:txBody>
+      </p:sp>
+      <p:sp>
+        <p:nvSpPr>
+          <p:cNvPr id="4" name="Slide Number Placeholder 3"/>
+          <p:cNvSpPr>
+            <a:spLocks noGrp="1"/>
+          </p:cNvSpPr>
+          <p:nvPr>
+            <p:ph type="sldNum" sz="quarter" idx="10"/>
+          </p:nvPr>
+        </p:nvSpPr>
+        <p:spPr/>
+        <p:txBody>
+          <a:bodyPr/>
+          <a:lstStyle/>
+          <a:p>
+            <a:fld id="{91F5A2A5-D52E-4CCF-874A-5FF536EA40B7}" type="slidenum">
+              <a:rPr lang="en-GB" smtClean="0"/>
+              <a:t>15</a:t>
+            </a:fld>
+            <a:endParaRPr lang="en-GB"/>
+          </a:p>
+        </p:txBody>
+      </p:sp>
+    </p:spTree>
+    <p:extLst>
+      <p:ext uri="{BB962C8B-B14F-4D97-AF65-F5344CB8AC3E}">
+        <p14:creationId xmlns:p14="http://schemas.microsoft.com/office/powerpoint/2010/main" val="3751760687"/>
+      </p:ext>
+    </p:extLst>
+  </p:cSld>
+  <p:clrMapOvr>
+    <a:masterClrMapping/>
+  </p:clrMapOvr>
+</p:notes>
+</file>
+
+<file path=ppt/notesSlides/notesSlide2.xml><?xml version="1.0" encoding="utf-8"?>
+<p:notes xmlns:a="http://schemas.openxmlformats.org/drawingml/2006/main" xmlns:r="http://schemas.openxmlformats.org/officeDocument/2006/relationships" xmlns:p="http://schemas.openxmlformats.org/presentationml/2006/main">
+  <p:cSld>
+    <p:spTree>
+      <p:nvGrpSpPr>
+        <p:cNvPr id="1" name=""/>
+        <p:cNvGrpSpPr/>
+        <p:nvPr/>
+      </p:nvGrpSpPr>
+      <p:grpSpPr>
+        <a:xfrm>
+          <a:off x="0" y="0"/>
+          <a:ext cx="0" cy="0"/>
+          <a:chOff x="0" y="0"/>
+          <a:chExt cx="0" cy="0"/>
+        </a:xfrm>
+      </p:grpSpPr>
+      <p:sp>
+        <p:nvSpPr>
+          <p:cNvPr id="2" name="Slide Image Placeholder 1"/>
+          <p:cNvSpPr>
+            <a:spLocks noGrp="1" noRot="1" noChangeAspect="1"/>
+          </p:cNvSpPr>
+          <p:nvPr>
+            <p:ph type="sldImg"/>
+          </p:nvPr>
+        </p:nvSpPr>
+        <p:spPr/>
+      </p:sp>
+      <p:sp>
+        <p:nvSpPr>
+          <p:cNvPr id="3" name="Notes Placeholder 2"/>
+          <p:cNvSpPr>
+            <a:spLocks noGrp="1"/>
+          </p:cNvSpPr>
+          <p:nvPr>
+            <p:ph type="body" idx="1"/>
+          </p:nvPr>
+        </p:nvSpPr>
+        <p:spPr/>
+        <p:txBody>
+          <a:bodyPr/>
+          <a:lstStyle/>
+          <a:p>
+            <a:endParaRPr lang="en-GB" dirty="0"/>
+          </a:p>
+        </p:txBody>
+      </p:sp>
+      <p:sp>
+        <p:nvSpPr>
+          <p:cNvPr id="4" name="Slide Number Placeholder 3"/>
+          <p:cNvSpPr>
+            <a:spLocks noGrp="1"/>
+          </p:cNvSpPr>
+          <p:nvPr>
+            <p:ph type="sldNum" sz="quarter" idx="10"/>
+          </p:nvPr>
+        </p:nvSpPr>
+        <p:spPr/>
+        <p:txBody>
+          <a:bodyPr/>
+          <a:lstStyle/>
+          <a:p>
+            <a:fld id="{91F5A2A5-D52E-4CCF-874A-5FF536EA40B7}" type="slidenum">
+              <a:rPr lang="en-GB" smtClean="0"/>
+              <a:t>18</a:t>
+            </a:fld>
+            <a:endParaRPr lang="en-GB"/>
+          </a:p>
+        </p:txBody>
+      </p:sp>
+    </p:spTree>
+    <p:extLst>
+      <p:ext uri="{BB962C8B-B14F-4D97-AF65-F5344CB8AC3E}">
+        <p14:creationId xmlns:p14="http://schemas.microsoft.com/office/powerpoint/2010/main" val="2231603120"/>
+      </p:ext>
+    </p:extLst>
+  </p:cSld>
+  <p:clrMapOvr>
+    <a:masterClrMapping/>
+  </p:clrMapOvr>
+</p:notes>
 </file>
 
 <file path=ppt/slideLayouts/slideLayout1.xml><?xml version="1.0" encoding="utf-8"?>
@@ -6782,39 +6971,19 @@
           <a:p>
             <a:r>
               <a:rPr lang="en-GB" dirty="0" smtClean="0"/>
-              <a:t>These two approaches were coded into two separate solvers in </a:t>
-            </a:r>
-            <a:r>
-              <a:rPr lang="en-GB" dirty="0" err="1" smtClean="0"/>
-              <a:t>Matlab</a:t>
-            </a:r>
-            <a:endParaRPr lang="en-GB" dirty="0" smtClean="0"/>
+              <a:t>Alternatively, we can add noise to specific processes</a:t>
+            </a:r>
           </a:p>
           <a:p>
             <a:r>
               <a:rPr lang="en-GB" dirty="0" smtClean="0"/>
-              <a:t>Noise function encoded such that:</a:t>
-            </a:r>
-          </a:p>
-          <a:p>
-            <a:endParaRPr lang="en-GB" dirty="0"/>
+              <a:t>This demands adding of noise functions within the drift function f(X)</a:t>
+            </a:r>
           </a:p>
           <a:p>
             <a:r>
               <a:rPr lang="en-GB" dirty="0" smtClean="0"/>
-              <a:t>Allows for a wide range of noise types</a:t>
-            </a:r>
-          </a:p>
-          <a:p>
-            <a:r>
-              <a:rPr lang="en-GB" dirty="0" smtClean="0"/>
-              <a:t>Zero-checking necessary to avoid highly divergent areas of phase space</a:t>
-            </a:r>
-          </a:p>
-          <a:p>
-            <a:r>
-              <a:rPr lang="en-GB" dirty="0" smtClean="0"/>
-              <a:t>Code ran fast enough for parameter testing</a:t>
+              <a:t>We can adapt regular ODE solver:</a:t>
             </a:r>
             <a:endParaRPr lang="en-GB" dirty="0"/>
           </a:p>
@@ -6837,15 +7006,7 @@
           <a:p>
             <a:r>
               <a:rPr lang="en-GB" dirty="0" smtClean="0"/>
-              <a:t>Implementation in </a:t>
-            </a:r>
-            <a:r>
-              <a:rPr lang="en-GB" dirty="0" err="1" smtClean="0"/>
-              <a:t>Matlab</a:t>
-            </a:r>
-            <a:r>
-              <a:rPr lang="en-GB" dirty="0" smtClean="0"/>
-              <a:t>®</a:t>
+              <a:t>Adding noise to rates</a:t>
             </a:r>
             <a:endParaRPr lang="en-GB" dirty="0"/>
           </a:p>
@@ -6869,6 +7030,273 @@
             <a:fld id="{57E314E1-448B-4E82-884A-39F65482640B}" type="slidenum">
               <a:rPr lang="en-GB" smtClean="0"/>
               <a:t>10</a:t>
+            </a:fld>
+            <a:endParaRPr lang="en-GB" dirty="0"/>
+          </a:p>
+        </p:txBody>
+      </p:sp>
+      <p:pic>
+        <p:nvPicPr>
+          <p:cNvPr id="3074" name="Picture 2"/>
+          <p:cNvPicPr>
+            <a:picLocks noChangeAspect="1" noChangeArrowheads="1"/>
+          </p:cNvPicPr>
+          <p:nvPr/>
+        </p:nvPicPr>
+        <p:blipFill>
+          <a:blip r:embed="rId2">
+            <a:extLst>
+              <a:ext uri="{28A0092B-C50C-407E-A947-70E740481C1C}">
+                <a14:useLocalDpi xmlns:a14="http://schemas.microsoft.com/office/drawing/2010/main" val="0"/>
+              </a:ext>
+            </a:extLst>
+          </a:blip>
+          <a:srcRect/>
+          <a:stretch>
+            <a:fillRect/>
+          </a:stretch>
+        </p:blipFill>
+        <p:spPr bwMode="auto">
+          <a:xfrm>
+            <a:off x="1907704" y="3696116"/>
+            <a:ext cx="4905375" cy="581025"/>
+          </a:xfrm>
+          <a:prstGeom prst="rect">
+            <a:avLst/>
+          </a:prstGeom>
+          <a:noFill/>
+          <a:ln>
+            <a:noFill/>
+          </a:ln>
+          <a:effectLst/>
+          <a:extLst>
+            <a:ext uri="{909E8E84-426E-40DD-AFC4-6F175D3DCCD1}">
+              <a14:hiddenFill xmlns:a14="http://schemas.microsoft.com/office/drawing/2010/main">
+                <a:solidFill>
+                  <a:schemeClr val="accent1"/>
+                </a:solidFill>
+              </a14:hiddenFill>
+            </a:ext>
+            <a:ext uri="{91240B29-F687-4F45-9708-019B960494DF}">
+              <a14:hiddenLine xmlns:a14="http://schemas.microsoft.com/office/drawing/2010/main" w="9525">
+                <a:solidFill>
+                  <a:schemeClr val="tx1"/>
+                </a:solidFill>
+                <a:miter lim="800000"/>
+                <a:headEnd/>
+                <a:tailEnd/>
+              </a14:hiddenLine>
+            </a:ext>
+            <a:ext uri="{AF507438-7753-43E0-B8FC-AC1667EBCBE1}">
+              <a14:hiddenEffects xmlns:a14="http://schemas.microsoft.com/office/drawing/2010/main">
+                <a:effectLst>
+                  <a:outerShdw dist="35921" dir="2700000" algn="ctr" rotWithShape="0">
+                    <a:schemeClr val="bg2"/>
+                  </a:outerShdw>
+                </a:effectLst>
+              </a14:hiddenEffects>
+            </a:ext>
+          </a:extLst>
+        </p:spPr>
+      </p:pic>
+      <p:pic>
+        <p:nvPicPr>
+          <p:cNvPr id="3077" name="Picture 5"/>
+          <p:cNvPicPr>
+            <a:picLocks noChangeAspect="1" noChangeArrowheads="1"/>
+          </p:cNvPicPr>
+          <p:nvPr/>
+        </p:nvPicPr>
+        <p:blipFill>
+          <a:blip r:embed="rId3">
+            <a:extLst>
+              <a:ext uri="{28A0092B-C50C-407E-A947-70E740481C1C}">
+                <a14:useLocalDpi xmlns:a14="http://schemas.microsoft.com/office/drawing/2010/main" val="0"/>
+              </a:ext>
+            </a:extLst>
+          </a:blip>
+          <a:srcRect/>
+          <a:stretch>
+            <a:fillRect/>
+          </a:stretch>
+        </p:blipFill>
+        <p:spPr bwMode="auto">
+          <a:xfrm>
+            <a:off x="1337636" y="4437112"/>
+            <a:ext cx="6045509" cy="509294"/>
+          </a:xfrm>
+          <a:prstGeom prst="rect">
+            <a:avLst/>
+          </a:prstGeom>
+          <a:noFill/>
+          <a:ln>
+            <a:noFill/>
+          </a:ln>
+          <a:effectLst/>
+          <a:extLst>
+            <a:ext uri="{909E8E84-426E-40DD-AFC4-6F175D3DCCD1}">
+              <a14:hiddenFill xmlns:a14="http://schemas.microsoft.com/office/drawing/2010/main">
+                <a:solidFill>
+                  <a:schemeClr val="accent1"/>
+                </a:solidFill>
+              </a14:hiddenFill>
+            </a:ext>
+            <a:ext uri="{91240B29-F687-4F45-9708-019B960494DF}">
+              <a14:hiddenLine xmlns:a14="http://schemas.microsoft.com/office/drawing/2010/main" w="9525">
+                <a:solidFill>
+                  <a:schemeClr val="tx1"/>
+                </a:solidFill>
+                <a:miter lim="800000"/>
+                <a:headEnd/>
+                <a:tailEnd/>
+              </a14:hiddenLine>
+            </a:ext>
+            <a:ext uri="{AF507438-7753-43E0-B8FC-AC1667EBCBE1}">
+              <a14:hiddenEffects xmlns:a14="http://schemas.microsoft.com/office/drawing/2010/main">
+                <a:effectLst>
+                  <a:outerShdw dist="35921" dir="2700000" algn="ctr" rotWithShape="0">
+                    <a:schemeClr val="bg2"/>
+                  </a:outerShdw>
+                </a:effectLst>
+              </a14:hiddenEffects>
+            </a:ext>
+          </a:extLst>
+        </p:spPr>
+      </p:pic>
+    </p:spTree>
+    <p:extLst>
+      <p:ext uri="{BB962C8B-B14F-4D97-AF65-F5344CB8AC3E}">
+        <p14:creationId xmlns:p14="http://schemas.microsoft.com/office/powerpoint/2010/main" val="3254139937"/>
+      </p:ext>
+    </p:extLst>
+  </p:cSld>
+  <p:clrMapOvr>
+    <a:masterClrMapping/>
+  </p:clrMapOvr>
+</p:sld>
+</file>
+
+<file path=ppt/slides/slide11.xml><?xml version="1.0" encoding="utf-8"?>
+<p:sld xmlns:a="http://schemas.openxmlformats.org/drawingml/2006/main" xmlns:r="http://schemas.openxmlformats.org/officeDocument/2006/relationships" xmlns:p="http://schemas.openxmlformats.org/presentationml/2006/main">
+  <p:cSld>
+    <p:spTree>
+      <p:nvGrpSpPr>
+        <p:cNvPr id="1" name=""/>
+        <p:cNvGrpSpPr/>
+        <p:nvPr/>
+      </p:nvGrpSpPr>
+      <p:grpSpPr>
+        <a:xfrm>
+          <a:off x="0" y="0"/>
+          <a:ext cx="0" cy="0"/>
+          <a:chOff x="0" y="0"/>
+          <a:chExt cx="0" cy="0"/>
+        </a:xfrm>
+      </p:grpSpPr>
+      <p:sp>
+        <p:nvSpPr>
+          <p:cNvPr id="2" name="Content Placeholder 1"/>
+          <p:cNvSpPr>
+            <a:spLocks noGrp="1"/>
+          </p:cNvSpPr>
+          <p:nvPr>
+            <p:ph idx="1"/>
+          </p:nvPr>
+        </p:nvSpPr>
+        <p:spPr/>
+        <p:txBody>
+          <a:bodyPr/>
+          <a:lstStyle/>
+          <a:p>
+            <a:r>
+              <a:rPr lang="en-GB" dirty="0" smtClean="0"/>
+              <a:t>These two approaches were coded into two separate solvers in </a:t>
+            </a:r>
+            <a:r>
+              <a:rPr lang="en-GB" dirty="0" err="1" smtClean="0"/>
+              <a:t>Matlab</a:t>
+            </a:r>
+            <a:endParaRPr lang="en-GB" dirty="0" smtClean="0"/>
+          </a:p>
+          <a:p>
+            <a:r>
+              <a:rPr lang="en-GB" dirty="0" smtClean="0"/>
+              <a:t>Noise function encoded such that:</a:t>
+            </a:r>
+          </a:p>
+          <a:p>
+            <a:endParaRPr lang="en-GB" dirty="0"/>
+          </a:p>
+          <a:p>
+            <a:r>
+              <a:rPr lang="en-GB" dirty="0" smtClean="0"/>
+              <a:t>Allows for a wide range of noise types</a:t>
+            </a:r>
+          </a:p>
+          <a:p>
+            <a:r>
+              <a:rPr lang="en-GB" dirty="0" smtClean="0"/>
+              <a:t>Zero-checking necessary to avoid highly divergent areas of phase space</a:t>
+            </a:r>
+          </a:p>
+          <a:p>
+            <a:r>
+              <a:rPr lang="en-GB" dirty="0" smtClean="0"/>
+              <a:t>Code ran fast enough for parameter testing</a:t>
+            </a:r>
+            <a:endParaRPr lang="en-GB" dirty="0"/>
+          </a:p>
+        </p:txBody>
+      </p:sp>
+      <p:sp>
+        <p:nvSpPr>
+          <p:cNvPr id="3" name="Title 2"/>
+          <p:cNvSpPr>
+            <a:spLocks noGrp="1"/>
+          </p:cNvSpPr>
+          <p:nvPr>
+            <p:ph type="title"/>
+          </p:nvPr>
+        </p:nvSpPr>
+        <p:spPr/>
+        <p:txBody>
+          <a:bodyPr/>
+          <a:lstStyle/>
+          <a:p>
+            <a:r>
+              <a:rPr lang="en-GB" dirty="0" smtClean="0"/>
+              <a:t>Implementation in </a:t>
+            </a:r>
+            <a:r>
+              <a:rPr lang="en-GB" dirty="0" err="1" smtClean="0"/>
+              <a:t>Matlab</a:t>
+            </a:r>
+            <a:r>
+              <a:rPr lang="en-GB" dirty="0" smtClean="0"/>
+              <a:t>®</a:t>
+            </a:r>
+            <a:endParaRPr lang="en-GB" dirty="0"/>
+          </a:p>
+        </p:txBody>
+      </p:sp>
+      <p:sp>
+        <p:nvSpPr>
+          <p:cNvPr id="4" name="Slide Number Placeholder 3"/>
+          <p:cNvSpPr>
+            <a:spLocks noGrp="1"/>
+          </p:cNvSpPr>
+          <p:nvPr>
+            <p:ph type="sldNum" sz="quarter" idx="4"/>
+          </p:nvPr>
+        </p:nvSpPr>
+        <p:spPr/>
+        <p:txBody>
+          <a:bodyPr/>
+          <a:lstStyle/>
+          <a:p>
+            <a:fld id="{57E314E1-448B-4E82-884A-39F65482640B}" type="slidenum">
+              <a:rPr lang="en-GB" smtClean="0"/>
+              <a:t>11</a:t>
             </a:fld>
             <a:endParaRPr lang="en-GB" dirty="0"/>
           </a:p>
@@ -6951,139 +7379,6 @@
 </p:sld>
 </file>
 
-<file path=ppt/slides/slide11.xml><?xml version="1.0" encoding="utf-8"?>
-<p:sld xmlns:a="http://schemas.openxmlformats.org/drawingml/2006/main" xmlns:r="http://schemas.openxmlformats.org/officeDocument/2006/relationships" xmlns:p="http://schemas.openxmlformats.org/presentationml/2006/main">
-  <p:cSld>
-    <p:spTree>
-      <p:nvGrpSpPr>
-        <p:cNvPr id="1" name=""/>
-        <p:cNvGrpSpPr/>
-        <p:nvPr/>
-      </p:nvGrpSpPr>
-      <p:grpSpPr>
-        <a:xfrm>
-          <a:off x="0" y="0"/>
-          <a:ext cx="0" cy="0"/>
-          <a:chOff x="0" y="0"/>
-          <a:chExt cx="0" cy="0"/>
-        </a:xfrm>
-      </p:grpSpPr>
-      <p:sp>
-        <p:nvSpPr>
-          <p:cNvPr id="2" name="Content Placeholder 1"/>
-          <p:cNvSpPr>
-            <a:spLocks noGrp="1"/>
-          </p:cNvSpPr>
-          <p:nvPr>
-            <p:ph idx="1"/>
-          </p:nvPr>
-        </p:nvSpPr>
-        <p:spPr/>
-        <p:txBody>
-          <a:bodyPr/>
-          <a:lstStyle/>
-          <a:p>
-            <a:r>
-              <a:rPr lang="en-GB" dirty="0" smtClean="0"/>
-              <a:t>Adding noise to affinity maturation rate had little appreciable effect on other outputs</a:t>
-            </a:r>
-          </a:p>
-          <a:p>
-            <a:pPr lvl="1"/>
-            <a:r>
-              <a:rPr lang="en-GB" dirty="0" smtClean="0"/>
-              <a:t>It only really functions as a Boolean, anyway.</a:t>
-            </a:r>
-          </a:p>
-          <a:p>
-            <a:r>
-              <a:rPr lang="en-GB" dirty="0" smtClean="0"/>
-              <a:t>Adding </a:t>
-            </a:r>
-            <a:r>
-              <a:rPr lang="en-GB" dirty="0" err="1" smtClean="0"/>
-              <a:t>stochasticity</a:t>
-            </a:r>
-            <a:r>
-              <a:rPr lang="en-GB" dirty="0" smtClean="0"/>
-              <a:t> to virus production produced some exciting results</a:t>
-            </a:r>
-          </a:p>
-          <a:p>
-            <a:r>
-              <a:rPr lang="en-GB" dirty="0" smtClean="0"/>
-              <a:t>Brings about the possibility of several waves of infection.</a:t>
-            </a:r>
-          </a:p>
-        </p:txBody>
-      </p:sp>
-      <p:sp>
-        <p:nvSpPr>
-          <p:cNvPr id="3" name="Title 2"/>
-          <p:cNvSpPr>
-            <a:spLocks noGrp="1"/>
-          </p:cNvSpPr>
-          <p:nvPr>
-            <p:ph type="title"/>
-          </p:nvPr>
-        </p:nvSpPr>
-        <p:spPr/>
-        <p:txBody>
-          <a:bodyPr/>
-          <a:lstStyle/>
-          <a:p>
-            <a:r>
-              <a:rPr lang="en-GB" dirty="0" smtClean="0"/>
-              <a:t>Stochastic </a:t>
-            </a:r>
-            <a:r>
-              <a:rPr lang="en-GB" dirty="0" err="1" smtClean="0"/>
-              <a:t>Matlab</a:t>
-            </a:r>
-            <a:r>
-              <a:rPr lang="en-GB" dirty="0" smtClean="0"/>
-              <a:t>® Results</a:t>
-            </a:r>
-            <a:endParaRPr lang="en-GB" dirty="0"/>
-          </a:p>
-        </p:txBody>
-      </p:sp>
-      <p:sp>
-        <p:nvSpPr>
-          <p:cNvPr id="4" name="Slide Number Placeholder 3"/>
-          <p:cNvSpPr>
-            <a:spLocks noGrp="1"/>
-          </p:cNvSpPr>
-          <p:nvPr>
-            <p:ph type="sldNum" sz="quarter" idx="4"/>
-          </p:nvPr>
-        </p:nvSpPr>
-        <p:spPr/>
-        <p:txBody>
-          <a:bodyPr/>
-          <a:lstStyle/>
-          <a:p>
-            <a:fld id="{57E314E1-448B-4E82-884A-39F65482640B}" type="slidenum">
-              <a:rPr lang="en-GB" smtClean="0"/>
-              <a:t>11</a:t>
-            </a:fld>
-            <a:endParaRPr lang="en-GB" dirty="0"/>
-          </a:p>
-        </p:txBody>
-      </p:sp>
-    </p:spTree>
-    <p:extLst>
-      <p:ext uri="{BB962C8B-B14F-4D97-AF65-F5344CB8AC3E}">
-        <p14:creationId xmlns:p14="http://schemas.microsoft.com/office/powerpoint/2010/main" val="2877546663"/>
-      </p:ext>
-    </p:extLst>
-  </p:cSld>
-  <p:clrMapOvr>
-    <a:masterClrMapping/>
-  </p:clrMapOvr>
-</p:sld>
-</file>
-
 <file path=ppt/slides/slide12.xml><?xml version="1.0" encoding="utf-8"?>
 <p:sld xmlns:a="http://schemas.openxmlformats.org/drawingml/2006/main" xmlns:r="http://schemas.openxmlformats.org/officeDocument/2006/relationships" xmlns:p="http://schemas.openxmlformats.org/presentationml/2006/main">
   <p:cSld>
@@ -7111,6 +7406,139 @@
             <p:ph idx="1"/>
           </p:nvPr>
         </p:nvSpPr>
+        <p:spPr/>
+        <p:txBody>
+          <a:bodyPr/>
+          <a:lstStyle/>
+          <a:p>
+            <a:r>
+              <a:rPr lang="en-GB" dirty="0" smtClean="0"/>
+              <a:t>Adding noise to affinity maturation rate had little appreciable effect on other outputs</a:t>
+            </a:r>
+          </a:p>
+          <a:p>
+            <a:pPr lvl="1"/>
+            <a:r>
+              <a:rPr lang="en-GB" dirty="0" smtClean="0"/>
+              <a:t>It only really functions as a Boolean, anyway.</a:t>
+            </a:r>
+          </a:p>
+          <a:p>
+            <a:r>
+              <a:rPr lang="en-GB" dirty="0" smtClean="0"/>
+              <a:t>Adding </a:t>
+            </a:r>
+            <a:r>
+              <a:rPr lang="en-GB" dirty="0" err="1" smtClean="0"/>
+              <a:t>stochasticity</a:t>
+            </a:r>
+            <a:r>
+              <a:rPr lang="en-GB" dirty="0" smtClean="0"/>
+              <a:t> to virus production produced some exciting results</a:t>
+            </a:r>
+          </a:p>
+          <a:p>
+            <a:r>
+              <a:rPr lang="en-GB" dirty="0" smtClean="0"/>
+              <a:t>Brings about the possibility of several waves of infection.</a:t>
+            </a:r>
+          </a:p>
+        </p:txBody>
+      </p:sp>
+      <p:sp>
+        <p:nvSpPr>
+          <p:cNvPr id="3" name="Title 2"/>
+          <p:cNvSpPr>
+            <a:spLocks noGrp="1"/>
+          </p:cNvSpPr>
+          <p:nvPr>
+            <p:ph type="title"/>
+          </p:nvPr>
+        </p:nvSpPr>
+        <p:spPr/>
+        <p:txBody>
+          <a:bodyPr/>
+          <a:lstStyle/>
+          <a:p>
+            <a:r>
+              <a:rPr lang="en-GB" dirty="0" smtClean="0"/>
+              <a:t>Stochastic </a:t>
+            </a:r>
+            <a:r>
+              <a:rPr lang="en-GB" dirty="0" err="1" smtClean="0"/>
+              <a:t>Matlab</a:t>
+            </a:r>
+            <a:r>
+              <a:rPr lang="en-GB" dirty="0" smtClean="0"/>
+              <a:t>® Results</a:t>
+            </a:r>
+            <a:endParaRPr lang="en-GB" dirty="0"/>
+          </a:p>
+        </p:txBody>
+      </p:sp>
+      <p:sp>
+        <p:nvSpPr>
+          <p:cNvPr id="4" name="Slide Number Placeholder 3"/>
+          <p:cNvSpPr>
+            <a:spLocks noGrp="1"/>
+          </p:cNvSpPr>
+          <p:nvPr>
+            <p:ph type="sldNum" sz="quarter" idx="4"/>
+          </p:nvPr>
+        </p:nvSpPr>
+        <p:spPr/>
+        <p:txBody>
+          <a:bodyPr/>
+          <a:lstStyle/>
+          <a:p>
+            <a:fld id="{57E314E1-448B-4E82-884A-39F65482640B}" type="slidenum">
+              <a:rPr lang="en-GB" smtClean="0"/>
+              <a:t>12</a:t>
+            </a:fld>
+            <a:endParaRPr lang="en-GB" dirty="0"/>
+          </a:p>
+        </p:txBody>
+      </p:sp>
+    </p:spTree>
+    <p:extLst>
+      <p:ext uri="{BB962C8B-B14F-4D97-AF65-F5344CB8AC3E}">
+        <p14:creationId xmlns:p14="http://schemas.microsoft.com/office/powerpoint/2010/main" val="2877546663"/>
+      </p:ext>
+    </p:extLst>
+  </p:cSld>
+  <p:clrMapOvr>
+    <a:masterClrMapping/>
+  </p:clrMapOvr>
+</p:sld>
+</file>
+
+<file path=ppt/slides/slide13.xml><?xml version="1.0" encoding="utf-8"?>
+<p:sld xmlns:a="http://schemas.openxmlformats.org/drawingml/2006/main" xmlns:r="http://schemas.openxmlformats.org/officeDocument/2006/relationships" xmlns:p="http://schemas.openxmlformats.org/presentationml/2006/main">
+  <p:cSld>
+    <p:spTree>
+      <p:nvGrpSpPr>
+        <p:cNvPr id="1" name=""/>
+        <p:cNvGrpSpPr/>
+        <p:nvPr/>
+      </p:nvGrpSpPr>
+      <p:grpSpPr>
+        <a:xfrm>
+          <a:off x="0" y="0"/>
+          <a:ext cx="0" cy="0"/>
+          <a:chOff x="0" y="0"/>
+          <a:chExt cx="0" cy="0"/>
+        </a:xfrm>
+      </p:grpSpPr>
+      <p:sp>
+        <p:nvSpPr>
+          <p:cNvPr id="2" name="Content Placeholder 1"/>
+          <p:cNvSpPr>
+            <a:spLocks noGrp="1"/>
+          </p:cNvSpPr>
+          <p:nvPr>
+            <p:ph idx="1"/>
+          </p:nvPr>
+        </p:nvSpPr>
         <p:spPr>
           <a:xfrm>
             <a:off x="457200" y="1481328"/>
@@ -7181,7 +7609,7 @@
           <a:p>
             <a:fld id="{57E314E1-448B-4E82-884A-39F65482640B}" type="slidenum">
               <a:rPr lang="en-GB" smtClean="0"/>
-              <a:t>12</a:t>
+              <a:t>13</a:t>
             </a:fld>
             <a:endParaRPr lang="en-GB" dirty="0"/>
           </a:p>
@@ -7241,7 +7669,7 @@
 </p:sld>
 </file>
 
-<file path=ppt/slides/slide13.xml><?xml version="1.0" encoding="utf-8"?>
+<file path=ppt/slides/slide14.xml><?xml version="1.0" encoding="utf-8"?>
 <p:sld xmlns:a="http://schemas.openxmlformats.org/drawingml/2006/main" xmlns:r="http://schemas.openxmlformats.org/officeDocument/2006/relationships" xmlns:p="http://schemas.openxmlformats.org/presentationml/2006/main">
   <p:cSld>
     <p:spTree>
@@ -7260,26 +7688,7 @@
       </p:grpSpPr>
       <p:sp>
         <p:nvSpPr>
-          <p:cNvPr id="2" name="Content Placeholder 1"/>
-          <p:cNvSpPr>
-            <a:spLocks noGrp="1"/>
-          </p:cNvSpPr>
-          <p:nvPr>
-            <p:ph idx="1"/>
-          </p:nvPr>
-        </p:nvSpPr>
-        <p:spPr/>
-        <p:txBody>
-          <a:bodyPr/>
-          <a:lstStyle/>
-          <a:p>
-            <a:endParaRPr lang="en-GB"/>
-          </a:p>
-        </p:txBody>
-      </p:sp>
-      <p:sp>
-        <p:nvSpPr>
-          <p:cNvPr id="3" name="Title 2"/>
+          <p:cNvPr id="5" name="Title 4"/>
           <p:cNvSpPr>
             <a:spLocks noGrp="1"/>
           </p:cNvSpPr>
@@ -7287,23 +7696,32 @@
             <p:ph type="title"/>
           </p:nvPr>
         </p:nvSpPr>
-        <p:spPr/>
+        <p:spPr>
+          <a:xfrm>
+            <a:off x="722376" y="1059712"/>
+            <a:ext cx="6873960" cy="1828800"/>
+          </a:xfrm>
+        </p:spPr>
         <p:txBody>
           <a:bodyPr/>
           <a:lstStyle/>
           <a:p>
+            <a:r>
+              <a:rPr lang="en-GB" dirty="0" smtClean="0"/>
+              <a:t>Extensions 2</a:t>
+            </a:r>
             <a:endParaRPr lang="en-GB" dirty="0"/>
           </a:p>
         </p:txBody>
       </p:sp>
       <p:sp>
         <p:nvSpPr>
-          <p:cNvPr id="4" name="Slide Number Placeholder 3"/>
+          <p:cNvPr id="6" name="Text Placeholder 5"/>
           <p:cNvSpPr>
             <a:spLocks noGrp="1"/>
           </p:cNvSpPr>
           <p:nvPr>
-            <p:ph type="sldNum" sz="quarter" idx="4"/>
+            <p:ph type="body" idx="1"/>
           </p:nvPr>
         </p:nvSpPr>
         <p:spPr/>
@@ -7311,9 +7729,32 @@
           <a:bodyPr/>
           <a:lstStyle/>
           <a:p>
+            <a:r>
+              <a:rPr lang="en-GB" dirty="0" smtClean="0"/>
+              <a:t>Antiviral Drug Treatment</a:t>
+            </a:r>
+            <a:endParaRPr lang="en-GB" dirty="0"/>
+          </a:p>
+        </p:txBody>
+      </p:sp>
+      <p:sp>
+        <p:nvSpPr>
+          <p:cNvPr id="4" name="Slide Number Placeholder 3"/>
+          <p:cNvSpPr>
+            <a:spLocks noGrp="1"/>
+          </p:cNvSpPr>
+          <p:nvPr>
+            <p:ph type="sldNum" sz="quarter" idx="12"/>
+          </p:nvPr>
+        </p:nvSpPr>
+        <p:spPr/>
+        <p:txBody>
+          <a:bodyPr/>
+          <a:lstStyle/>
+          <a:p>
             <a:fld id="{57E314E1-448B-4E82-884A-39F65482640B}" type="slidenum">
               <a:rPr lang="en-GB" smtClean="0"/>
-              <a:t>13</a:t>
+              <a:t>14</a:t>
             </a:fld>
             <a:endParaRPr lang="en-GB" dirty="0"/>
           </a:p>
@@ -7323,6 +7764,2068 @@
     <p:extLst>
       <p:ext uri="{BB962C8B-B14F-4D97-AF65-F5344CB8AC3E}">
         <p14:creationId xmlns:p14="http://schemas.microsoft.com/office/powerpoint/2010/main" val="3261310763"/>
+      </p:ext>
+    </p:extLst>
+  </p:cSld>
+  <p:clrMapOvr>
+    <a:masterClrMapping/>
+  </p:clrMapOvr>
+</p:sld>
+</file>
+
+<file path=ppt/slides/slide15.xml><?xml version="1.0" encoding="utf-8"?>
+<p:sld xmlns:a="http://schemas.openxmlformats.org/drawingml/2006/main" xmlns:r="http://schemas.openxmlformats.org/officeDocument/2006/relationships" xmlns:p="http://schemas.openxmlformats.org/presentationml/2006/main">
+  <p:cSld>
+    <p:spTree>
+      <p:nvGrpSpPr>
+        <p:cNvPr id="1" name=""/>
+        <p:cNvGrpSpPr/>
+        <p:nvPr/>
+      </p:nvGrpSpPr>
+      <p:grpSpPr>
+        <a:xfrm>
+          <a:off x="0" y="0"/>
+          <a:ext cx="0" cy="0"/>
+          <a:chOff x="0" y="0"/>
+          <a:chExt cx="0" cy="0"/>
+        </a:xfrm>
+      </p:grpSpPr>
+      <p:sp>
+        <p:nvSpPr>
+          <p:cNvPr id="2" name="Content Placeholder 1"/>
+          <p:cNvSpPr>
+            <a:spLocks noGrp="1"/>
+          </p:cNvSpPr>
+          <p:nvPr>
+            <p:ph idx="1"/>
+          </p:nvPr>
+        </p:nvSpPr>
+        <p:spPr/>
+        <p:txBody>
+          <a:bodyPr/>
+          <a:lstStyle/>
+          <a:p>
+            <a:r>
+              <a:rPr lang="en-GB" dirty="0" smtClean="0"/>
+              <a:t>A number of papers have discussed the inclusion of drug variables in human virus response </a:t>
+            </a:r>
+            <a:r>
+              <a:rPr lang="en-GB" sz="1400" dirty="0" smtClean="0"/>
+              <a:t>(e.g. Smith and </a:t>
+            </a:r>
+            <a:r>
+              <a:rPr lang="en-GB" sz="1400" dirty="0" err="1" smtClean="0"/>
+              <a:t>Perelson</a:t>
+            </a:r>
+            <a:r>
+              <a:rPr lang="en-GB" sz="1400" dirty="0" smtClean="0"/>
+              <a:t> 2011…)</a:t>
+            </a:r>
+          </a:p>
+          <a:p>
+            <a:endParaRPr lang="en-GB" sz="900" dirty="0" smtClean="0"/>
+          </a:p>
+          <a:p>
+            <a:r>
+              <a:rPr lang="en-GB" b="1" dirty="0" smtClean="0"/>
+              <a:t>Approach 1</a:t>
+            </a:r>
+            <a:r>
+              <a:rPr lang="en-GB" dirty="0" smtClean="0"/>
+              <a:t>: 2-compartment </a:t>
+            </a:r>
+          </a:p>
+          <a:p>
+            <a:pPr marL="109728" indent="0">
+              <a:buNone/>
+            </a:pPr>
+            <a:r>
+              <a:rPr lang="en-GB" dirty="0"/>
+              <a:t> </a:t>
+            </a:r>
+            <a:r>
+              <a:rPr lang="en-GB" dirty="0" smtClean="0"/>
+              <a:t> pharmacokinetic model </a:t>
+            </a:r>
+          </a:p>
+          <a:p>
+            <a:pPr marL="109728" indent="0">
+              <a:buNone/>
+            </a:pPr>
+            <a:r>
+              <a:rPr lang="en-GB" sz="1400" dirty="0" smtClean="0"/>
+              <a:t>    (adds extra ODEs to describe drug variables )</a:t>
+            </a:r>
+          </a:p>
+          <a:p>
+            <a:pPr marL="109728" indent="0">
+              <a:buNone/>
+            </a:pPr>
+            <a:endParaRPr lang="en-GB" dirty="0" smtClean="0"/>
+          </a:p>
+          <a:p>
+            <a:r>
+              <a:rPr lang="en-GB" b="1" dirty="0" smtClean="0"/>
+              <a:t>Approach 2</a:t>
+            </a:r>
+            <a:r>
+              <a:rPr lang="en-GB" dirty="0" smtClean="0"/>
+              <a:t>: Analytical expression for drug effects </a:t>
+            </a:r>
+            <a:r>
+              <a:rPr lang="en-GB" sz="1400" dirty="0" smtClean="0"/>
+              <a:t>(avoids passing extra variables through a complex data structure)</a:t>
+            </a:r>
+            <a:endParaRPr lang="en-GB" sz="1400" dirty="0"/>
+          </a:p>
+        </p:txBody>
+      </p:sp>
+      <p:sp>
+        <p:nvSpPr>
+          <p:cNvPr id="3" name="Title 2"/>
+          <p:cNvSpPr>
+            <a:spLocks noGrp="1"/>
+          </p:cNvSpPr>
+          <p:nvPr>
+            <p:ph type="title"/>
+          </p:nvPr>
+        </p:nvSpPr>
+        <p:spPr/>
+        <p:txBody>
+          <a:bodyPr>
+            <a:normAutofit fontScale="90000"/>
+          </a:bodyPr>
+          <a:lstStyle/>
+          <a:p>
+            <a:r>
+              <a:rPr lang="en-GB" dirty="0" smtClean="0"/>
+              <a:t>Extensions 2:</a:t>
+            </a:r>
+            <a:r>
+              <a:rPr lang="en-GB" sz="3100" dirty="0" smtClean="0"/>
+              <a:t> Influence of antiviral drugs</a:t>
+            </a:r>
+            <a:endParaRPr lang="en-GB" sz="3100" dirty="0"/>
+          </a:p>
+        </p:txBody>
+      </p:sp>
+      <p:sp>
+        <p:nvSpPr>
+          <p:cNvPr id="4" name="Slide Number Placeholder 3"/>
+          <p:cNvSpPr>
+            <a:spLocks noGrp="1"/>
+          </p:cNvSpPr>
+          <p:nvPr>
+            <p:ph type="sldNum" sz="quarter" idx="4"/>
+          </p:nvPr>
+        </p:nvSpPr>
+        <p:spPr/>
+        <p:txBody>
+          <a:bodyPr/>
+          <a:lstStyle/>
+          <a:p>
+            <a:fld id="{57E314E1-448B-4E82-884A-39F65482640B}" type="slidenum">
+              <a:rPr lang="en-GB" smtClean="0"/>
+              <a:t>15</a:t>
+            </a:fld>
+            <a:endParaRPr lang="en-GB" dirty="0"/>
+          </a:p>
+        </p:txBody>
+      </p:sp>
+      <p:pic>
+        <p:nvPicPr>
+          <p:cNvPr id="1027" name="Picture 3"/>
+          <p:cNvPicPr>
+            <a:picLocks noChangeAspect="1" noChangeArrowheads="1"/>
+          </p:cNvPicPr>
+          <p:nvPr/>
+        </p:nvPicPr>
+        <p:blipFill>
+          <a:blip r:embed="rId3" cstate="print">
+            <a:extLst>
+              <a:ext uri="{28A0092B-C50C-407E-A947-70E740481C1C}">
+                <a14:useLocalDpi xmlns:a14="http://schemas.microsoft.com/office/drawing/2010/main" val="0"/>
+              </a:ext>
+            </a:extLst>
+          </a:blip>
+          <a:srcRect/>
+          <a:stretch>
+            <a:fillRect/>
+          </a:stretch>
+        </p:blipFill>
+        <p:spPr bwMode="auto">
+          <a:xfrm>
+            <a:off x="4644008" y="5573506"/>
+            <a:ext cx="2088232" cy="1047921"/>
+          </a:xfrm>
+          <a:prstGeom prst="rect">
+            <a:avLst/>
+          </a:prstGeom>
+          <a:noFill/>
+          <a:ln>
+            <a:noFill/>
+          </a:ln>
+          <a:effectLst/>
+          <a:extLst>
+            <a:ext uri="{909E8E84-426E-40DD-AFC4-6F175D3DCCD1}">
+              <a14:hiddenFill xmlns:a14="http://schemas.microsoft.com/office/drawing/2010/main">
+                <a:solidFill>
+                  <a:schemeClr val="accent1"/>
+                </a:solidFill>
+              </a14:hiddenFill>
+            </a:ext>
+            <a:ext uri="{91240B29-F687-4F45-9708-019B960494DF}">
+              <a14:hiddenLine xmlns:a14="http://schemas.microsoft.com/office/drawing/2010/main" w="9525">
+                <a:solidFill>
+                  <a:schemeClr val="tx1"/>
+                </a:solidFill>
+                <a:miter lim="800000"/>
+                <a:headEnd/>
+                <a:tailEnd/>
+              </a14:hiddenLine>
+            </a:ext>
+            <a:ext uri="{AF507438-7753-43E0-B8FC-AC1667EBCBE1}">
+              <a14:hiddenEffects xmlns:a14="http://schemas.microsoft.com/office/drawing/2010/main">
+                <a:effectLst>
+                  <a:outerShdw dist="35921" dir="2700000" algn="ctr" rotWithShape="0">
+                    <a:schemeClr val="bg2"/>
+                  </a:outerShdw>
+                </a:effectLst>
+              </a14:hiddenEffects>
+            </a:ext>
+          </a:extLst>
+        </p:spPr>
+      </p:pic>
+      <p:pic>
+        <p:nvPicPr>
+          <p:cNvPr id="1029" name="Picture 5" descr="http://www.aapsj.org/articles/aapsj0803/aapsj080358/aapsj080358_figure2.jpg"/>
+          <p:cNvPicPr>
+            <a:picLocks noChangeAspect="1" noChangeArrowheads="1"/>
+          </p:cNvPicPr>
+          <p:nvPr/>
+        </p:nvPicPr>
+        <p:blipFill>
+          <a:blip r:embed="rId4">
+            <a:extLst>
+              <a:ext uri="{28A0092B-C50C-407E-A947-70E740481C1C}">
+                <a14:useLocalDpi xmlns:a14="http://schemas.microsoft.com/office/drawing/2010/main" val="0"/>
+              </a:ext>
+            </a:extLst>
+          </a:blip>
+          <a:srcRect/>
+          <a:stretch>
+            <a:fillRect/>
+          </a:stretch>
+        </p:blipFill>
+        <p:spPr bwMode="auto">
+          <a:xfrm>
+            <a:off x="5868144" y="2780928"/>
+            <a:ext cx="2016224" cy="1562575"/>
+          </a:xfrm>
+          <a:prstGeom prst="rect">
+            <a:avLst/>
+          </a:prstGeom>
+          <a:noFill/>
+          <a:extLst>
+            <a:ext uri="{909E8E84-426E-40DD-AFC4-6F175D3DCCD1}">
+              <a14:hiddenFill xmlns:a14="http://schemas.microsoft.com/office/drawing/2010/main">
+                <a:solidFill>
+                  <a:srgbClr val="FFFFFF"/>
+                </a:solidFill>
+              </a14:hiddenFill>
+            </a:ext>
+          </a:extLst>
+        </p:spPr>
+      </p:pic>
+      <p:pic>
+        <p:nvPicPr>
+          <p:cNvPr id="9" name="Picture 3"/>
+          <p:cNvPicPr>
+            <a:picLocks noChangeAspect="1" noChangeArrowheads="1"/>
+          </p:cNvPicPr>
+          <p:nvPr/>
+        </p:nvPicPr>
+        <p:blipFill rotWithShape="1">
+          <a:blip r:embed="rId5" cstate="print">
+            <a:extLst>
+              <a:ext uri="{28A0092B-C50C-407E-A947-70E740481C1C}">
+                <a14:useLocalDpi xmlns:a14="http://schemas.microsoft.com/office/drawing/2010/main" val="0"/>
+              </a:ext>
+            </a:extLst>
+          </a:blip>
+          <a:srcRect l="59505" t="67093" r="14345" b="18433"/>
+          <a:stretch/>
+        </p:blipFill>
+        <p:spPr bwMode="auto">
+          <a:xfrm>
+            <a:off x="2339752" y="5661248"/>
+            <a:ext cx="2016224" cy="627724"/>
+          </a:xfrm>
+          <a:prstGeom prst="rect">
+            <a:avLst/>
+          </a:prstGeom>
+          <a:noFill/>
+          <a:ln>
+            <a:noFill/>
+          </a:ln>
+          <a:effectLst/>
+          <a:extLst>
+            <a:ext uri="{909E8E84-426E-40DD-AFC4-6F175D3DCCD1}">
+              <a14:hiddenFill xmlns:a14="http://schemas.microsoft.com/office/drawing/2010/main">
+                <a:solidFill>
+                  <a:schemeClr val="accent1"/>
+                </a:solidFill>
+              </a14:hiddenFill>
+            </a:ext>
+            <a:ext uri="{91240B29-F687-4F45-9708-019B960494DF}">
+              <a14:hiddenLine xmlns:a14="http://schemas.microsoft.com/office/drawing/2010/main" w="9525">
+                <a:solidFill>
+                  <a:schemeClr val="tx1"/>
+                </a:solidFill>
+                <a:miter lim="800000"/>
+                <a:headEnd/>
+                <a:tailEnd/>
+              </a14:hiddenLine>
+            </a:ext>
+            <a:ext uri="{AF507438-7753-43E0-B8FC-AC1667EBCBE1}">
+              <a14:hiddenEffects xmlns:a14="http://schemas.microsoft.com/office/drawing/2010/main">
+                <a:effectLst>
+                  <a:outerShdw dist="35921" dir="2700000" algn="ctr" rotWithShape="0">
+                    <a:schemeClr val="bg2"/>
+                  </a:outerShdw>
+                </a:effectLst>
+              </a14:hiddenEffects>
+            </a:ext>
+          </a:extLst>
+        </p:spPr>
+      </p:pic>
+    </p:spTree>
+    <p:extLst>
+      <p:ext uri="{BB962C8B-B14F-4D97-AF65-F5344CB8AC3E}">
+        <p14:creationId xmlns:p14="http://schemas.microsoft.com/office/powerpoint/2010/main" val="2810598908"/>
+      </p:ext>
+    </p:extLst>
+  </p:cSld>
+  <p:clrMapOvr>
+    <a:masterClrMapping/>
+  </p:clrMapOvr>
+</p:sld>
+</file>
+
+<file path=ppt/slides/slide16.xml><?xml version="1.0" encoding="utf-8"?>
+<p:sld xmlns:a="http://schemas.openxmlformats.org/drawingml/2006/main" xmlns:r="http://schemas.openxmlformats.org/officeDocument/2006/relationships" xmlns:p="http://schemas.openxmlformats.org/presentationml/2006/main">
+  <p:cSld>
+    <p:spTree>
+      <p:nvGrpSpPr>
+        <p:cNvPr id="1" name=""/>
+        <p:cNvGrpSpPr/>
+        <p:nvPr/>
+      </p:nvGrpSpPr>
+      <p:grpSpPr>
+        <a:xfrm>
+          <a:off x="0" y="0"/>
+          <a:ext cx="0" cy="0"/>
+          <a:chOff x="0" y="0"/>
+          <a:chExt cx="0" cy="0"/>
+        </a:xfrm>
+      </p:grpSpPr>
+      <p:sp>
+        <p:nvSpPr>
+          <p:cNvPr id="2" name="Content Placeholder 1"/>
+          <p:cNvSpPr>
+            <a:spLocks noGrp="1"/>
+          </p:cNvSpPr>
+          <p:nvPr>
+            <p:ph idx="1"/>
+          </p:nvPr>
+        </p:nvSpPr>
+        <p:spPr>
+          <a:xfrm>
+            <a:off x="395536" y="1484785"/>
+            <a:ext cx="6192688" cy="936103"/>
+          </a:xfrm>
+        </p:spPr>
+        <p:txBody>
+          <a:bodyPr>
+            <a:normAutofit/>
+          </a:bodyPr>
+          <a:lstStyle/>
+          <a:p>
+            <a:r>
+              <a:rPr lang="en-GB" sz="1600" dirty="0" smtClean="0"/>
+              <a:t>3 extra parameters for the drug expression</a:t>
+            </a:r>
+          </a:p>
+          <a:p>
+            <a:r>
+              <a:rPr lang="en-GB" sz="1600" dirty="0" smtClean="0"/>
+              <a:t>These can be related to empirical pharmacokinetic data, </a:t>
+            </a:r>
+            <a:r>
+              <a:rPr lang="en-GB" sz="1600" i="1" dirty="0" err="1" smtClean="0"/>
+              <a:t>viz</a:t>
+            </a:r>
+            <a:endParaRPr lang="en-GB" sz="1600" i="1" dirty="0" smtClean="0"/>
+          </a:p>
+          <a:p>
+            <a:endParaRPr lang="en-GB" sz="1600" dirty="0"/>
+          </a:p>
+        </p:txBody>
+      </p:sp>
+      <p:sp>
+        <p:nvSpPr>
+          <p:cNvPr id="4" name="Slide Number Placeholder 3"/>
+          <p:cNvSpPr>
+            <a:spLocks noGrp="1"/>
+          </p:cNvSpPr>
+          <p:nvPr>
+            <p:ph type="sldNum" sz="quarter" idx="4"/>
+          </p:nvPr>
+        </p:nvSpPr>
+        <p:spPr/>
+        <p:txBody>
+          <a:bodyPr/>
+          <a:lstStyle/>
+          <a:p>
+            <a:fld id="{57E314E1-448B-4E82-884A-39F65482640B}" type="slidenum">
+              <a:rPr lang="en-GB" smtClean="0"/>
+              <a:t>16</a:t>
+            </a:fld>
+            <a:endParaRPr lang="en-GB" dirty="0"/>
+          </a:p>
+        </p:txBody>
+      </p:sp>
+      <p:sp>
+        <p:nvSpPr>
+          <p:cNvPr id="6" name="Title 2"/>
+          <p:cNvSpPr txBox="1">
+            <a:spLocks/>
+          </p:cNvSpPr>
+          <p:nvPr/>
+        </p:nvSpPr>
+        <p:spPr>
+          <a:xfrm>
+            <a:off x="251520" y="427038"/>
+            <a:ext cx="8712968" cy="1143000"/>
+          </a:xfrm>
+          <a:prstGeom prst="rect">
+            <a:avLst/>
+          </a:prstGeom>
+        </p:spPr>
+        <p:txBody>
+          <a:bodyPr vert="horz" rtlCol="0" anchor="ctr">
+            <a:normAutofit fontScale="97500"/>
+            <a:scene3d>
+              <a:camera prst="orthographicFront"/>
+              <a:lightRig rig="soft" dir="t"/>
+            </a:scene3d>
+            <a:sp3d prstMaterial="softEdge">
+              <a:bevelT w="25400" h="25400"/>
+            </a:sp3d>
+          </a:bodyPr>
+          <a:lstStyle>
+            <a:lvl1pPr algn="l" rtl="0" eaLnBrk="1" latinLnBrk="0" hangingPunct="1">
+              <a:spcBef>
+                <a:spcPct val="0"/>
+              </a:spcBef>
+              <a:buNone/>
+              <a:defRPr kumimoji="0" sz="4100" b="1" kern="1200">
+                <a:solidFill>
+                  <a:schemeClr val="tx2"/>
+                </a:solidFill>
+                <a:effectLst>
+                  <a:outerShdw blurRad="31750" dist="25400" dir="5400000" algn="tl" rotWithShape="0">
+                    <a:srgbClr val="000000">
+                      <a:alpha val="25000"/>
+                    </a:srgbClr>
+                  </a:outerShdw>
+                </a:effectLst>
+                <a:latin typeface="+mj-lt"/>
+                <a:ea typeface="+mj-ea"/>
+                <a:cs typeface="+mj-cs"/>
+              </a:defRPr>
+            </a:lvl1pPr>
+            <a:extLst/>
+          </a:lstStyle>
+          <a:p>
+            <a:r>
+              <a:rPr lang="en-GB" dirty="0" smtClean="0"/>
+              <a:t>Extensions 2:</a:t>
+            </a:r>
+            <a:r>
+              <a:rPr lang="en-GB" sz="3100" dirty="0" smtClean="0"/>
+              <a:t> Influence of antiviral drugs</a:t>
+            </a:r>
+            <a:endParaRPr lang="en-GB" sz="3100" dirty="0"/>
+          </a:p>
+        </p:txBody>
+      </p:sp>
+      <p:pic>
+        <p:nvPicPr>
+          <p:cNvPr id="2051" name="Picture 3"/>
+          <p:cNvPicPr>
+            <a:picLocks noChangeAspect="1" noChangeArrowheads="1"/>
+          </p:cNvPicPr>
+          <p:nvPr/>
+        </p:nvPicPr>
+        <p:blipFill rotWithShape="1">
+          <a:blip r:embed="rId2">
+            <a:extLst>
+              <a:ext uri="{28A0092B-C50C-407E-A947-70E740481C1C}">
+                <a14:useLocalDpi xmlns:a14="http://schemas.microsoft.com/office/drawing/2010/main" val="0"/>
+              </a:ext>
+            </a:extLst>
+          </a:blip>
+          <a:srcRect l="59505" t="67093" r="14345" b="18433"/>
+          <a:stretch/>
+        </p:blipFill>
+        <p:spPr bwMode="auto">
+          <a:xfrm>
+            <a:off x="6516216" y="1444164"/>
+            <a:ext cx="2304256" cy="717399"/>
+          </a:xfrm>
+          <a:prstGeom prst="rect">
+            <a:avLst/>
+          </a:prstGeom>
+          <a:noFill/>
+          <a:ln>
+            <a:noFill/>
+          </a:ln>
+          <a:effectLst/>
+          <a:extLst>
+            <a:ext uri="{909E8E84-426E-40DD-AFC4-6F175D3DCCD1}">
+              <a14:hiddenFill xmlns:a14="http://schemas.microsoft.com/office/drawing/2010/main">
+                <a:solidFill>
+                  <a:schemeClr val="accent1"/>
+                </a:solidFill>
+              </a14:hiddenFill>
+            </a:ext>
+            <a:ext uri="{91240B29-F687-4F45-9708-019B960494DF}">
+              <a14:hiddenLine xmlns:a14="http://schemas.microsoft.com/office/drawing/2010/main" w="9525">
+                <a:solidFill>
+                  <a:schemeClr val="tx1"/>
+                </a:solidFill>
+                <a:miter lim="800000"/>
+                <a:headEnd/>
+                <a:tailEnd/>
+              </a14:hiddenLine>
+            </a:ext>
+            <a:ext uri="{AF507438-7753-43E0-B8FC-AC1667EBCBE1}">
+              <a14:hiddenEffects xmlns:a14="http://schemas.microsoft.com/office/drawing/2010/main">
+                <a:effectLst>
+                  <a:outerShdw dist="35921" dir="2700000" algn="ctr" rotWithShape="0">
+                    <a:schemeClr val="bg2"/>
+                  </a:outerShdw>
+                </a:effectLst>
+              </a14:hiddenEffects>
+            </a:ext>
+          </a:extLst>
+        </p:spPr>
+      </p:pic>
+      <p:pic>
+        <p:nvPicPr>
+          <p:cNvPr id="11" name="Picture 3"/>
+          <p:cNvPicPr>
+            <a:picLocks noChangeAspect="1" noChangeArrowheads="1"/>
+          </p:cNvPicPr>
+          <p:nvPr/>
+        </p:nvPicPr>
+        <p:blipFill>
+          <a:blip r:embed="rId3" cstate="print">
+            <a:extLst>
+              <a:ext uri="{28A0092B-C50C-407E-A947-70E740481C1C}">
+                <a14:useLocalDpi xmlns:a14="http://schemas.microsoft.com/office/drawing/2010/main" val="0"/>
+              </a:ext>
+            </a:extLst>
+          </a:blip>
+          <a:srcRect/>
+          <a:stretch>
+            <a:fillRect/>
+          </a:stretch>
+        </p:blipFill>
+        <p:spPr bwMode="auto">
+          <a:xfrm>
+            <a:off x="4148580" y="2386162"/>
+            <a:ext cx="4735271" cy="2376264"/>
+          </a:xfrm>
+          <a:prstGeom prst="rect">
+            <a:avLst/>
+          </a:prstGeom>
+          <a:noFill/>
+          <a:ln>
+            <a:noFill/>
+          </a:ln>
+          <a:effectLst/>
+          <a:extLst>
+            <a:ext uri="{909E8E84-426E-40DD-AFC4-6F175D3DCCD1}">
+              <a14:hiddenFill xmlns:a14="http://schemas.microsoft.com/office/drawing/2010/main">
+                <a:solidFill>
+                  <a:schemeClr val="accent1"/>
+                </a:solidFill>
+              </a14:hiddenFill>
+            </a:ext>
+            <a:ext uri="{91240B29-F687-4F45-9708-019B960494DF}">
+              <a14:hiddenLine xmlns:a14="http://schemas.microsoft.com/office/drawing/2010/main" w="9525">
+                <a:solidFill>
+                  <a:schemeClr val="tx1"/>
+                </a:solidFill>
+                <a:miter lim="800000"/>
+                <a:headEnd/>
+                <a:tailEnd/>
+              </a14:hiddenLine>
+            </a:ext>
+            <a:ext uri="{AF507438-7753-43E0-B8FC-AC1667EBCBE1}">
+              <a14:hiddenEffects xmlns:a14="http://schemas.microsoft.com/office/drawing/2010/main">
+                <a:effectLst>
+                  <a:outerShdw dist="35921" dir="2700000" algn="ctr" rotWithShape="0">
+                    <a:schemeClr val="bg2"/>
+                  </a:outerShdw>
+                </a:effectLst>
+              </a14:hiddenEffects>
+            </a:ext>
+          </a:extLst>
+        </p:spPr>
+      </p:pic>
+      <p:pic>
+        <p:nvPicPr>
+          <p:cNvPr id="2052" name="Picture 4"/>
+          <p:cNvPicPr>
+            <a:picLocks noChangeAspect="1" noChangeArrowheads="1"/>
+          </p:cNvPicPr>
+          <p:nvPr/>
+        </p:nvPicPr>
+        <p:blipFill rotWithShape="1">
+          <a:blip r:embed="rId4">
+            <a:extLst>
+              <a:ext uri="{28A0092B-C50C-407E-A947-70E740481C1C}">
+                <a14:useLocalDpi xmlns:a14="http://schemas.microsoft.com/office/drawing/2010/main" val="0"/>
+              </a:ext>
+            </a:extLst>
+          </a:blip>
+          <a:srcRect l="18540" t="45903" r="41770" b="19056"/>
+          <a:stretch/>
+        </p:blipFill>
+        <p:spPr bwMode="auto">
+          <a:xfrm>
+            <a:off x="683191" y="2600176"/>
+            <a:ext cx="3772863" cy="1873671"/>
+          </a:xfrm>
+          <a:prstGeom prst="rect">
+            <a:avLst/>
+          </a:prstGeom>
+          <a:noFill/>
+          <a:ln>
+            <a:noFill/>
+          </a:ln>
+          <a:effectLst/>
+          <a:extLst>
+            <a:ext uri="{909E8E84-426E-40DD-AFC4-6F175D3DCCD1}">
+              <a14:hiddenFill xmlns:a14="http://schemas.microsoft.com/office/drawing/2010/main">
+                <a:solidFill>
+                  <a:schemeClr val="accent1"/>
+                </a:solidFill>
+              </a14:hiddenFill>
+            </a:ext>
+            <a:ext uri="{91240B29-F687-4F45-9708-019B960494DF}">
+              <a14:hiddenLine xmlns:a14="http://schemas.microsoft.com/office/drawing/2010/main" w="9525">
+                <a:solidFill>
+                  <a:schemeClr val="tx1"/>
+                </a:solidFill>
+                <a:miter lim="800000"/>
+                <a:headEnd/>
+                <a:tailEnd/>
+              </a14:hiddenLine>
+            </a:ext>
+            <a:ext uri="{AF507438-7753-43E0-B8FC-AC1667EBCBE1}">
+              <a14:hiddenEffects xmlns:a14="http://schemas.microsoft.com/office/drawing/2010/main">
+                <a:effectLst>
+                  <a:outerShdw dist="35921" dir="2700000" algn="ctr" rotWithShape="0">
+                    <a:schemeClr val="bg2"/>
+                  </a:outerShdw>
+                </a:effectLst>
+              </a14:hiddenEffects>
+            </a:ext>
+          </a:extLst>
+        </p:spPr>
+      </p:pic>
+      <p:sp>
+        <p:nvSpPr>
+          <p:cNvPr id="12" name="Content Placeholder 1"/>
+          <p:cNvSpPr txBox="1">
+            <a:spLocks/>
+          </p:cNvSpPr>
+          <p:nvPr/>
+        </p:nvSpPr>
+        <p:spPr>
+          <a:xfrm>
+            <a:off x="582054" y="4762426"/>
+            <a:ext cx="7884229" cy="936103"/>
+          </a:xfrm>
+          <a:prstGeom prst="rect">
+            <a:avLst/>
+          </a:prstGeom>
+        </p:spPr>
+        <p:txBody>
+          <a:bodyPr vert="horz">
+            <a:normAutofit/>
+          </a:bodyPr>
+          <a:lstStyle>
+            <a:lvl1pPr marL="365760" indent="-256032" algn="l" rtl="0" eaLnBrk="1" latinLnBrk="0" hangingPunct="1">
+              <a:spcBef>
+                <a:spcPts val="400"/>
+              </a:spcBef>
+              <a:spcAft>
+                <a:spcPts val="0"/>
+              </a:spcAft>
+              <a:buClr>
+                <a:schemeClr val="accent1"/>
+              </a:buClr>
+              <a:buSzPct val="68000"/>
+              <a:buFont typeface="Wingdings 3"/>
+              <a:buChar char=""/>
+              <a:defRPr kumimoji="0" sz="2700" kern="1200">
+                <a:solidFill>
+                  <a:schemeClr val="tx1"/>
+                </a:solidFill>
+                <a:latin typeface="+mn-lt"/>
+                <a:ea typeface="+mn-ea"/>
+                <a:cs typeface="+mn-cs"/>
+              </a:defRPr>
+            </a:lvl1pPr>
+            <a:lvl2pPr marL="621792" indent="-228600" algn="l" rtl="0" eaLnBrk="1" latinLnBrk="0" hangingPunct="1">
+              <a:spcBef>
+                <a:spcPts val="324"/>
+              </a:spcBef>
+              <a:buClr>
+                <a:schemeClr val="accent1"/>
+              </a:buClr>
+              <a:buFont typeface="Verdana"/>
+              <a:buChar char="◦"/>
+              <a:defRPr kumimoji="0" sz="2300" kern="1200">
+                <a:solidFill>
+                  <a:schemeClr val="tx1"/>
+                </a:solidFill>
+                <a:latin typeface="+mn-lt"/>
+                <a:ea typeface="+mn-ea"/>
+                <a:cs typeface="+mn-cs"/>
+              </a:defRPr>
+            </a:lvl2pPr>
+            <a:lvl3pPr marL="859536" indent="-228600" algn="l" rtl="0" eaLnBrk="1" latinLnBrk="0" hangingPunct="1">
+              <a:spcBef>
+                <a:spcPts val="350"/>
+              </a:spcBef>
+              <a:buClr>
+                <a:schemeClr val="accent2"/>
+              </a:buClr>
+              <a:buSzPct val="100000"/>
+              <a:buFont typeface="Wingdings 2"/>
+              <a:buChar char=""/>
+              <a:defRPr kumimoji="0" sz="2100" kern="1200">
+                <a:solidFill>
+                  <a:schemeClr val="tx1"/>
+                </a:solidFill>
+                <a:latin typeface="+mn-lt"/>
+                <a:ea typeface="+mn-ea"/>
+                <a:cs typeface="+mn-cs"/>
+              </a:defRPr>
+            </a:lvl3pPr>
+            <a:lvl4pPr marL="1143000" indent="-228600" algn="l" rtl="0" eaLnBrk="1" latinLnBrk="0" hangingPunct="1">
+              <a:spcBef>
+                <a:spcPts val="350"/>
+              </a:spcBef>
+              <a:buClr>
+                <a:schemeClr val="accent2"/>
+              </a:buClr>
+              <a:buFont typeface="Wingdings 2"/>
+              <a:buChar char=""/>
+              <a:defRPr kumimoji="0" sz="1900" kern="1200">
+                <a:solidFill>
+                  <a:schemeClr val="tx1"/>
+                </a:solidFill>
+                <a:latin typeface="+mn-lt"/>
+                <a:ea typeface="+mn-ea"/>
+                <a:cs typeface="+mn-cs"/>
+              </a:defRPr>
+            </a:lvl4pPr>
+            <a:lvl5pPr marL="1371600" indent="-228600" algn="l" rtl="0" eaLnBrk="1" latinLnBrk="0" hangingPunct="1">
+              <a:spcBef>
+                <a:spcPts val="350"/>
+              </a:spcBef>
+              <a:buClr>
+                <a:schemeClr val="accent2"/>
+              </a:buClr>
+              <a:buFont typeface="Wingdings 2"/>
+              <a:buChar char=""/>
+              <a:defRPr kumimoji="0" sz="1800" kern="1200">
+                <a:solidFill>
+                  <a:schemeClr val="tx1"/>
+                </a:solidFill>
+                <a:latin typeface="+mn-lt"/>
+                <a:ea typeface="+mn-ea"/>
+                <a:cs typeface="+mn-cs"/>
+              </a:defRPr>
+            </a:lvl5pPr>
+            <a:lvl6pPr marL="1600200" indent="-228600" algn="l" rtl="0" eaLnBrk="1" latinLnBrk="0" hangingPunct="1">
+              <a:spcBef>
+                <a:spcPts val="350"/>
+              </a:spcBef>
+              <a:buClr>
+                <a:schemeClr val="accent3"/>
+              </a:buClr>
+              <a:buFont typeface="Wingdings 2"/>
+              <a:buChar char=""/>
+              <a:defRPr kumimoji="0" sz="1800" kern="1200">
+                <a:solidFill>
+                  <a:schemeClr val="tx1"/>
+                </a:solidFill>
+                <a:latin typeface="+mn-lt"/>
+                <a:ea typeface="+mn-ea"/>
+                <a:cs typeface="+mn-cs"/>
+              </a:defRPr>
+            </a:lvl6pPr>
+            <a:lvl7pPr marL="1828800" indent="-228600" algn="l" rtl="0" eaLnBrk="1" latinLnBrk="0" hangingPunct="1">
+              <a:spcBef>
+                <a:spcPts val="350"/>
+              </a:spcBef>
+              <a:buClr>
+                <a:schemeClr val="accent3"/>
+              </a:buClr>
+              <a:buFont typeface="Wingdings 2"/>
+              <a:buChar char=""/>
+              <a:defRPr kumimoji="0" sz="1600" kern="1200">
+                <a:solidFill>
+                  <a:schemeClr val="tx1"/>
+                </a:solidFill>
+                <a:latin typeface="+mn-lt"/>
+                <a:ea typeface="+mn-ea"/>
+                <a:cs typeface="+mn-cs"/>
+              </a:defRPr>
+            </a:lvl7pPr>
+            <a:lvl8pPr marL="2057400" indent="-228600" algn="l" rtl="0" eaLnBrk="1" latinLnBrk="0" hangingPunct="1">
+              <a:spcBef>
+                <a:spcPts val="350"/>
+              </a:spcBef>
+              <a:buClr>
+                <a:schemeClr val="accent3"/>
+              </a:buClr>
+              <a:buFont typeface="Wingdings 2"/>
+              <a:buChar char=""/>
+              <a:defRPr kumimoji="0" sz="1600" kern="1200">
+                <a:solidFill>
+                  <a:schemeClr val="tx1"/>
+                </a:solidFill>
+                <a:latin typeface="+mn-lt"/>
+                <a:ea typeface="+mn-ea"/>
+                <a:cs typeface="+mn-cs"/>
+              </a:defRPr>
+            </a:lvl8pPr>
+            <a:lvl9pPr marL="2286000" indent="-228600" algn="l" rtl="0" eaLnBrk="1" latinLnBrk="0" hangingPunct="1">
+              <a:spcBef>
+                <a:spcPts val="350"/>
+              </a:spcBef>
+              <a:buClr>
+                <a:schemeClr val="accent3"/>
+              </a:buClr>
+              <a:buFont typeface="Wingdings 2"/>
+              <a:buChar char=""/>
+              <a:defRPr kumimoji="0" sz="1600" kern="1200" baseline="0">
+                <a:solidFill>
+                  <a:schemeClr val="tx1"/>
+                </a:solidFill>
+                <a:latin typeface="+mn-lt"/>
+                <a:ea typeface="+mn-ea"/>
+                <a:cs typeface="+mn-cs"/>
+              </a:defRPr>
+            </a:lvl9pPr>
+            <a:extLst/>
+          </a:lstStyle>
+          <a:p>
+            <a:r>
+              <a:rPr lang="en-GB" sz="1600" dirty="0" smtClean="0"/>
+              <a:t>A fourth parameter was introduced to control the time of administration (curve x-offset)</a:t>
+            </a:r>
+          </a:p>
+        </p:txBody>
+      </p:sp>
+    </p:spTree>
+    <p:extLst>
+      <p:ext uri="{BB962C8B-B14F-4D97-AF65-F5344CB8AC3E}">
+        <p14:creationId xmlns:p14="http://schemas.microsoft.com/office/powerpoint/2010/main" val="3688567679"/>
+      </p:ext>
+    </p:extLst>
+  </p:cSld>
+  <p:clrMapOvr>
+    <a:masterClrMapping/>
+  </p:clrMapOvr>
+</p:sld>
+</file>
+
+<file path=ppt/slides/slide17.xml><?xml version="1.0" encoding="utf-8"?>
+<p:sld xmlns:a="http://schemas.openxmlformats.org/drawingml/2006/main" xmlns:r="http://schemas.openxmlformats.org/officeDocument/2006/relationships" xmlns:p="http://schemas.openxmlformats.org/presentationml/2006/main">
+  <p:cSld>
+    <p:spTree>
+      <p:nvGrpSpPr>
+        <p:cNvPr id="1" name=""/>
+        <p:cNvGrpSpPr/>
+        <p:nvPr/>
+      </p:nvGrpSpPr>
+      <p:grpSpPr>
+        <a:xfrm>
+          <a:off x="0" y="0"/>
+          <a:ext cx="0" cy="0"/>
+          <a:chOff x="0" y="0"/>
+          <a:chExt cx="0" cy="0"/>
+        </a:xfrm>
+      </p:grpSpPr>
+      <p:sp>
+        <p:nvSpPr>
+          <p:cNvPr id="2" name="Content Placeholder 1"/>
+          <p:cNvSpPr>
+            <a:spLocks noGrp="1"/>
+          </p:cNvSpPr>
+          <p:nvPr>
+            <p:ph idx="1"/>
+          </p:nvPr>
+        </p:nvSpPr>
+        <p:spPr/>
+        <p:txBody>
+          <a:bodyPr/>
+          <a:lstStyle/>
+          <a:p>
+            <a:r>
+              <a:rPr lang="en-GB" dirty="0" smtClean="0"/>
+              <a:t>Increasing drug dose delayed onset of viral peak, ultimately removing it:</a:t>
+            </a:r>
+          </a:p>
+          <a:p>
+            <a:endParaRPr lang="en-GB" dirty="0"/>
+          </a:p>
+        </p:txBody>
+      </p:sp>
+      <p:sp>
+        <p:nvSpPr>
+          <p:cNvPr id="4" name="Slide Number Placeholder 3"/>
+          <p:cNvSpPr>
+            <a:spLocks noGrp="1"/>
+          </p:cNvSpPr>
+          <p:nvPr>
+            <p:ph type="sldNum" sz="quarter" idx="4"/>
+          </p:nvPr>
+        </p:nvSpPr>
+        <p:spPr/>
+        <p:txBody>
+          <a:bodyPr/>
+          <a:lstStyle/>
+          <a:p>
+            <a:fld id="{57E314E1-448B-4E82-884A-39F65482640B}" type="slidenum">
+              <a:rPr lang="en-GB" smtClean="0"/>
+              <a:t>17</a:t>
+            </a:fld>
+            <a:endParaRPr lang="en-GB" dirty="0"/>
+          </a:p>
+        </p:txBody>
+      </p:sp>
+      <p:sp>
+        <p:nvSpPr>
+          <p:cNvPr id="6" name="Title 2"/>
+          <p:cNvSpPr txBox="1">
+            <a:spLocks/>
+          </p:cNvSpPr>
+          <p:nvPr/>
+        </p:nvSpPr>
+        <p:spPr>
+          <a:xfrm>
+            <a:off x="251520" y="427038"/>
+            <a:ext cx="8712968" cy="1143000"/>
+          </a:xfrm>
+          <a:prstGeom prst="rect">
+            <a:avLst/>
+          </a:prstGeom>
+        </p:spPr>
+        <p:txBody>
+          <a:bodyPr vert="horz" rtlCol="0" anchor="ctr">
+            <a:normAutofit fontScale="97500"/>
+            <a:scene3d>
+              <a:camera prst="orthographicFront"/>
+              <a:lightRig rig="soft" dir="t"/>
+            </a:scene3d>
+            <a:sp3d prstMaterial="softEdge">
+              <a:bevelT w="25400" h="25400"/>
+            </a:sp3d>
+          </a:bodyPr>
+          <a:lstStyle>
+            <a:lvl1pPr algn="l" rtl="0" eaLnBrk="1" latinLnBrk="0" hangingPunct="1">
+              <a:spcBef>
+                <a:spcPct val="0"/>
+              </a:spcBef>
+              <a:buNone/>
+              <a:defRPr kumimoji="0" sz="4100" b="1" kern="1200">
+                <a:solidFill>
+                  <a:schemeClr val="tx2"/>
+                </a:solidFill>
+                <a:effectLst>
+                  <a:outerShdw blurRad="31750" dist="25400" dir="5400000" algn="tl" rotWithShape="0">
+                    <a:srgbClr val="000000">
+                      <a:alpha val="25000"/>
+                    </a:srgbClr>
+                  </a:outerShdw>
+                </a:effectLst>
+                <a:latin typeface="+mj-lt"/>
+                <a:ea typeface="+mj-ea"/>
+                <a:cs typeface="+mj-cs"/>
+              </a:defRPr>
+            </a:lvl1pPr>
+            <a:extLst/>
+          </a:lstStyle>
+          <a:p>
+            <a:r>
+              <a:rPr lang="en-GB" dirty="0" smtClean="0"/>
+              <a:t>Extensions 2:</a:t>
+            </a:r>
+            <a:r>
+              <a:rPr lang="en-GB" sz="3100" dirty="0" smtClean="0"/>
+              <a:t> </a:t>
+            </a:r>
+            <a:r>
+              <a:rPr lang="en-GB" sz="3100" dirty="0"/>
+              <a:t>D</a:t>
+            </a:r>
+            <a:r>
+              <a:rPr lang="en-GB" sz="3100" dirty="0" smtClean="0"/>
+              <a:t>rugging – some results</a:t>
+            </a:r>
+            <a:endParaRPr lang="en-GB" sz="3100" dirty="0"/>
+          </a:p>
+        </p:txBody>
+      </p:sp>
+      <p:pic>
+        <p:nvPicPr>
+          <p:cNvPr id="3074" name="Picture 2"/>
+          <p:cNvPicPr>
+            <a:picLocks noChangeAspect="1" noChangeArrowheads="1"/>
+          </p:cNvPicPr>
+          <p:nvPr/>
+        </p:nvPicPr>
+        <p:blipFill>
+          <a:blip r:embed="rId2">
+            <a:extLst>
+              <a:ext uri="{28A0092B-C50C-407E-A947-70E740481C1C}">
+                <a14:useLocalDpi xmlns:a14="http://schemas.microsoft.com/office/drawing/2010/main" val="0"/>
+              </a:ext>
+            </a:extLst>
+          </a:blip>
+          <a:srcRect/>
+          <a:stretch>
+            <a:fillRect/>
+          </a:stretch>
+        </p:blipFill>
+        <p:spPr bwMode="auto">
+          <a:xfrm>
+            <a:off x="1403648" y="2348880"/>
+            <a:ext cx="6624736" cy="3650016"/>
+          </a:xfrm>
+          <a:prstGeom prst="rect">
+            <a:avLst/>
+          </a:prstGeom>
+          <a:noFill/>
+          <a:ln>
+            <a:noFill/>
+          </a:ln>
+          <a:effectLst/>
+          <a:extLst>
+            <a:ext uri="{909E8E84-426E-40DD-AFC4-6F175D3DCCD1}">
+              <a14:hiddenFill xmlns:a14="http://schemas.microsoft.com/office/drawing/2010/main">
+                <a:solidFill>
+                  <a:schemeClr val="accent1"/>
+                </a:solidFill>
+              </a14:hiddenFill>
+            </a:ext>
+            <a:ext uri="{91240B29-F687-4F45-9708-019B960494DF}">
+              <a14:hiddenLine xmlns:a14="http://schemas.microsoft.com/office/drawing/2010/main" w="9525">
+                <a:solidFill>
+                  <a:schemeClr val="tx1"/>
+                </a:solidFill>
+                <a:miter lim="800000"/>
+                <a:headEnd/>
+                <a:tailEnd/>
+              </a14:hiddenLine>
+            </a:ext>
+            <a:ext uri="{AF507438-7753-43E0-B8FC-AC1667EBCBE1}">
+              <a14:hiddenEffects xmlns:a14="http://schemas.microsoft.com/office/drawing/2010/main">
+                <a:effectLst>
+                  <a:outerShdw dist="35921" dir="2700000" algn="ctr" rotWithShape="0">
+                    <a:schemeClr val="bg2"/>
+                  </a:outerShdw>
+                </a:effectLst>
+              </a14:hiddenEffects>
+            </a:ext>
+          </a:extLst>
+        </p:spPr>
+      </p:pic>
+      <p:sp>
+        <p:nvSpPr>
+          <p:cNvPr id="7" name="TextBox 6"/>
+          <p:cNvSpPr txBox="1"/>
+          <p:nvPr/>
+        </p:nvSpPr>
+        <p:spPr>
+          <a:xfrm>
+            <a:off x="3923928" y="5905722"/>
+            <a:ext cx="1944216" cy="369332"/>
+          </a:xfrm>
+          <a:prstGeom prst="rect">
+            <a:avLst/>
+          </a:prstGeom>
+          <a:solidFill>
+            <a:schemeClr val="bg1"/>
+          </a:solidFill>
+        </p:spPr>
+        <p:txBody>
+          <a:bodyPr wrap="square" rtlCol="0">
+            <a:spAutoFit/>
+          </a:bodyPr>
+          <a:lstStyle/>
+          <a:p>
+            <a:r>
+              <a:rPr lang="en-GB" dirty="0" smtClean="0"/>
+              <a:t>time / days</a:t>
+            </a:r>
+            <a:endParaRPr lang="en-GB" dirty="0"/>
+          </a:p>
+        </p:txBody>
+      </p:sp>
+      <p:sp>
+        <p:nvSpPr>
+          <p:cNvPr id="9" name="TextBox 8"/>
+          <p:cNvSpPr txBox="1"/>
+          <p:nvPr/>
+        </p:nvSpPr>
+        <p:spPr>
+          <a:xfrm rot="16200000">
+            <a:off x="261765" y="3922813"/>
+            <a:ext cx="2077035" cy="369332"/>
+          </a:xfrm>
+          <a:prstGeom prst="rect">
+            <a:avLst/>
+          </a:prstGeom>
+          <a:solidFill>
+            <a:schemeClr val="bg1"/>
+          </a:solidFill>
+        </p:spPr>
+        <p:txBody>
+          <a:bodyPr wrap="square" rtlCol="0">
+            <a:spAutoFit/>
+          </a:bodyPr>
+          <a:lstStyle/>
+          <a:p>
+            <a:r>
+              <a:rPr lang="en-GB" dirty="0" smtClean="0"/>
+              <a:t>Virus Population  </a:t>
+            </a:r>
+            <a:endParaRPr lang="en-GB" dirty="0"/>
+          </a:p>
+        </p:txBody>
+      </p:sp>
+      <p:sp>
+        <p:nvSpPr>
+          <p:cNvPr id="10" name="Right Arrow 9"/>
+          <p:cNvSpPr/>
+          <p:nvPr/>
+        </p:nvSpPr>
+        <p:spPr>
+          <a:xfrm>
+            <a:off x="3347864" y="2761191"/>
+            <a:ext cx="2088232" cy="144016"/>
+          </a:xfrm>
+          <a:prstGeom prst="rightArrow">
+            <a:avLst/>
+          </a:prstGeom>
+        </p:spPr>
+        <p:style>
+          <a:lnRef idx="2">
+            <a:schemeClr val="accent1">
+              <a:shade val="50000"/>
+            </a:schemeClr>
+          </a:lnRef>
+          <a:fillRef idx="1">
+            <a:schemeClr val="accent1"/>
+          </a:fillRef>
+          <a:effectRef idx="0">
+            <a:schemeClr val="accent1"/>
+          </a:effectRef>
+          <a:fontRef idx="minor">
+            <a:schemeClr val="lt1"/>
+          </a:fontRef>
+        </p:style>
+        <p:txBody>
+          <a:bodyPr rtlCol="0" anchor="ctr"/>
+          <a:lstStyle/>
+          <a:p>
+            <a:pPr algn="ctr"/>
+            <a:endParaRPr lang="en-GB"/>
+          </a:p>
+        </p:txBody>
+      </p:sp>
+      <p:sp>
+        <p:nvSpPr>
+          <p:cNvPr id="11" name="Bent Arrow 10"/>
+          <p:cNvSpPr/>
+          <p:nvPr/>
+        </p:nvSpPr>
+        <p:spPr>
+          <a:xfrm rot="5400000">
+            <a:off x="5616116" y="3351499"/>
+            <a:ext cx="1440160" cy="360040"/>
+          </a:xfrm>
+          <a:prstGeom prst="bentArrow">
+            <a:avLst/>
+          </a:prstGeom>
+        </p:spPr>
+        <p:style>
+          <a:lnRef idx="2">
+            <a:schemeClr val="accent1">
+              <a:shade val="50000"/>
+            </a:schemeClr>
+          </a:lnRef>
+          <a:fillRef idx="1">
+            <a:schemeClr val="accent1"/>
+          </a:fillRef>
+          <a:effectRef idx="0">
+            <a:schemeClr val="accent1"/>
+          </a:effectRef>
+          <a:fontRef idx="minor">
+            <a:schemeClr val="lt1"/>
+          </a:fontRef>
+        </p:style>
+        <p:txBody>
+          <a:bodyPr rtlCol="0" anchor="ctr"/>
+          <a:lstStyle/>
+          <a:p>
+            <a:pPr algn="ctr"/>
+            <a:endParaRPr lang="en-GB">
+              <a:solidFill>
+                <a:schemeClr val="tx1"/>
+              </a:solidFill>
+            </a:endParaRPr>
+          </a:p>
+        </p:txBody>
+      </p:sp>
+      <p:sp>
+        <p:nvSpPr>
+          <p:cNvPr id="20" name="Smiley Face 19"/>
+          <p:cNvSpPr/>
+          <p:nvPr/>
+        </p:nvSpPr>
+        <p:spPr>
+          <a:xfrm>
+            <a:off x="5820190" y="1967574"/>
+            <a:ext cx="432048" cy="432048"/>
+          </a:xfrm>
+          <a:prstGeom prst="smileyFace">
+            <a:avLst/>
+          </a:prstGeom>
+          <a:solidFill>
+            <a:srgbClr val="FFFF00"/>
+          </a:solidFill>
+          <a:ln w="12700">
+            <a:solidFill>
+              <a:schemeClr val="tx1"/>
+            </a:solidFill>
+          </a:ln>
+        </p:spPr>
+        <p:style>
+          <a:lnRef idx="2">
+            <a:schemeClr val="accent1">
+              <a:shade val="50000"/>
+            </a:schemeClr>
+          </a:lnRef>
+          <a:fillRef idx="1">
+            <a:schemeClr val="accent1"/>
+          </a:fillRef>
+          <a:effectRef idx="0">
+            <a:schemeClr val="accent1"/>
+          </a:effectRef>
+          <a:fontRef idx="minor">
+            <a:schemeClr val="lt1"/>
+          </a:fontRef>
+        </p:style>
+        <p:txBody>
+          <a:bodyPr rtlCol="0" anchor="ctr"/>
+          <a:lstStyle/>
+          <a:p>
+            <a:pPr algn="ctr"/>
+            <a:endParaRPr lang="en-GB"/>
+          </a:p>
+        </p:txBody>
+      </p:sp>
+      <p:sp>
+        <p:nvSpPr>
+          <p:cNvPr id="21" name="TextBox 20"/>
+          <p:cNvSpPr txBox="1"/>
+          <p:nvPr/>
+        </p:nvSpPr>
+        <p:spPr>
+          <a:xfrm>
+            <a:off x="3203848" y="6231510"/>
+            <a:ext cx="3888432" cy="253916"/>
+          </a:xfrm>
+          <a:prstGeom prst="rect">
+            <a:avLst/>
+          </a:prstGeom>
+          <a:noFill/>
+        </p:spPr>
+        <p:txBody>
+          <a:bodyPr wrap="square" rtlCol="0">
+            <a:spAutoFit/>
+          </a:bodyPr>
+          <a:lstStyle/>
+          <a:p>
+            <a:r>
+              <a:rPr lang="en-GB" sz="1050" dirty="0" err="1" smtClean="0"/>
+              <a:t>t</a:t>
+            </a:r>
+            <a:r>
+              <a:rPr lang="en-GB" sz="1050" baseline="-25000" dirty="0" err="1" smtClean="0"/>
+              <a:t>max</a:t>
+            </a:r>
+            <a:r>
+              <a:rPr lang="en-GB" sz="1050" dirty="0" smtClean="0"/>
+              <a:t> = 3, t</a:t>
+            </a:r>
+            <a:r>
+              <a:rPr lang="en-GB" sz="1050" baseline="-25000" dirty="0" smtClean="0"/>
+              <a:t>1/2</a:t>
+            </a:r>
+            <a:r>
+              <a:rPr lang="en-GB" sz="1050" dirty="0" smtClean="0"/>
+              <a:t> = 8, </a:t>
+            </a:r>
+            <a:r>
+              <a:rPr lang="en-GB" sz="1050" dirty="0" err="1" smtClean="0"/>
+              <a:t>t</a:t>
+            </a:r>
+            <a:r>
+              <a:rPr lang="en-GB" sz="1050" baseline="-25000" dirty="0" err="1" smtClean="0"/>
+              <a:t>offset</a:t>
+            </a:r>
+            <a:r>
+              <a:rPr lang="en-GB" sz="1050" dirty="0" smtClean="0"/>
+              <a:t> = 0, 0.1 &lt; </a:t>
+            </a:r>
+            <a:r>
+              <a:rPr lang="en-GB" sz="1050" dirty="0" err="1" smtClean="0"/>
+              <a:t>D</a:t>
+            </a:r>
+            <a:r>
+              <a:rPr lang="en-GB" sz="1050" baseline="-25000" dirty="0" err="1" smtClean="0"/>
+              <a:t>max</a:t>
+            </a:r>
+            <a:r>
+              <a:rPr lang="en-GB" sz="1050" dirty="0" smtClean="0"/>
+              <a:t> &lt; 1</a:t>
+            </a:r>
+            <a:endParaRPr lang="en-GB" sz="1050" dirty="0"/>
+          </a:p>
+        </p:txBody>
+      </p:sp>
+    </p:spTree>
+    <p:extLst>
+      <p:ext uri="{BB962C8B-B14F-4D97-AF65-F5344CB8AC3E}">
+        <p14:creationId xmlns:p14="http://schemas.microsoft.com/office/powerpoint/2010/main" val="2840665463"/>
+      </p:ext>
+    </p:extLst>
+  </p:cSld>
+  <p:clrMapOvr>
+    <a:masterClrMapping/>
+  </p:clrMapOvr>
+</p:sld>
+</file>
+
+<file path=ppt/slides/slide18.xml><?xml version="1.0" encoding="utf-8"?>
+<p:sld xmlns:a="http://schemas.openxmlformats.org/drawingml/2006/main" xmlns:r="http://schemas.openxmlformats.org/officeDocument/2006/relationships" xmlns:p="http://schemas.openxmlformats.org/presentationml/2006/main">
+  <p:cSld>
+    <p:spTree>
+      <p:nvGrpSpPr>
+        <p:cNvPr id="1" name=""/>
+        <p:cNvGrpSpPr/>
+        <p:nvPr/>
+      </p:nvGrpSpPr>
+      <p:grpSpPr>
+        <a:xfrm>
+          <a:off x="0" y="0"/>
+          <a:ext cx="0" cy="0"/>
+          <a:chOff x="0" y="0"/>
+          <a:chExt cx="0" cy="0"/>
+        </a:xfrm>
+      </p:grpSpPr>
+      <p:sp>
+        <p:nvSpPr>
+          <p:cNvPr id="2" name="Content Placeholder 1"/>
+          <p:cNvSpPr>
+            <a:spLocks noGrp="1"/>
+          </p:cNvSpPr>
+          <p:nvPr>
+            <p:ph idx="1"/>
+          </p:nvPr>
+        </p:nvSpPr>
+        <p:spPr/>
+        <p:txBody>
+          <a:bodyPr/>
+          <a:lstStyle/>
+          <a:p>
+            <a:r>
+              <a:rPr lang="en-GB" dirty="0" smtClean="0"/>
+              <a:t>Time of administration can be critical to treatment outcome:</a:t>
+            </a:r>
+            <a:endParaRPr lang="en-GB" dirty="0"/>
+          </a:p>
+        </p:txBody>
+      </p:sp>
+      <p:sp>
+        <p:nvSpPr>
+          <p:cNvPr id="4" name="Slide Number Placeholder 3"/>
+          <p:cNvSpPr>
+            <a:spLocks noGrp="1"/>
+          </p:cNvSpPr>
+          <p:nvPr>
+            <p:ph type="sldNum" sz="quarter" idx="4"/>
+          </p:nvPr>
+        </p:nvSpPr>
+        <p:spPr/>
+        <p:txBody>
+          <a:bodyPr/>
+          <a:lstStyle/>
+          <a:p>
+            <a:fld id="{57E314E1-448B-4E82-884A-39F65482640B}" type="slidenum">
+              <a:rPr lang="en-GB" smtClean="0"/>
+              <a:t>18</a:t>
+            </a:fld>
+            <a:endParaRPr lang="en-GB" dirty="0"/>
+          </a:p>
+        </p:txBody>
+      </p:sp>
+      <p:sp>
+        <p:nvSpPr>
+          <p:cNvPr id="5" name="Title 2"/>
+          <p:cNvSpPr txBox="1">
+            <a:spLocks/>
+          </p:cNvSpPr>
+          <p:nvPr/>
+        </p:nvSpPr>
+        <p:spPr>
+          <a:xfrm>
+            <a:off x="251520" y="427038"/>
+            <a:ext cx="8712968" cy="1143000"/>
+          </a:xfrm>
+          <a:prstGeom prst="rect">
+            <a:avLst/>
+          </a:prstGeom>
+        </p:spPr>
+        <p:txBody>
+          <a:bodyPr vert="horz" rtlCol="0" anchor="ctr">
+            <a:normAutofit fontScale="97500"/>
+            <a:scene3d>
+              <a:camera prst="orthographicFront"/>
+              <a:lightRig rig="soft" dir="t"/>
+            </a:scene3d>
+            <a:sp3d prstMaterial="softEdge">
+              <a:bevelT w="25400" h="25400"/>
+            </a:sp3d>
+          </a:bodyPr>
+          <a:lstStyle>
+            <a:lvl1pPr algn="l" rtl="0" eaLnBrk="1" latinLnBrk="0" hangingPunct="1">
+              <a:spcBef>
+                <a:spcPct val="0"/>
+              </a:spcBef>
+              <a:buNone/>
+              <a:defRPr kumimoji="0" sz="4100" b="1" kern="1200">
+                <a:solidFill>
+                  <a:schemeClr val="tx2"/>
+                </a:solidFill>
+                <a:effectLst>
+                  <a:outerShdw blurRad="31750" dist="25400" dir="5400000" algn="tl" rotWithShape="0">
+                    <a:srgbClr val="000000">
+                      <a:alpha val="25000"/>
+                    </a:srgbClr>
+                  </a:outerShdw>
+                </a:effectLst>
+                <a:latin typeface="+mj-lt"/>
+                <a:ea typeface="+mj-ea"/>
+                <a:cs typeface="+mj-cs"/>
+              </a:defRPr>
+            </a:lvl1pPr>
+            <a:extLst/>
+          </a:lstStyle>
+          <a:p>
+            <a:r>
+              <a:rPr lang="en-GB" dirty="0" smtClean="0"/>
+              <a:t>Extensions 2:</a:t>
+            </a:r>
+            <a:r>
+              <a:rPr lang="en-GB" sz="3100" dirty="0" smtClean="0"/>
+              <a:t> </a:t>
+            </a:r>
+            <a:r>
+              <a:rPr lang="en-GB" sz="3100" dirty="0"/>
+              <a:t>D</a:t>
+            </a:r>
+            <a:r>
+              <a:rPr lang="en-GB" sz="3100" dirty="0" smtClean="0"/>
+              <a:t>rugging – some results</a:t>
+            </a:r>
+            <a:endParaRPr lang="en-GB" sz="3100" dirty="0"/>
+          </a:p>
+        </p:txBody>
+      </p:sp>
+      <p:pic>
+        <p:nvPicPr>
+          <p:cNvPr id="1027" name="Picture 3"/>
+          <p:cNvPicPr>
+            <a:picLocks noChangeAspect="1" noChangeArrowheads="1"/>
+          </p:cNvPicPr>
+          <p:nvPr/>
+        </p:nvPicPr>
+        <p:blipFill rotWithShape="1">
+          <a:blip r:embed="rId3" cstate="print">
+            <a:extLst>
+              <a:ext uri="{28A0092B-C50C-407E-A947-70E740481C1C}">
+                <a14:useLocalDpi xmlns:a14="http://schemas.microsoft.com/office/drawing/2010/main" val="0"/>
+              </a:ext>
+            </a:extLst>
+          </a:blip>
+          <a:srcRect l="25281" t="9509" r="23935" b="4463"/>
+          <a:stretch/>
+        </p:blipFill>
+        <p:spPr bwMode="auto">
+          <a:xfrm>
+            <a:off x="6120137" y="2564904"/>
+            <a:ext cx="2720509" cy="2592288"/>
+          </a:xfrm>
+          <a:prstGeom prst="rect">
+            <a:avLst/>
+          </a:prstGeom>
+          <a:noFill/>
+          <a:ln>
+            <a:noFill/>
+          </a:ln>
+          <a:effectLst/>
+          <a:extLst>
+            <a:ext uri="{909E8E84-426E-40DD-AFC4-6F175D3DCCD1}">
+              <a14:hiddenFill xmlns:a14="http://schemas.microsoft.com/office/drawing/2010/main">
+                <a:solidFill>
+                  <a:schemeClr val="accent1"/>
+                </a:solidFill>
+              </a14:hiddenFill>
+            </a:ext>
+            <a:ext uri="{91240B29-F687-4F45-9708-019B960494DF}">
+              <a14:hiddenLine xmlns:a14="http://schemas.microsoft.com/office/drawing/2010/main" w="9525">
+                <a:solidFill>
+                  <a:schemeClr val="tx1"/>
+                </a:solidFill>
+                <a:miter lim="800000"/>
+                <a:headEnd/>
+                <a:tailEnd/>
+              </a14:hiddenLine>
+            </a:ext>
+            <a:ext uri="{AF507438-7753-43E0-B8FC-AC1667EBCBE1}">
+              <a14:hiddenEffects xmlns:a14="http://schemas.microsoft.com/office/drawing/2010/main">
+                <a:effectLst>
+                  <a:outerShdw dist="35921" dir="2700000" algn="ctr" rotWithShape="0">
+                    <a:schemeClr val="bg2"/>
+                  </a:outerShdw>
+                </a:effectLst>
+              </a14:hiddenEffects>
+            </a:ext>
+          </a:extLst>
+        </p:spPr>
+      </p:pic>
+      <p:pic>
+        <p:nvPicPr>
+          <p:cNvPr id="1028" name="Picture 4"/>
+          <p:cNvPicPr>
+            <a:picLocks noChangeAspect="1" noChangeArrowheads="1"/>
+          </p:cNvPicPr>
+          <p:nvPr/>
+        </p:nvPicPr>
+        <p:blipFill rotWithShape="1">
+          <a:blip r:embed="rId4" cstate="print">
+            <a:extLst>
+              <a:ext uri="{28A0092B-C50C-407E-A947-70E740481C1C}">
+                <a14:useLocalDpi xmlns:a14="http://schemas.microsoft.com/office/drawing/2010/main" val="0"/>
+              </a:ext>
+            </a:extLst>
+          </a:blip>
+          <a:srcRect l="22473" t="8751" r="22078" b="4472"/>
+          <a:stretch/>
+        </p:blipFill>
+        <p:spPr bwMode="auto">
+          <a:xfrm>
+            <a:off x="542166" y="2636912"/>
+            <a:ext cx="2802087" cy="2466652"/>
+          </a:xfrm>
+          <a:prstGeom prst="rect">
+            <a:avLst/>
+          </a:prstGeom>
+          <a:noFill/>
+          <a:ln>
+            <a:noFill/>
+          </a:ln>
+          <a:effectLst/>
+          <a:extLst>
+            <a:ext uri="{909E8E84-426E-40DD-AFC4-6F175D3DCCD1}">
+              <a14:hiddenFill xmlns:a14="http://schemas.microsoft.com/office/drawing/2010/main">
+                <a:solidFill>
+                  <a:schemeClr val="accent1"/>
+                </a:solidFill>
+              </a14:hiddenFill>
+            </a:ext>
+            <a:ext uri="{91240B29-F687-4F45-9708-019B960494DF}">
+              <a14:hiddenLine xmlns:a14="http://schemas.microsoft.com/office/drawing/2010/main" w="9525">
+                <a:solidFill>
+                  <a:schemeClr val="tx1"/>
+                </a:solidFill>
+                <a:miter lim="800000"/>
+                <a:headEnd/>
+                <a:tailEnd/>
+              </a14:hiddenLine>
+            </a:ext>
+            <a:ext uri="{AF507438-7753-43E0-B8FC-AC1667EBCBE1}">
+              <a14:hiddenEffects xmlns:a14="http://schemas.microsoft.com/office/drawing/2010/main">
+                <a:effectLst>
+                  <a:outerShdw dist="35921" dir="2700000" algn="ctr" rotWithShape="0">
+                    <a:schemeClr val="bg2"/>
+                  </a:outerShdw>
+                </a:effectLst>
+              </a14:hiddenEffects>
+            </a:ext>
+          </a:extLst>
+        </p:spPr>
+      </p:pic>
+      <p:pic>
+        <p:nvPicPr>
+          <p:cNvPr id="1029" name="Picture 5"/>
+          <p:cNvPicPr>
+            <a:picLocks noChangeAspect="1" noChangeArrowheads="1"/>
+          </p:cNvPicPr>
+          <p:nvPr/>
+        </p:nvPicPr>
+        <p:blipFill rotWithShape="1">
+          <a:blip r:embed="rId5" cstate="print">
+            <a:extLst>
+              <a:ext uri="{28A0092B-C50C-407E-A947-70E740481C1C}">
+                <a14:useLocalDpi xmlns:a14="http://schemas.microsoft.com/office/drawing/2010/main" val="0"/>
+              </a:ext>
+            </a:extLst>
+          </a:blip>
+          <a:srcRect l="26181" t="16028" r="25519" b="5015"/>
+          <a:stretch/>
+        </p:blipFill>
+        <p:spPr bwMode="auto">
+          <a:xfrm>
+            <a:off x="3311825" y="2544336"/>
+            <a:ext cx="2808313" cy="2582301"/>
+          </a:xfrm>
+          <a:prstGeom prst="rect">
+            <a:avLst/>
+          </a:prstGeom>
+          <a:noFill/>
+          <a:ln>
+            <a:noFill/>
+          </a:ln>
+          <a:effectLst/>
+          <a:extLst>
+            <a:ext uri="{909E8E84-426E-40DD-AFC4-6F175D3DCCD1}">
+              <a14:hiddenFill xmlns:a14="http://schemas.microsoft.com/office/drawing/2010/main">
+                <a:solidFill>
+                  <a:schemeClr val="accent1"/>
+                </a:solidFill>
+              </a14:hiddenFill>
+            </a:ext>
+            <a:ext uri="{91240B29-F687-4F45-9708-019B960494DF}">
+              <a14:hiddenLine xmlns:a14="http://schemas.microsoft.com/office/drawing/2010/main" w="9525">
+                <a:solidFill>
+                  <a:schemeClr val="tx1"/>
+                </a:solidFill>
+                <a:miter lim="800000"/>
+                <a:headEnd/>
+                <a:tailEnd/>
+              </a14:hiddenLine>
+            </a:ext>
+            <a:ext uri="{AF507438-7753-43E0-B8FC-AC1667EBCBE1}">
+              <a14:hiddenEffects xmlns:a14="http://schemas.microsoft.com/office/drawing/2010/main">
+                <a:effectLst>
+                  <a:outerShdw dist="35921" dir="2700000" algn="ctr" rotWithShape="0">
+                    <a:schemeClr val="bg2"/>
+                  </a:outerShdw>
+                </a:effectLst>
+              </a14:hiddenEffects>
+            </a:ext>
+          </a:extLst>
+        </p:spPr>
+      </p:pic>
+      <p:sp>
+        <p:nvSpPr>
+          <p:cNvPr id="6" name="Right Arrow 5"/>
+          <p:cNvSpPr/>
+          <p:nvPr/>
+        </p:nvSpPr>
+        <p:spPr>
+          <a:xfrm>
+            <a:off x="3114374" y="3140968"/>
+            <a:ext cx="651926" cy="144016"/>
+          </a:xfrm>
+          <a:prstGeom prst="rightArrow">
+            <a:avLst/>
+          </a:prstGeom>
+        </p:spPr>
+        <p:style>
+          <a:lnRef idx="2">
+            <a:schemeClr val="accent1">
+              <a:shade val="50000"/>
+            </a:schemeClr>
+          </a:lnRef>
+          <a:fillRef idx="1">
+            <a:schemeClr val="accent1"/>
+          </a:fillRef>
+          <a:effectRef idx="0">
+            <a:schemeClr val="accent1"/>
+          </a:effectRef>
+          <a:fontRef idx="minor">
+            <a:schemeClr val="lt1"/>
+          </a:fontRef>
+        </p:style>
+        <p:txBody>
+          <a:bodyPr rtlCol="0" anchor="ctr"/>
+          <a:lstStyle/>
+          <a:p>
+            <a:pPr algn="ctr"/>
+            <a:endParaRPr lang="en-GB"/>
+          </a:p>
+        </p:txBody>
+      </p:sp>
+      <p:sp>
+        <p:nvSpPr>
+          <p:cNvPr id="11" name="Right Arrow 10"/>
+          <p:cNvSpPr/>
+          <p:nvPr/>
+        </p:nvSpPr>
+        <p:spPr>
+          <a:xfrm>
+            <a:off x="5794175" y="3132257"/>
+            <a:ext cx="651926" cy="144016"/>
+          </a:xfrm>
+          <a:prstGeom prst="rightArrow">
+            <a:avLst/>
+          </a:prstGeom>
+        </p:spPr>
+        <p:style>
+          <a:lnRef idx="2">
+            <a:schemeClr val="accent1">
+              <a:shade val="50000"/>
+            </a:schemeClr>
+          </a:lnRef>
+          <a:fillRef idx="1">
+            <a:schemeClr val="accent1"/>
+          </a:fillRef>
+          <a:effectRef idx="0">
+            <a:schemeClr val="accent1"/>
+          </a:effectRef>
+          <a:fontRef idx="minor">
+            <a:schemeClr val="lt1"/>
+          </a:fontRef>
+        </p:style>
+        <p:txBody>
+          <a:bodyPr rtlCol="0" anchor="ctr"/>
+          <a:lstStyle/>
+          <a:p>
+            <a:pPr algn="ctr"/>
+            <a:endParaRPr lang="en-GB"/>
+          </a:p>
+        </p:txBody>
+      </p:sp>
+      <p:sp>
+        <p:nvSpPr>
+          <p:cNvPr id="7" name="TextBox 6"/>
+          <p:cNvSpPr txBox="1"/>
+          <p:nvPr/>
+        </p:nvSpPr>
+        <p:spPr>
+          <a:xfrm>
+            <a:off x="1115616" y="2348880"/>
+            <a:ext cx="1296144" cy="276999"/>
+          </a:xfrm>
+          <a:prstGeom prst="rect">
+            <a:avLst/>
+          </a:prstGeom>
+          <a:noFill/>
+          <a:ln w="38100">
+            <a:solidFill>
+              <a:srgbClr val="FF0000"/>
+            </a:solidFill>
+            <a:prstDash val="solid"/>
+          </a:ln>
+        </p:spPr>
+        <p:txBody>
+          <a:bodyPr wrap="square" rtlCol="0">
+            <a:spAutoFit/>
+          </a:bodyPr>
+          <a:lstStyle/>
+          <a:p>
+            <a:pPr algn="ctr"/>
+            <a:r>
+              <a:rPr lang="en-GB" sz="1200" dirty="0" smtClean="0">
+                <a:solidFill>
+                  <a:srgbClr val="FF0000"/>
+                </a:solidFill>
+              </a:rPr>
+              <a:t>Full Infection</a:t>
+            </a:r>
+            <a:endParaRPr lang="en-GB" sz="1200" dirty="0">
+              <a:solidFill>
+                <a:srgbClr val="FF0000"/>
+              </a:solidFill>
+            </a:endParaRPr>
+          </a:p>
+        </p:txBody>
+      </p:sp>
+      <p:sp>
+        <p:nvSpPr>
+          <p:cNvPr id="13" name="TextBox 12"/>
+          <p:cNvSpPr txBox="1"/>
+          <p:nvPr/>
+        </p:nvSpPr>
+        <p:spPr>
+          <a:xfrm>
+            <a:off x="4067909" y="2287905"/>
+            <a:ext cx="1296144" cy="276999"/>
+          </a:xfrm>
+          <a:prstGeom prst="rect">
+            <a:avLst/>
+          </a:prstGeom>
+          <a:noFill/>
+          <a:ln w="38100">
+            <a:solidFill>
+              <a:srgbClr val="FFC000"/>
+            </a:solidFill>
+            <a:prstDash val="solid"/>
+          </a:ln>
+        </p:spPr>
+        <p:txBody>
+          <a:bodyPr wrap="square" rtlCol="0">
+            <a:spAutoFit/>
+          </a:bodyPr>
+          <a:lstStyle/>
+          <a:p>
+            <a:pPr algn="ctr"/>
+            <a:r>
+              <a:rPr lang="en-GB" sz="1200" dirty="0" smtClean="0">
+                <a:solidFill>
+                  <a:srgbClr val="FFC000"/>
+                </a:solidFill>
+              </a:rPr>
+              <a:t>Intermediate</a:t>
+            </a:r>
+            <a:endParaRPr lang="en-GB" sz="1200" dirty="0">
+              <a:solidFill>
+                <a:srgbClr val="FFC000"/>
+              </a:solidFill>
+            </a:endParaRPr>
+          </a:p>
+        </p:txBody>
+      </p:sp>
+      <p:sp>
+        <p:nvSpPr>
+          <p:cNvPr id="14" name="TextBox 13"/>
+          <p:cNvSpPr txBox="1"/>
+          <p:nvPr/>
+        </p:nvSpPr>
+        <p:spPr>
+          <a:xfrm>
+            <a:off x="6832319" y="2267337"/>
+            <a:ext cx="1296144" cy="276999"/>
+          </a:xfrm>
+          <a:prstGeom prst="rect">
+            <a:avLst/>
+          </a:prstGeom>
+          <a:noFill/>
+          <a:ln w="38100">
+            <a:solidFill>
+              <a:srgbClr val="00B050"/>
+            </a:solidFill>
+            <a:prstDash val="solid"/>
+          </a:ln>
+        </p:spPr>
+        <p:txBody>
+          <a:bodyPr wrap="square" rtlCol="0">
+            <a:spAutoFit/>
+          </a:bodyPr>
+          <a:lstStyle/>
+          <a:p>
+            <a:pPr algn="ctr"/>
+            <a:r>
+              <a:rPr lang="en-GB" sz="1200" dirty="0" smtClean="0">
+                <a:solidFill>
+                  <a:srgbClr val="00B050"/>
+                </a:solidFill>
+              </a:rPr>
+              <a:t>Suppressed</a:t>
+            </a:r>
+            <a:endParaRPr lang="en-GB" sz="1200" dirty="0">
+              <a:solidFill>
+                <a:srgbClr val="00B050"/>
+              </a:solidFill>
+            </a:endParaRPr>
+          </a:p>
+        </p:txBody>
+      </p:sp>
+      <p:sp>
+        <p:nvSpPr>
+          <p:cNvPr id="8" name="TextBox 7"/>
+          <p:cNvSpPr txBox="1"/>
+          <p:nvPr/>
+        </p:nvSpPr>
+        <p:spPr>
+          <a:xfrm>
+            <a:off x="885737" y="5187583"/>
+            <a:ext cx="2228637" cy="369332"/>
+          </a:xfrm>
+          <a:prstGeom prst="rect">
+            <a:avLst/>
+          </a:prstGeom>
+          <a:noFill/>
+        </p:spPr>
+        <p:txBody>
+          <a:bodyPr wrap="square" rtlCol="0">
+            <a:spAutoFit/>
+          </a:bodyPr>
+          <a:lstStyle/>
+          <a:p>
+            <a:r>
+              <a:rPr lang="en-GB" dirty="0" err="1" smtClean="0"/>
+              <a:t>t</a:t>
+            </a:r>
+            <a:r>
+              <a:rPr lang="en-GB" baseline="-25000" dirty="0" err="1" smtClean="0"/>
+              <a:t>offset</a:t>
+            </a:r>
+            <a:r>
+              <a:rPr lang="en-GB" dirty="0" smtClean="0"/>
+              <a:t> = 6.5 days</a:t>
+            </a:r>
+            <a:endParaRPr lang="en-GB" dirty="0"/>
+          </a:p>
+        </p:txBody>
+      </p:sp>
+      <p:sp>
+        <p:nvSpPr>
+          <p:cNvPr id="16" name="TextBox 15"/>
+          <p:cNvSpPr txBox="1"/>
+          <p:nvPr/>
+        </p:nvSpPr>
+        <p:spPr>
+          <a:xfrm>
+            <a:off x="3582056" y="5187583"/>
+            <a:ext cx="2228637" cy="369332"/>
+          </a:xfrm>
+          <a:prstGeom prst="rect">
+            <a:avLst/>
+          </a:prstGeom>
+          <a:noFill/>
+        </p:spPr>
+        <p:txBody>
+          <a:bodyPr wrap="square" rtlCol="0">
+            <a:spAutoFit/>
+          </a:bodyPr>
+          <a:lstStyle/>
+          <a:p>
+            <a:r>
+              <a:rPr lang="en-GB" dirty="0" err="1" smtClean="0"/>
+              <a:t>t</a:t>
+            </a:r>
+            <a:r>
+              <a:rPr lang="en-GB" baseline="-25000" dirty="0" err="1" smtClean="0"/>
+              <a:t>offset</a:t>
+            </a:r>
+            <a:r>
+              <a:rPr lang="en-GB" dirty="0" smtClean="0"/>
+              <a:t> = 5.1 days</a:t>
+            </a:r>
+            <a:endParaRPr lang="en-GB" dirty="0"/>
+          </a:p>
+        </p:txBody>
+      </p:sp>
+      <p:sp>
+        <p:nvSpPr>
+          <p:cNvPr id="17" name="TextBox 16"/>
+          <p:cNvSpPr txBox="1"/>
+          <p:nvPr/>
+        </p:nvSpPr>
+        <p:spPr>
+          <a:xfrm>
+            <a:off x="6366072" y="5208197"/>
+            <a:ext cx="2228637" cy="369332"/>
+          </a:xfrm>
+          <a:prstGeom prst="rect">
+            <a:avLst/>
+          </a:prstGeom>
+          <a:noFill/>
+        </p:spPr>
+        <p:txBody>
+          <a:bodyPr wrap="square" rtlCol="0">
+            <a:spAutoFit/>
+          </a:bodyPr>
+          <a:lstStyle/>
+          <a:p>
+            <a:r>
+              <a:rPr lang="en-GB" dirty="0" err="1" smtClean="0"/>
+              <a:t>t</a:t>
+            </a:r>
+            <a:r>
+              <a:rPr lang="en-GB" baseline="-25000" dirty="0" err="1" smtClean="0"/>
+              <a:t>offset</a:t>
+            </a:r>
+            <a:r>
+              <a:rPr lang="en-GB" dirty="0" smtClean="0"/>
+              <a:t> = 4.8 days</a:t>
+            </a:r>
+            <a:endParaRPr lang="en-GB" dirty="0"/>
+          </a:p>
+        </p:txBody>
+      </p:sp>
+      <p:sp>
+        <p:nvSpPr>
+          <p:cNvPr id="18" name="TextBox 17"/>
+          <p:cNvSpPr txBox="1"/>
+          <p:nvPr/>
+        </p:nvSpPr>
+        <p:spPr>
+          <a:xfrm>
+            <a:off x="1403648" y="5623947"/>
+            <a:ext cx="6408712" cy="369332"/>
+          </a:xfrm>
+          <a:prstGeom prst="rect">
+            <a:avLst/>
+          </a:prstGeom>
+          <a:noFill/>
+        </p:spPr>
+        <p:txBody>
+          <a:bodyPr wrap="square" rtlCol="0">
+            <a:spAutoFit/>
+          </a:bodyPr>
+          <a:lstStyle/>
+          <a:p>
+            <a:r>
+              <a:rPr lang="en-GB" dirty="0" smtClean="0"/>
+              <a:t>Catch the infection early and it has less time to develop</a:t>
+            </a:r>
+            <a:endParaRPr lang="en-GB" dirty="0"/>
+          </a:p>
+        </p:txBody>
+      </p:sp>
+    </p:spTree>
+    <p:extLst>
+      <p:ext uri="{BB962C8B-B14F-4D97-AF65-F5344CB8AC3E}">
+        <p14:creationId xmlns:p14="http://schemas.microsoft.com/office/powerpoint/2010/main" val="2150972427"/>
       </p:ext>
     </p:extLst>
   </p:cSld>
@@ -8905,68 +11408,7 @@
       </p:grpSpPr>
       <p:sp>
         <p:nvSpPr>
-          <p:cNvPr id="2" name="Content Placeholder 1"/>
-          <p:cNvSpPr>
-            <a:spLocks noGrp="1"/>
-          </p:cNvSpPr>
-          <p:nvPr>
-            <p:ph idx="1"/>
-          </p:nvPr>
-        </p:nvSpPr>
-        <p:spPr>
-          <a:xfrm>
-            <a:off x="395536" y="1484784"/>
-            <a:ext cx="8229600" cy="4525963"/>
-          </a:xfrm>
-        </p:spPr>
-        <p:txBody>
-          <a:bodyPr/>
-          <a:lstStyle/>
-          <a:p>
-            <a:r>
-              <a:rPr lang="en-GB" dirty="0" smtClean="0"/>
-              <a:t>We established two points at which adding stochastic noise would be biologically justified</a:t>
-            </a:r>
-          </a:p>
-          <a:p>
-            <a:r>
-              <a:rPr lang="en-GB" dirty="0" smtClean="0"/>
-              <a:t>Production rates of virus from infected cells</a:t>
-            </a:r>
-          </a:p>
-          <a:p>
-            <a:pPr lvl="1"/>
-            <a:r>
-              <a:rPr lang="en-GB" dirty="0" smtClean="0"/>
-              <a:t>Variation in burst size is known to be significant (Mitchell et al. 2011)</a:t>
-            </a:r>
-          </a:p>
-          <a:p>
-            <a:r>
-              <a:rPr lang="en-GB" dirty="0" smtClean="0"/>
-              <a:t>Affinity Maturation process will be stochastic in nature</a:t>
-            </a:r>
-          </a:p>
-          <a:p>
-            <a:pPr lvl="1"/>
-            <a:r>
-              <a:rPr lang="en-GB" dirty="0" smtClean="0"/>
-              <a:t>Selection of most successful antibody from series of candidates (</a:t>
-            </a:r>
-            <a:r>
-              <a:rPr lang="en-GB" dirty="0" err="1" smtClean="0"/>
-              <a:t>Grimaldi</a:t>
-            </a:r>
-            <a:r>
-              <a:rPr lang="en-GB" dirty="0" smtClean="0"/>
-              <a:t> et al. 2005)</a:t>
-            </a:r>
-          </a:p>
-        </p:txBody>
-      </p:sp>
-      <p:sp>
-        <p:nvSpPr>
-          <p:cNvPr id="3" name="Title 2"/>
+          <p:cNvPr id="5" name="Title 4"/>
           <p:cNvSpPr>
             <a:spLocks noGrp="1"/>
           </p:cNvSpPr>
@@ -8974,11 +11416,37 @@
             <p:ph type="title"/>
           </p:nvPr>
         </p:nvSpPr>
+        <p:spPr>
+          <a:xfrm>
+            <a:off x="722376" y="1059712"/>
+            <a:ext cx="6297896" cy="1828800"/>
+          </a:xfrm>
+        </p:spPr>
+        <p:txBody>
+          <a:bodyPr/>
+          <a:lstStyle/>
+          <a:p>
+            <a:r>
+              <a:rPr lang="en-GB" dirty="0" smtClean="0"/>
+              <a:t>Extensions 1 </a:t>
+            </a:r>
+            <a:endParaRPr lang="en-GB" dirty="0"/>
+          </a:p>
+        </p:txBody>
+      </p:sp>
+      <p:sp>
+        <p:nvSpPr>
+          <p:cNvPr id="6" name="Text Placeholder 5"/>
+          <p:cNvSpPr>
+            <a:spLocks noGrp="1"/>
+          </p:cNvSpPr>
+          <p:nvPr>
+            <p:ph type="body" idx="1"/>
+          </p:nvPr>
+        </p:nvSpPr>
         <p:spPr/>
         <p:txBody>
-          <a:bodyPr>
-            <a:normAutofit/>
-          </a:bodyPr>
+          <a:bodyPr/>
           <a:lstStyle/>
           <a:p>
             <a:r>
@@ -8996,7 +11464,7 @@
             <a:spLocks noGrp="1"/>
           </p:cNvSpPr>
           <p:nvPr>
-            <p:ph type="sldNum" sz="quarter" idx="4"/>
+            <p:ph type="sldNum" sz="quarter" idx="12"/>
           </p:nvPr>
         </p:nvSpPr>
         <p:spPr/>
@@ -9015,7 +11483,7 @@
     </p:spTree>
     <p:extLst>
       <p:ext uri="{BB962C8B-B14F-4D97-AF65-F5344CB8AC3E}">
-        <p14:creationId xmlns:p14="http://schemas.microsoft.com/office/powerpoint/2010/main" val="829547771"/>
+        <p14:creationId xmlns:p14="http://schemas.microsoft.com/office/powerpoint/2010/main" val="2721290192"/>
       </p:ext>
     </p:extLst>
   </p:cSld>
@@ -9059,6 +11527,145 @@
           </a:xfrm>
         </p:spPr>
         <p:txBody>
+          <a:bodyPr/>
+          <a:lstStyle/>
+          <a:p>
+            <a:r>
+              <a:rPr lang="en-GB" dirty="0" smtClean="0"/>
+              <a:t>We established two points at which adding stochastic noise would be biologically justified</a:t>
+            </a:r>
+          </a:p>
+          <a:p>
+            <a:r>
+              <a:rPr lang="en-GB" dirty="0" smtClean="0"/>
+              <a:t>Production rates of virus from infected cells</a:t>
+            </a:r>
+          </a:p>
+          <a:p>
+            <a:pPr lvl="1"/>
+            <a:r>
+              <a:rPr lang="en-GB" dirty="0" smtClean="0"/>
+              <a:t>Variation in burst size is known to be significant (Mitchell et al. 2011)</a:t>
+            </a:r>
+          </a:p>
+          <a:p>
+            <a:r>
+              <a:rPr lang="en-GB" dirty="0" smtClean="0"/>
+              <a:t>Affinity Maturation process will be stochastic in nature</a:t>
+            </a:r>
+          </a:p>
+          <a:p>
+            <a:pPr lvl="1"/>
+            <a:r>
+              <a:rPr lang="en-GB" dirty="0" smtClean="0"/>
+              <a:t>Selection of most successful antibody from series of candidates (</a:t>
+            </a:r>
+            <a:r>
+              <a:rPr lang="en-GB" dirty="0" err="1" smtClean="0"/>
+              <a:t>Grimaldi</a:t>
+            </a:r>
+            <a:r>
+              <a:rPr lang="en-GB" dirty="0" smtClean="0"/>
+              <a:t> et al. 2005)</a:t>
+            </a:r>
+          </a:p>
+        </p:txBody>
+      </p:sp>
+      <p:sp>
+        <p:nvSpPr>
+          <p:cNvPr id="3" name="Title 2"/>
+          <p:cNvSpPr>
+            <a:spLocks noGrp="1"/>
+          </p:cNvSpPr>
+          <p:nvPr>
+            <p:ph type="title"/>
+          </p:nvPr>
+        </p:nvSpPr>
+        <p:spPr/>
+        <p:txBody>
+          <a:bodyPr>
+            <a:normAutofit/>
+          </a:bodyPr>
+          <a:lstStyle/>
+          <a:p>
+            <a:r>
+              <a:rPr lang="en-GB" dirty="0" smtClean="0"/>
+              <a:t>Stochastic modelling</a:t>
+            </a:r>
+            <a:endParaRPr lang="en-GB" dirty="0"/>
+          </a:p>
+        </p:txBody>
+      </p:sp>
+      <p:sp>
+        <p:nvSpPr>
+          <p:cNvPr id="4" name="Slide Number Placeholder 3"/>
+          <p:cNvSpPr>
+            <a:spLocks noGrp="1"/>
+          </p:cNvSpPr>
+          <p:nvPr>
+            <p:ph type="sldNum" sz="quarter" idx="4"/>
+          </p:nvPr>
+        </p:nvSpPr>
+        <p:spPr/>
+        <p:txBody>
+          <a:bodyPr/>
+          <a:lstStyle/>
+          <a:p>
+            <a:fld id="{57E314E1-448B-4E82-884A-39F65482640B}" type="slidenum">
+              <a:rPr lang="en-GB" smtClean="0"/>
+              <a:t>8</a:t>
+            </a:fld>
+            <a:endParaRPr lang="en-GB" dirty="0"/>
+          </a:p>
+        </p:txBody>
+      </p:sp>
+    </p:spTree>
+    <p:extLst>
+      <p:ext uri="{BB962C8B-B14F-4D97-AF65-F5344CB8AC3E}">
+        <p14:creationId xmlns:p14="http://schemas.microsoft.com/office/powerpoint/2010/main" val="829547771"/>
+      </p:ext>
+    </p:extLst>
+  </p:cSld>
+  <p:clrMapOvr>
+    <a:masterClrMapping/>
+  </p:clrMapOvr>
+</p:sld>
+</file>
+
+<file path=ppt/slides/slide9.xml><?xml version="1.0" encoding="utf-8"?>
+<p:sld xmlns:a="http://schemas.openxmlformats.org/drawingml/2006/main" xmlns:r="http://schemas.openxmlformats.org/officeDocument/2006/relationships" xmlns:p="http://schemas.openxmlformats.org/presentationml/2006/main">
+  <p:cSld>
+    <p:spTree>
+      <p:nvGrpSpPr>
+        <p:cNvPr id="1" name=""/>
+        <p:cNvGrpSpPr/>
+        <p:nvPr/>
+      </p:nvGrpSpPr>
+      <p:grpSpPr>
+        <a:xfrm>
+          <a:off x="0" y="0"/>
+          <a:ext cx="0" cy="0"/>
+          <a:chOff x="0" y="0"/>
+          <a:chExt cx="0" cy="0"/>
+        </a:xfrm>
+      </p:grpSpPr>
+      <p:sp>
+        <p:nvSpPr>
+          <p:cNvPr id="2" name="Content Placeholder 1"/>
+          <p:cNvSpPr>
+            <a:spLocks noGrp="1"/>
+          </p:cNvSpPr>
+          <p:nvPr>
+            <p:ph idx="1"/>
+          </p:nvPr>
+        </p:nvSpPr>
+        <p:spPr>
+          <a:xfrm>
+            <a:off x="395536" y="1484784"/>
+            <a:ext cx="8229600" cy="4525963"/>
+          </a:xfrm>
+        </p:spPr>
+        <p:txBody>
           <a:bodyPr>
             <a:normAutofit fontScale="92500" lnSpcReduction="10000"/>
           </a:bodyPr>
@@ -9171,7 +11778,7 @@
           <a:p>
             <a:fld id="{57E314E1-448B-4E82-884A-39F65482640B}" type="slidenum">
               <a:rPr lang="en-GB" smtClean="0"/>
-              <a:t>8</a:t>
+              <a:t>9</a:t>
             </a:fld>
             <a:endParaRPr lang="en-GB" dirty="0"/>
           </a:p>
@@ -9373,245 +11980,6 @@
     <p:extLst>
       <p:ext uri="{BB962C8B-B14F-4D97-AF65-F5344CB8AC3E}">
         <p14:creationId xmlns:p14="http://schemas.microsoft.com/office/powerpoint/2010/main" val="1204785620"/>
-      </p:ext>
-    </p:extLst>
-  </p:cSld>
-  <p:clrMapOvr>
-    <a:masterClrMapping/>
-  </p:clrMapOvr>
-</p:sld>
-</file>
-
-<file path=ppt/slides/slide9.xml><?xml version="1.0" encoding="utf-8"?>
-<p:sld xmlns:a="http://schemas.openxmlformats.org/drawingml/2006/main" xmlns:r="http://schemas.openxmlformats.org/officeDocument/2006/relationships" xmlns:p="http://schemas.openxmlformats.org/presentationml/2006/main">
-  <p:cSld>
-    <p:spTree>
-      <p:nvGrpSpPr>
-        <p:cNvPr id="1" name=""/>
-        <p:cNvGrpSpPr/>
-        <p:nvPr/>
-      </p:nvGrpSpPr>
-      <p:grpSpPr>
-        <a:xfrm>
-          <a:off x="0" y="0"/>
-          <a:ext cx="0" cy="0"/>
-          <a:chOff x="0" y="0"/>
-          <a:chExt cx="0" cy="0"/>
-        </a:xfrm>
-      </p:grpSpPr>
-      <p:sp>
-        <p:nvSpPr>
-          <p:cNvPr id="2" name="Content Placeholder 1"/>
-          <p:cNvSpPr>
-            <a:spLocks noGrp="1"/>
-          </p:cNvSpPr>
-          <p:nvPr>
-            <p:ph idx="1"/>
-          </p:nvPr>
-        </p:nvSpPr>
-        <p:spPr/>
-        <p:txBody>
-          <a:bodyPr/>
-          <a:lstStyle/>
-          <a:p>
-            <a:r>
-              <a:rPr lang="en-GB" dirty="0" smtClean="0"/>
-              <a:t>Alternatively, we can add noise to specific processes</a:t>
-            </a:r>
-          </a:p>
-          <a:p>
-            <a:r>
-              <a:rPr lang="en-GB" dirty="0" smtClean="0"/>
-              <a:t>This demands adding of noise functions within the drift function f(X)</a:t>
-            </a:r>
-          </a:p>
-          <a:p>
-            <a:r>
-              <a:rPr lang="en-GB" dirty="0" smtClean="0"/>
-              <a:t>We can adapt regular ODE solver:</a:t>
-            </a:r>
-            <a:endParaRPr lang="en-GB" dirty="0"/>
-          </a:p>
-        </p:txBody>
-      </p:sp>
-      <p:sp>
-        <p:nvSpPr>
-          <p:cNvPr id="3" name="Title 2"/>
-          <p:cNvSpPr>
-            <a:spLocks noGrp="1"/>
-          </p:cNvSpPr>
-          <p:nvPr>
-            <p:ph type="title"/>
-          </p:nvPr>
-        </p:nvSpPr>
-        <p:spPr/>
-        <p:txBody>
-          <a:bodyPr/>
-          <a:lstStyle/>
-          <a:p>
-            <a:r>
-              <a:rPr lang="en-GB" dirty="0" smtClean="0"/>
-              <a:t>Adding noise to rates</a:t>
-            </a:r>
-            <a:endParaRPr lang="en-GB" dirty="0"/>
-          </a:p>
-        </p:txBody>
-      </p:sp>
-      <p:sp>
-        <p:nvSpPr>
-          <p:cNvPr id="4" name="Slide Number Placeholder 3"/>
-          <p:cNvSpPr>
-            <a:spLocks noGrp="1"/>
-          </p:cNvSpPr>
-          <p:nvPr>
-            <p:ph type="sldNum" sz="quarter" idx="4"/>
-          </p:nvPr>
-        </p:nvSpPr>
-        <p:spPr/>
-        <p:txBody>
-          <a:bodyPr/>
-          <a:lstStyle/>
-          <a:p>
-            <a:fld id="{57E314E1-448B-4E82-884A-39F65482640B}" type="slidenum">
-              <a:rPr lang="en-GB" smtClean="0"/>
-              <a:t>9</a:t>
-            </a:fld>
-            <a:endParaRPr lang="en-GB" dirty="0"/>
-          </a:p>
-        </p:txBody>
-      </p:sp>
-      <p:pic>
-        <p:nvPicPr>
-          <p:cNvPr id="3074" name="Picture 2"/>
-          <p:cNvPicPr>
-            <a:picLocks noChangeAspect="1" noChangeArrowheads="1"/>
-          </p:cNvPicPr>
-          <p:nvPr/>
-        </p:nvPicPr>
-        <p:blipFill>
-          <a:blip r:embed="rId2">
-            <a:extLst>
-              <a:ext uri="{28A0092B-C50C-407E-A947-70E740481C1C}">
-                <a14:useLocalDpi xmlns:a14="http://schemas.microsoft.com/office/drawing/2010/main" val="0"/>
-              </a:ext>
-            </a:extLst>
-          </a:blip>
-          <a:srcRect/>
-          <a:stretch>
-            <a:fillRect/>
-          </a:stretch>
-        </p:blipFill>
-        <p:spPr bwMode="auto">
-          <a:xfrm>
-            <a:off x="1907704" y="3696116"/>
-            <a:ext cx="4905375" cy="581025"/>
-          </a:xfrm>
-          <a:prstGeom prst="rect">
-            <a:avLst/>
-          </a:prstGeom>
-          <a:noFill/>
-          <a:ln>
-            <a:noFill/>
-          </a:ln>
-          <a:effectLst/>
-          <a:extLst>
-            <a:ext uri="{909E8E84-426E-40DD-AFC4-6F175D3DCCD1}">
-              <a14:hiddenFill xmlns:a14="http://schemas.microsoft.com/office/drawing/2010/main">
-                <a:solidFill>
-                  <a:schemeClr val="accent1"/>
-                </a:solidFill>
-              </a14:hiddenFill>
-            </a:ext>
-            <a:ext uri="{91240B29-F687-4F45-9708-019B960494DF}">
-              <a14:hiddenLine xmlns:a14="http://schemas.microsoft.com/office/drawing/2010/main" w="9525">
-                <a:solidFill>
-                  <a:schemeClr val="tx1"/>
-                </a:solidFill>
-                <a:miter lim="800000"/>
-                <a:headEnd/>
-                <a:tailEnd/>
-              </a14:hiddenLine>
-            </a:ext>
-            <a:ext uri="{AF507438-7753-43E0-B8FC-AC1667EBCBE1}">
-              <a14:hiddenEffects xmlns:a14="http://schemas.microsoft.com/office/drawing/2010/main">
-                <a:effectLst>
-                  <a:outerShdw dist="35921" dir="2700000" algn="ctr" rotWithShape="0">
-                    <a:schemeClr val="bg2"/>
-                  </a:outerShdw>
-                </a:effectLst>
-              </a14:hiddenEffects>
-            </a:ext>
-          </a:extLst>
-        </p:spPr>
-      </p:pic>
-      <p:pic>
-        <p:nvPicPr>
-          <p:cNvPr id="3077" name="Picture 5"/>
-          <p:cNvPicPr>
-            <a:picLocks noChangeAspect="1" noChangeArrowheads="1"/>
-          </p:cNvPicPr>
-          <p:nvPr/>
-        </p:nvPicPr>
-        <p:blipFill>
-          <a:blip r:embed="rId3">
-            <a:extLst>
-              <a:ext uri="{28A0092B-C50C-407E-A947-70E740481C1C}">
-                <a14:useLocalDpi xmlns:a14="http://schemas.microsoft.com/office/drawing/2010/main" val="0"/>
-              </a:ext>
-            </a:extLst>
-          </a:blip>
-          <a:srcRect/>
-          <a:stretch>
-            <a:fillRect/>
-          </a:stretch>
-        </p:blipFill>
-        <p:spPr bwMode="auto">
-          <a:xfrm>
-            <a:off x="1337636" y="4437112"/>
-            <a:ext cx="6045509" cy="509294"/>
-          </a:xfrm>
-          <a:prstGeom prst="rect">
-            <a:avLst/>
-          </a:prstGeom>
-          <a:noFill/>
-          <a:ln>
-            <a:noFill/>
-          </a:ln>
-          <a:effectLst/>
-          <a:extLst>
-            <a:ext uri="{909E8E84-426E-40DD-AFC4-6F175D3DCCD1}">
-              <a14:hiddenFill xmlns:a14="http://schemas.microsoft.com/office/drawing/2010/main">
-                <a:solidFill>
-                  <a:schemeClr val="accent1"/>
-                </a:solidFill>
-              </a14:hiddenFill>
-            </a:ext>
-            <a:ext uri="{91240B29-F687-4F45-9708-019B960494DF}">
-              <a14:hiddenLine xmlns:a14="http://schemas.microsoft.com/office/drawing/2010/main" w="9525">
-                <a:solidFill>
-                  <a:schemeClr val="tx1"/>
-                </a:solidFill>
-                <a:miter lim="800000"/>
-                <a:headEnd/>
-                <a:tailEnd/>
-              </a14:hiddenLine>
-            </a:ext>
-            <a:ext uri="{AF507438-7753-43E0-B8FC-AC1667EBCBE1}">
-              <a14:hiddenEffects xmlns:a14="http://schemas.microsoft.com/office/drawing/2010/main">
-                <a:effectLst>
-                  <a:outerShdw dist="35921" dir="2700000" algn="ctr" rotWithShape="0">
-                    <a:schemeClr val="bg2"/>
-                  </a:outerShdw>
-                </a:effectLst>
-              </a14:hiddenEffects>
-            </a:ext>
-          </a:extLst>
-        </p:spPr>
-      </p:pic>
-    </p:spTree>
-    <p:extLst>
-      <p:ext uri="{BB962C8B-B14F-4D97-AF65-F5344CB8AC3E}">
-        <p14:creationId xmlns:p14="http://schemas.microsoft.com/office/powerpoint/2010/main" val="3254139937"/>
       </p:ext>
     </p:extLst>
   </p:cSld>

</xml_diff>

<commit_message>
presentation with my parts and mexSolver edited
1 dangerous '=' sign removed which could cause seg faults
</commit_message>
<xml_diff>
--- a/Presentation.pptx
+++ b/Presentation.pptx
@@ -5,7 +5,7 @@
     <p:sldMasterId id="2147483660" r:id="rId1"/>
   </p:sldMasterIdLst>
   <p:notesMasterIdLst>
-    <p:notesMasterId r:id="rId20"/>
+    <p:notesMasterId r:id="rId21"/>
   </p:notesMasterIdLst>
   <p:sldIdLst>
     <p:sldId id="256" r:id="rId2"/>
@@ -21,11 +21,12 @@
     <p:sldId id="267" r:id="rId12"/>
     <p:sldId id="268" r:id="rId13"/>
     <p:sldId id="269" r:id="rId14"/>
-    <p:sldId id="270" r:id="rId15"/>
-    <p:sldId id="271" r:id="rId16"/>
-    <p:sldId id="272" r:id="rId17"/>
-    <p:sldId id="273" r:id="rId18"/>
-    <p:sldId id="274" r:id="rId19"/>
+    <p:sldId id="276" r:id="rId15"/>
+    <p:sldId id="270" r:id="rId16"/>
+    <p:sldId id="271" r:id="rId17"/>
+    <p:sldId id="272" r:id="rId18"/>
+    <p:sldId id="273" r:id="rId19"/>
+    <p:sldId id="274" r:id="rId20"/>
   </p:sldIdLst>
   <p:sldSz cx="9144000" cy="6858000" type="screen4x3"/>
   <p:notesSz cx="6858000" cy="9144000"/>
@@ -558,7 +559,7 @@
           <a:p>
             <a:fld id="{91F5A2A5-D52E-4CCF-874A-5FF536EA40B7}" type="slidenum">
               <a:rPr lang="en-GB" smtClean="0"/>
-              <a:t>15</a:t>
+              <a:t>16</a:t>
             </a:fld>
             <a:endParaRPr lang="en-GB"/>
           </a:p>
@@ -642,7 +643,7 @@
           <a:p>
             <a:fld id="{91F5A2A5-D52E-4CCF-874A-5FF536EA40B7}" type="slidenum">
               <a:rPr lang="en-GB" smtClean="0"/>
-              <a:t>18</a:t>
+              <a:t>19</a:t>
             </a:fld>
             <a:endParaRPr lang="en-GB"/>
           </a:p>
@@ -7686,9 +7687,376 @@
           <a:chExt cx="0" cy="0"/>
         </a:xfrm>
       </p:grpSpPr>
-      <p:sp>
-        <p:nvSpPr>
-          <p:cNvPr id="5" name="Title 4"/>
+      <p:graphicFrame>
+        <p:nvGraphicFramePr>
+          <p:cNvPr id="5" name="Content Placeholder 4"/>
+          <p:cNvGraphicFramePr>
+            <a:graphicFrameLocks noGrp="1"/>
+          </p:cNvGraphicFramePr>
+          <p:nvPr>
+            <p:ph idx="1"/>
+            <p:extLst>
+              <p:ext uri="{D42A27DB-BD31-4B8C-83A1-F6EECF244321}">
+                <p14:modId xmlns:p14="http://schemas.microsoft.com/office/powerpoint/2010/main" val="1138267634"/>
+              </p:ext>
+            </p:extLst>
+          </p:nvPr>
+        </p:nvGraphicFramePr>
+        <p:xfrm>
+          <a:off x="395536" y="3645024"/>
+          <a:ext cx="8229600" cy="2123440"/>
+        </p:xfrm>
+        <a:graphic>
+          <a:graphicData uri="http://schemas.openxmlformats.org/drawingml/2006/table">
+            <a:tbl>
+              <a:tblPr firstRow="1" bandRow="1">
+                <a:tableStyleId>{5C22544A-7EE6-4342-B048-85BDC9FD1C3A}</a:tableStyleId>
+              </a:tblPr>
+              <a:tblGrid>
+                <a:gridCol w="2057400"/>
+                <a:gridCol w="2057400"/>
+                <a:gridCol w="2057400"/>
+                <a:gridCol w="2057400"/>
+              </a:tblGrid>
+              <a:tr h="370840">
+                <a:tc>
+                  <a:txBody>
+                    <a:bodyPr/>
+                    <a:lstStyle/>
+                    <a:p>
+                      <a:pPr algn="ctr"/>
+                      <a:r>
+                        <a:rPr lang="en-GB" dirty="0" smtClean="0"/>
+                        <a:t># of Iterations</a:t>
+                      </a:r>
+                      <a:endParaRPr lang="en-GB" dirty="0"/>
+                    </a:p>
+                  </a:txBody>
+                  <a:tcPr/>
+                </a:tc>
+                <a:tc>
+                  <a:txBody>
+                    <a:bodyPr/>
+                    <a:lstStyle/>
+                    <a:p>
+                      <a:pPr algn="ctr"/>
+                      <a:r>
+                        <a:rPr lang="en-GB" dirty="0" err="1" smtClean="0"/>
+                        <a:t>Matlab</a:t>
+                      </a:r>
+                      <a:r>
+                        <a:rPr lang="en-GB" dirty="0" smtClean="0"/>
+                        <a:t> Code Runtime (s)</a:t>
+                      </a:r>
+                      <a:endParaRPr lang="en-GB" dirty="0"/>
+                    </a:p>
+                  </a:txBody>
+                  <a:tcPr/>
+                </a:tc>
+                <a:tc>
+                  <a:txBody>
+                    <a:bodyPr/>
+                    <a:lstStyle/>
+                    <a:p>
+                      <a:pPr algn="ctr"/>
+                      <a:r>
+                        <a:rPr lang="en-GB" dirty="0" smtClean="0"/>
+                        <a:t>C</a:t>
+                      </a:r>
+                      <a:r>
+                        <a:rPr lang="en-GB" baseline="0" dirty="0" smtClean="0"/>
+                        <a:t> Code </a:t>
+                      </a:r>
+                    </a:p>
+                    <a:p>
+                      <a:pPr algn="ctr"/>
+                      <a:r>
+                        <a:rPr lang="en-GB" baseline="0" dirty="0" smtClean="0"/>
+                        <a:t>Runtime (s)</a:t>
+                      </a:r>
+                      <a:endParaRPr lang="en-GB" dirty="0"/>
+                    </a:p>
+                  </a:txBody>
+                  <a:tcPr/>
+                </a:tc>
+                <a:tc>
+                  <a:txBody>
+                    <a:bodyPr/>
+                    <a:lstStyle/>
+                    <a:p>
+                      <a:pPr algn="ctr"/>
+                      <a:r>
+                        <a:rPr lang="en-GB" dirty="0" smtClean="0"/>
+                        <a:t>Speedup </a:t>
+                      </a:r>
+                    </a:p>
+                    <a:p>
+                      <a:pPr algn="ctr"/>
+                      <a:r>
+                        <a:rPr lang="en-GB" dirty="0" smtClean="0"/>
+                        <a:t>Factor</a:t>
+                      </a:r>
+                      <a:endParaRPr lang="en-GB" dirty="0"/>
+                    </a:p>
+                  </a:txBody>
+                  <a:tcPr/>
+                </a:tc>
+              </a:tr>
+              <a:tr h="370840">
+                <a:tc>
+                  <a:txBody>
+                    <a:bodyPr/>
+                    <a:lstStyle/>
+                    <a:p>
+                      <a:pPr algn="ctr"/>
+                      <a:r>
+                        <a:rPr lang="en-GB" dirty="0" smtClean="0"/>
+                        <a:t>1000</a:t>
+                      </a:r>
+                      <a:endParaRPr lang="en-GB" dirty="0"/>
+                    </a:p>
+                  </a:txBody>
+                  <a:tcPr/>
+                </a:tc>
+                <a:tc>
+                  <a:txBody>
+                    <a:bodyPr/>
+                    <a:lstStyle/>
+                    <a:p>
+                      <a:pPr algn="ctr"/>
+                      <a:r>
+                        <a:rPr lang="en-GB" dirty="0" smtClean="0"/>
+                        <a:t>0.0016</a:t>
+                      </a:r>
+                      <a:endParaRPr lang="en-GB" dirty="0"/>
+                    </a:p>
+                  </a:txBody>
+                  <a:tcPr/>
+                </a:tc>
+                <a:tc>
+                  <a:txBody>
+                    <a:bodyPr/>
+                    <a:lstStyle/>
+                    <a:p>
+                      <a:pPr algn="ctr"/>
+                      <a:r>
+                        <a:rPr lang="en-GB" dirty="0" smtClean="0"/>
+                        <a:t>0.0516</a:t>
+                      </a:r>
+                      <a:endParaRPr lang="en-GB" dirty="0"/>
+                    </a:p>
+                  </a:txBody>
+                  <a:tcPr/>
+                </a:tc>
+                <a:tc>
+                  <a:txBody>
+                    <a:bodyPr/>
+                    <a:lstStyle/>
+                    <a:p>
+                      <a:pPr algn="ctr"/>
+                      <a:r>
+                        <a:rPr lang="en-GB" dirty="0" smtClean="0"/>
+                        <a:t>32.25</a:t>
+                      </a:r>
+                      <a:endParaRPr lang="en-GB" dirty="0"/>
+                    </a:p>
+                  </a:txBody>
+                  <a:tcPr/>
+                </a:tc>
+              </a:tr>
+              <a:tr h="370840">
+                <a:tc>
+                  <a:txBody>
+                    <a:bodyPr/>
+                    <a:lstStyle/>
+                    <a:p>
+                      <a:pPr algn="ctr"/>
+                      <a:r>
+                        <a:rPr lang="en-GB" dirty="0" smtClean="0"/>
+                        <a:t>3000</a:t>
+                      </a:r>
+                      <a:endParaRPr lang="en-GB" dirty="0"/>
+                    </a:p>
+                  </a:txBody>
+                  <a:tcPr/>
+                </a:tc>
+                <a:tc>
+                  <a:txBody>
+                    <a:bodyPr/>
+                    <a:lstStyle/>
+                    <a:p>
+                      <a:pPr algn="ctr"/>
+                      <a:r>
+                        <a:rPr lang="en-GB" dirty="0" smtClean="0"/>
+                        <a:t>0.0045</a:t>
+                      </a:r>
+                      <a:endParaRPr lang="en-GB" dirty="0"/>
+                    </a:p>
+                  </a:txBody>
+                  <a:tcPr/>
+                </a:tc>
+                <a:tc>
+                  <a:txBody>
+                    <a:bodyPr/>
+                    <a:lstStyle/>
+                    <a:p>
+                      <a:pPr algn="ctr"/>
+                      <a:r>
+                        <a:rPr lang="en-GB" dirty="0" smtClean="0"/>
+                        <a:t>0.1550</a:t>
+                      </a:r>
+                      <a:endParaRPr lang="en-GB" dirty="0"/>
+                    </a:p>
+                  </a:txBody>
+                  <a:tcPr/>
+                </a:tc>
+                <a:tc>
+                  <a:txBody>
+                    <a:bodyPr/>
+                    <a:lstStyle/>
+                    <a:p>
+                      <a:pPr algn="ctr"/>
+                      <a:r>
+                        <a:rPr lang="en-GB" dirty="0" smtClean="0"/>
+                        <a:t>34.44</a:t>
+                      </a:r>
+                      <a:endParaRPr lang="en-GB" dirty="0"/>
+                    </a:p>
+                  </a:txBody>
+                  <a:tcPr/>
+                </a:tc>
+              </a:tr>
+              <a:tr h="370840">
+                <a:tc>
+                  <a:txBody>
+                    <a:bodyPr/>
+                    <a:lstStyle/>
+                    <a:p>
+                      <a:pPr algn="ctr"/>
+                      <a:r>
+                        <a:rPr lang="en-GB" dirty="0" smtClean="0"/>
+                        <a:t>10000</a:t>
+                      </a:r>
+                      <a:endParaRPr lang="en-GB" dirty="0"/>
+                    </a:p>
+                  </a:txBody>
+                  <a:tcPr/>
+                </a:tc>
+                <a:tc>
+                  <a:txBody>
+                    <a:bodyPr/>
+                    <a:lstStyle/>
+                    <a:p>
+                      <a:pPr algn="ctr"/>
+                      <a:r>
+                        <a:rPr lang="en-GB" dirty="0" smtClean="0"/>
+                        <a:t>0.0147</a:t>
+                      </a:r>
+                      <a:endParaRPr lang="en-GB" dirty="0"/>
+                    </a:p>
+                  </a:txBody>
+                  <a:tcPr/>
+                </a:tc>
+                <a:tc>
+                  <a:txBody>
+                    <a:bodyPr/>
+                    <a:lstStyle/>
+                    <a:p>
+                      <a:pPr algn="ctr"/>
+                      <a:r>
+                        <a:rPr lang="en-GB" dirty="0" smtClean="0"/>
+                        <a:t>0.5130</a:t>
+                      </a:r>
+                      <a:endParaRPr lang="en-GB" dirty="0"/>
+                    </a:p>
+                  </a:txBody>
+                  <a:tcPr/>
+                </a:tc>
+                <a:tc>
+                  <a:txBody>
+                    <a:bodyPr/>
+                    <a:lstStyle/>
+                    <a:p>
+                      <a:pPr algn="ctr"/>
+                      <a:r>
+                        <a:rPr lang="en-GB" dirty="0" smtClean="0"/>
+                        <a:t>34.90</a:t>
+                      </a:r>
+                      <a:endParaRPr lang="en-GB" dirty="0"/>
+                    </a:p>
+                  </a:txBody>
+                  <a:tcPr/>
+                </a:tc>
+              </a:tr>
+              <a:tr h="370840">
+                <a:tc>
+                  <a:txBody>
+                    <a:bodyPr/>
+                    <a:lstStyle/>
+                    <a:p>
+                      <a:pPr algn="ctr"/>
+                      <a:r>
+                        <a:rPr lang="en-GB" dirty="0" smtClean="0"/>
+                        <a:t>100000</a:t>
+                      </a:r>
+                      <a:endParaRPr lang="en-GB" dirty="0"/>
+                    </a:p>
+                  </a:txBody>
+                  <a:tcPr/>
+                </a:tc>
+                <a:tc>
+                  <a:txBody>
+                    <a:bodyPr/>
+                    <a:lstStyle/>
+                    <a:p>
+                      <a:pPr algn="ctr"/>
+                      <a:r>
+                        <a:rPr lang="en-GB" dirty="0" smtClean="0"/>
+                        <a:t>0.1480</a:t>
+                      </a:r>
+                      <a:endParaRPr lang="en-GB" dirty="0"/>
+                    </a:p>
+                  </a:txBody>
+                  <a:tcPr/>
+                </a:tc>
+                <a:tc>
+                  <a:txBody>
+                    <a:bodyPr/>
+                    <a:lstStyle/>
+                    <a:p>
+                      <a:pPr algn="ctr"/>
+                      <a:r>
+                        <a:rPr lang="en-GB" dirty="0" smtClean="0"/>
+                        <a:t>5.1298</a:t>
+                      </a:r>
+                      <a:endParaRPr lang="en-GB" dirty="0"/>
+                    </a:p>
+                  </a:txBody>
+                  <a:tcPr/>
+                </a:tc>
+                <a:tc>
+                  <a:txBody>
+                    <a:bodyPr/>
+                    <a:lstStyle/>
+                    <a:p>
+                      <a:pPr algn="ctr"/>
+                      <a:r>
+                        <a:rPr lang="en-GB" dirty="0" smtClean="0"/>
+                        <a:t>34.66</a:t>
+                      </a:r>
+                      <a:endParaRPr lang="en-GB" dirty="0"/>
+                    </a:p>
+                  </a:txBody>
+                  <a:tcPr/>
+                </a:tc>
+              </a:tr>
+            </a:tbl>
+          </a:graphicData>
+        </a:graphic>
+      </p:graphicFrame>
+      <p:sp>
+        <p:nvSpPr>
+          <p:cNvPr id="3" name="Title 2"/>
           <p:cNvSpPr>
             <a:spLocks noGrp="1"/>
           </p:cNvSpPr>
@@ -7696,42 +8064,24 @@
             <p:ph type="title"/>
           </p:nvPr>
         </p:nvSpPr>
-        <p:spPr>
-          <a:xfrm>
-            <a:off x="722376" y="1059712"/>
-            <a:ext cx="6873960" cy="1828800"/>
-          </a:xfrm>
-        </p:spPr>
-        <p:txBody>
-          <a:bodyPr/>
+        <p:spPr/>
+        <p:txBody>
+          <a:bodyPr>
+            <a:normAutofit fontScale="90000"/>
+          </a:bodyPr>
           <a:lstStyle/>
           <a:p>
             <a:r>
               <a:rPr lang="en-GB" dirty="0" smtClean="0"/>
-              <a:t>Extensions 2</a:t>
-            </a:r>
-            <a:endParaRPr lang="en-GB" dirty="0"/>
-          </a:p>
-        </p:txBody>
-      </p:sp>
-      <p:sp>
-        <p:nvSpPr>
-          <p:cNvPr id="6" name="Text Placeholder 5"/>
-          <p:cNvSpPr>
-            <a:spLocks noGrp="1"/>
-          </p:cNvSpPr>
-          <p:nvPr>
-            <p:ph type="body" idx="1"/>
-          </p:nvPr>
-        </p:nvSpPr>
-        <p:spPr/>
-        <p:txBody>
-          <a:bodyPr/>
-          <a:lstStyle/>
-          <a:p>
+              <a:t>C Implementation in </a:t>
+            </a:r>
+            <a:r>
+              <a:rPr lang="en-GB" dirty="0" err="1" smtClean="0"/>
+              <a:t>Mex</a:t>
+            </a:r>
             <a:r>
               <a:rPr lang="en-GB" dirty="0" smtClean="0"/>
-              <a:t>Antiviral Drug Treatment</a:t>
+              <a:t> function</a:t>
             </a:r>
             <a:endParaRPr lang="en-GB" dirty="0"/>
           </a:p>
@@ -7744,7 +8094,7 @@
             <a:spLocks noGrp="1"/>
           </p:cNvSpPr>
           <p:nvPr>
-            <p:ph type="sldNum" sz="quarter" idx="12"/>
+            <p:ph type="sldNum" sz="quarter" idx="4"/>
           </p:nvPr>
         </p:nvSpPr>
         <p:spPr/>
@@ -7760,10 +8110,273 @@
           </a:p>
         </p:txBody>
       </p:sp>
+      <p:sp>
+        <p:nvSpPr>
+          <p:cNvPr id="6" name="Content Placeholder 1"/>
+          <p:cNvSpPr txBox="1">
+            <a:spLocks/>
+          </p:cNvSpPr>
+          <p:nvPr/>
+        </p:nvSpPr>
+        <p:spPr>
+          <a:xfrm>
+            <a:off x="457200" y="1481329"/>
+            <a:ext cx="8229600" cy="1947672"/>
+          </a:xfrm>
+          <a:prstGeom prst="rect">
+            <a:avLst/>
+          </a:prstGeom>
+        </p:spPr>
+        <p:txBody>
+          <a:bodyPr vert="horz">
+            <a:normAutofit/>
+          </a:bodyPr>
+          <a:lstStyle>
+            <a:lvl1pPr marL="365760" indent="-256032" algn="l" rtl="0" eaLnBrk="1" latinLnBrk="0" hangingPunct="1">
+              <a:spcBef>
+                <a:spcPts val="400"/>
+              </a:spcBef>
+              <a:spcAft>
+                <a:spcPts val="0"/>
+              </a:spcAft>
+              <a:buClr>
+                <a:schemeClr val="accent1"/>
+              </a:buClr>
+              <a:buSzPct val="68000"/>
+              <a:buFont typeface="Wingdings 3"/>
+              <a:buChar char=""/>
+              <a:defRPr kumimoji="0" sz="2700" kern="1200">
+                <a:solidFill>
+                  <a:schemeClr val="tx1"/>
+                </a:solidFill>
+                <a:latin typeface="+mn-lt"/>
+                <a:ea typeface="+mn-ea"/>
+                <a:cs typeface="+mn-cs"/>
+              </a:defRPr>
+            </a:lvl1pPr>
+            <a:lvl2pPr marL="621792" indent="-228600" algn="l" rtl="0" eaLnBrk="1" latinLnBrk="0" hangingPunct="1">
+              <a:spcBef>
+                <a:spcPts val="324"/>
+              </a:spcBef>
+              <a:buClr>
+                <a:schemeClr val="accent1"/>
+              </a:buClr>
+              <a:buFont typeface="Verdana"/>
+              <a:buChar char="◦"/>
+              <a:defRPr kumimoji="0" sz="2300" kern="1200">
+                <a:solidFill>
+                  <a:schemeClr val="tx1"/>
+                </a:solidFill>
+                <a:latin typeface="+mn-lt"/>
+                <a:ea typeface="+mn-ea"/>
+                <a:cs typeface="+mn-cs"/>
+              </a:defRPr>
+            </a:lvl2pPr>
+            <a:lvl3pPr marL="859536" indent="-228600" algn="l" rtl="0" eaLnBrk="1" latinLnBrk="0" hangingPunct="1">
+              <a:spcBef>
+                <a:spcPts val="350"/>
+              </a:spcBef>
+              <a:buClr>
+                <a:schemeClr val="accent2"/>
+              </a:buClr>
+              <a:buSzPct val="100000"/>
+              <a:buFont typeface="Wingdings 2"/>
+              <a:buChar char=""/>
+              <a:defRPr kumimoji="0" sz="2100" kern="1200">
+                <a:solidFill>
+                  <a:schemeClr val="tx1"/>
+                </a:solidFill>
+                <a:latin typeface="+mn-lt"/>
+                <a:ea typeface="+mn-ea"/>
+                <a:cs typeface="+mn-cs"/>
+              </a:defRPr>
+            </a:lvl3pPr>
+            <a:lvl4pPr marL="1143000" indent="-228600" algn="l" rtl="0" eaLnBrk="1" latinLnBrk="0" hangingPunct="1">
+              <a:spcBef>
+                <a:spcPts val="350"/>
+              </a:spcBef>
+              <a:buClr>
+                <a:schemeClr val="accent2"/>
+              </a:buClr>
+              <a:buFont typeface="Wingdings 2"/>
+              <a:buChar char=""/>
+              <a:defRPr kumimoji="0" sz="1900" kern="1200">
+                <a:solidFill>
+                  <a:schemeClr val="tx1"/>
+                </a:solidFill>
+                <a:latin typeface="+mn-lt"/>
+                <a:ea typeface="+mn-ea"/>
+                <a:cs typeface="+mn-cs"/>
+              </a:defRPr>
+            </a:lvl4pPr>
+            <a:lvl5pPr marL="1371600" indent="-228600" algn="l" rtl="0" eaLnBrk="1" latinLnBrk="0" hangingPunct="1">
+              <a:spcBef>
+                <a:spcPts val="350"/>
+              </a:spcBef>
+              <a:buClr>
+                <a:schemeClr val="accent2"/>
+              </a:buClr>
+              <a:buFont typeface="Wingdings 2"/>
+              <a:buChar char=""/>
+              <a:defRPr kumimoji="0" sz="1800" kern="1200">
+                <a:solidFill>
+                  <a:schemeClr val="tx1"/>
+                </a:solidFill>
+                <a:latin typeface="+mn-lt"/>
+                <a:ea typeface="+mn-ea"/>
+                <a:cs typeface="+mn-cs"/>
+              </a:defRPr>
+            </a:lvl5pPr>
+            <a:lvl6pPr marL="1600200" indent="-228600" algn="l" rtl="0" eaLnBrk="1" latinLnBrk="0" hangingPunct="1">
+              <a:spcBef>
+                <a:spcPts val="350"/>
+              </a:spcBef>
+              <a:buClr>
+                <a:schemeClr val="accent3"/>
+              </a:buClr>
+              <a:buFont typeface="Wingdings 2"/>
+              <a:buChar char=""/>
+              <a:defRPr kumimoji="0" sz="1800" kern="1200">
+                <a:solidFill>
+                  <a:schemeClr val="tx1"/>
+                </a:solidFill>
+                <a:latin typeface="+mn-lt"/>
+                <a:ea typeface="+mn-ea"/>
+                <a:cs typeface="+mn-cs"/>
+              </a:defRPr>
+            </a:lvl6pPr>
+            <a:lvl7pPr marL="1828800" indent="-228600" algn="l" rtl="0" eaLnBrk="1" latinLnBrk="0" hangingPunct="1">
+              <a:spcBef>
+                <a:spcPts val="350"/>
+              </a:spcBef>
+              <a:buClr>
+                <a:schemeClr val="accent3"/>
+              </a:buClr>
+              <a:buFont typeface="Wingdings 2"/>
+              <a:buChar char=""/>
+              <a:defRPr kumimoji="0" sz="1600" kern="1200">
+                <a:solidFill>
+                  <a:schemeClr val="tx1"/>
+                </a:solidFill>
+                <a:latin typeface="+mn-lt"/>
+                <a:ea typeface="+mn-ea"/>
+                <a:cs typeface="+mn-cs"/>
+              </a:defRPr>
+            </a:lvl7pPr>
+            <a:lvl8pPr marL="2057400" indent="-228600" algn="l" rtl="0" eaLnBrk="1" latinLnBrk="0" hangingPunct="1">
+              <a:spcBef>
+                <a:spcPts val="350"/>
+              </a:spcBef>
+              <a:buClr>
+                <a:schemeClr val="accent3"/>
+              </a:buClr>
+              <a:buFont typeface="Wingdings 2"/>
+              <a:buChar char=""/>
+              <a:defRPr kumimoji="0" sz="1600" kern="1200">
+                <a:solidFill>
+                  <a:schemeClr val="tx1"/>
+                </a:solidFill>
+                <a:latin typeface="+mn-lt"/>
+                <a:ea typeface="+mn-ea"/>
+                <a:cs typeface="+mn-cs"/>
+              </a:defRPr>
+            </a:lvl8pPr>
+            <a:lvl9pPr marL="2286000" indent="-228600" algn="l" rtl="0" eaLnBrk="1" latinLnBrk="0" hangingPunct="1">
+              <a:spcBef>
+                <a:spcPts val="350"/>
+              </a:spcBef>
+              <a:buClr>
+                <a:schemeClr val="accent3"/>
+              </a:buClr>
+              <a:buFont typeface="Wingdings 2"/>
+              <a:buChar char=""/>
+              <a:defRPr kumimoji="0" sz="1600" kern="1200" baseline="0">
+                <a:solidFill>
+                  <a:schemeClr val="tx1"/>
+                </a:solidFill>
+                <a:latin typeface="+mn-lt"/>
+                <a:ea typeface="+mn-ea"/>
+                <a:cs typeface="+mn-cs"/>
+              </a:defRPr>
+            </a:lvl9pPr>
+            <a:extLst/>
+          </a:lstStyle>
+          <a:p>
+            <a:r>
+              <a:rPr lang="en-GB" dirty="0" smtClean="0"/>
+              <a:t>C implementation of the stochastic solver used the Euler-Maruyama method with a Box-Mueller algorithm to generate Gaussian Variables:</a:t>
+            </a:r>
+          </a:p>
+        </p:txBody>
+      </p:sp>
+      <p:pic>
+        <p:nvPicPr>
+          <p:cNvPr id="1026" name="Picture 2"/>
+          <p:cNvPicPr>
+            <a:picLocks noChangeAspect="1" noChangeArrowheads="1"/>
+          </p:cNvPicPr>
+          <p:nvPr/>
+        </p:nvPicPr>
+        <p:blipFill>
+          <a:blip r:embed="rId2">
+            <a:extLst>
+              <a:ext uri="{28A0092B-C50C-407E-A947-70E740481C1C}">
+                <a14:useLocalDpi xmlns:a14="http://schemas.microsoft.com/office/drawing/2010/main" val="0"/>
+              </a:ext>
+            </a:extLst>
+          </a:blip>
+          <a:srcRect/>
+          <a:stretch>
+            <a:fillRect/>
+          </a:stretch>
+        </p:blipFill>
+        <p:spPr bwMode="auto">
+          <a:xfrm>
+            <a:off x="3419872" y="2871604"/>
+            <a:ext cx="3110401" cy="504057"/>
+          </a:xfrm>
+          <a:prstGeom prst="rect">
+            <a:avLst/>
+          </a:prstGeom>
+          <a:noFill/>
+          <a:ln>
+            <a:noFill/>
+          </a:ln>
+          <a:effectLst/>
+          <a:extLst>
+            <a:ext uri="{909E8E84-426E-40DD-AFC4-6F175D3DCCD1}">
+              <a14:hiddenFill xmlns:a14="http://schemas.microsoft.com/office/drawing/2010/main">
+                <a:solidFill>
+                  <a:schemeClr val="accent1"/>
+                </a:solidFill>
+              </a14:hiddenFill>
+            </a:ext>
+            <a:ext uri="{91240B29-F687-4F45-9708-019B960494DF}">
+              <a14:hiddenLine xmlns:a14="http://schemas.microsoft.com/office/drawing/2010/main" w="9525">
+                <a:solidFill>
+                  <a:schemeClr val="tx1"/>
+                </a:solidFill>
+                <a:miter lim="800000"/>
+                <a:headEnd/>
+                <a:tailEnd/>
+              </a14:hiddenLine>
+            </a:ext>
+            <a:ext uri="{AF507438-7753-43E0-B8FC-AC1667EBCBE1}">
+              <a14:hiddenEffects xmlns:a14="http://schemas.microsoft.com/office/drawing/2010/main">
+                <a:effectLst>
+                  <a:outerShdw dist="35921" dir="2700000" algn="ctr" rotWithShape="0">
+                    <a:schemeClr val="bg2"/>
+                  </a:outerShdw>
+                </a:effectLst>
+              </a14:hiddenEffects>
+            </a:ext>
+          </a:extLst>
+        </p:spPr>
+      </p:pic>
     </p:spTree>
     <p:extLst>
       <p:ext uri="{BB962C8B-B14F-4D97-AF65-F5344CB8AC3E}">
-        <p14:creationId xmlns:p14="http://schemas.microsoft.com/office/powerpoint/2010/main" val="3261310763"/>
+        <p14:creationId xmlns:p14="http://schemas.microsoft.com/office/powerpoint/2010/main" val="3198216351"/>
       </p:ext>
     </p:extLst>
   </p:cSld>
@@ -7792,6 +8405,110 @@
       </p:grpSpPr>
       <p:sp>
         <p:nvSpPr>
+          <p:cNvPr id="5" name="Title 4"/>
+          <p:cNvSpPr>
+            <a:spLocks noGrp="1"/>
+          </p:cNvSpPr>
+          <p:nvPr>
+            <p:ph type="title"/>
+          </p:nvPr>
+        </p:nvSpPr>
+        <p:spPr>
+          <a:xfrm>
+            <a:off x="722376" y="1059712"/>
+            <a:ext cx="6873960" cy="1828800"/>
+          </a:xfrm>
+        </p:spPr>
+        <p:txBody>
+          <a:bodyPr/>
+          <a:lstStyle/>
+          <a:p>
+            <a:r>
+              <a:rPr lang="en-GB" dirty="0" smtClean="0"/>
+              <a:t>Extensions 2</a:t>
+            </a:r>
+            <a:endParaRPr lang="en-GB" dirty="0"/>
+          </a:p>
+        </p:txBody>
+      </p:sp>
+      <p:sp>
+        <p:nvSpPr>
+          <p:cNvPr id="6" name="Text Placeholder 5"/>
+          <p:cNvSpPr>
+            <a:spLocks noGrp="1"/>
+          </p:cNvSpPr>
+          <p:nvPr>
+            <p:ph type="body" idx="1"/>
+          </p:nvPr>
+        </p:nvSpPr>
+        <p:spPr/>
+        <p:txBody>
+          <a:bodyPr/>
+          <a:lstStyle/>
+          <a:p>
+            <a:r>
+              <a:rPr lang="en-GB" dirty="0" smtClean="0"/>
+              <a:t>Antiviral Drug Treatment</a:t>
+            </a:r>
+            <a:endParaRPr lang="en-GB" dirty="0"/>
+          </a:p>
+        </p:txBody>
+      </p:sp>
+      <p:sp>
+        <p:nvSpPr>
+          <p:cNvPr id="4" name="Slide Number Placeholder 3"/>
+          <p:cNvSpPr>
+            <a:spLocks noGrp="1"/>
+          </p:cNvSpPr>
+          <p:nvPr>
+            <p:ph type="sldNum" sz="quarter" idx="12"/>
+          </p:nvPr>
+        </p:nvSpPr>
+        <p:spPr/>
+        <p:txBody>
+          <a:bodyPr/>
+          <a:lstStyle/>
+          <a:p>
+            <a:fld id="{57E314E1-448B-4E82-884A-39F65482640B}" type="slidenum">
+              <a:rPr lang="en-GB" smtClean="0"/>
+              <a:t>15</a:t>
+            </a:fld>
+            <a:endParaRPr lang="en-GB" dirty="0"/>
+          </a:p>
+        </p:txBody>
+      </p:sp>
+    </p:spTree>
+    <p:extLst>
+      <p:ext uri="{BB962C8B-B14F-4D97-AF65-F5344CB8AC3E}">
+        <p14:creationId xmlns:p14="http://schemas.microsoft.com/office/powerpoint/2010/main" val="3261310763"/>
+      </p:ext>
+    </p:extLst>
+  </p:cSld>
+  <p:clrMapOvr>
+    <a:masterClrMapping/>
+  </p:clrMapOvr>
+</p:sld>
+</file>
+
+<file path=ppt/slides/slide16.xml><?xml version="1.0" encoding="utf-8"?>
+<p:sld xmlns:a="http://schemas.openxmlformats.org/drawingml/2006/main" xmlns:r="http://schemas.openxmlformats.org/officeDocument/2006/relationships" xmlns:p="http://schemas.openxmlformats.org/presentationml/2006/main">
+  <p:cSld>
+    <p:spTree>
+      <p:nvGrpSpPr>
+        <p:cNvPr id="1" name=""/>
+        <p:cNvGrpSpPr/>
+        <p:nvPr/>
+      </p:nvGrpSpPr>
+      <p:grpSpPr>
+        <a:xfrm>
+          <a:off x="0" y="0"/>
+          <a:ext cx="0" cy="0"/>
+          <a:chOff x="0" y="0"/>
+          <a:chExt cx="0" cy="0"/>
+        </a:xfrm>
+      </p:grpSpPr>
+      <p:sp>
+        <p:nvSpPr>
           <p:cNvPr id="2" name="Content Placeholder 1"/>
           <p:cNvSpPr>
             <a:spLocks noGrp="1"/>
@@ -7926,7 +8643,7 @@
           <a:p>
             <a:fld id="{57E314E1-448B-4E82-884A-39F65482640B}" type="slidenum">
               <a:rPr lang="en-GB" smtClean="0"/>
-              <a:t>15</a:t>
+              <a:t>16</a:t>
             </a:fld>
             <a:endParaRPr lang="en-GB" dirty="0"/>
           </a:p>
@@ -8112,7 +8829,7 @@
 </p:sld>
 </file>
 
-<file path=ppt/slides/slide16.xml><?xml version="1.0" encoding="utf-8"?>
+<file path=ppt/slides/slide17.xml><?xml version="1.0" encoding="utf-8"?>
 <p:sld xmlns:a="http://schemas.openxmlformats.org/drawingml/2006/main" xmlns:r="http://schemas.openxmlformats.org/officeDocument/2006/relationships" xmlns:p="http://schemas.openxmlformats.org/presentationml/2006/main">
   <p:cSld>
     <p:spTree>
@@ -8189,7 +8906,7 @@
           <a:p>
             <a:fld id="{57E314E1-448B-4E82-884A-39F65482640B}" type="slidenum">
               <a:rPr lang="en-GB" smtClean="0"/>
-              <a:t>16</a:t>
+              <a:t>17</a:t>
             </a:fld>
             <a:endParaRPr lang="en-GB" dirty="0"/>
           </a:p>
@@ -8660,7 +9377,7 @@
 </p:sld>
 </file>
 
-<file path=ppt/slides/slide17.xml><?xml version="1.0" encoding="utf-8"?>
+<file path=ppt/slides/slide18.xml><?xml version="1.0" encoding="utf-8"?>
 <p:sld xmlns:a="http://schemas.openxmlformats.org/drawingml/2006/main" xmlns:r="http://schemas.openxmlformats.org/officeDocument/2006/relationships" xmlns:p="http://schemas.openxmlformats.org/presentationml/2006/main">
   <p:cSld>
     <p:spTree>
@@ -8719,7 +9436,7 @@
           <a:p>
             <a:fld id="{57E314E1-448B-4E82-884A-39F65482640B}" type="slidenum">
               <a:rPr lang="en-GB" smtClean="0"/>
-              <a:t>17</a:t>
+              <a:t>18</a:t>
             </a:fld>
             <a:endParaRPr lang="en-GB" dirty="0"/>
           </a:p>
@@ -9141,7 +9858,7 @@
 </p:sld>
 </file>
 
-<file path=ppt/slides/slide18.xml><?xml version="1.0" encoding="utf-8"?>
+<file path=ppt/slides/slide19.xml><?xml version="1.0" encoding="utf-8"?>
 <p:sld xmlns:a="http://schemas.openxmlformats.org/drawingml/2006/main" xmlns:r="http://schemas.openxmlformats.org/officeDocument/2006/relationships" xmlns:p="http://schemas.openxmlformats.org/presentationml/2006/main">
   <p:cSld>
     <p:spTree>
@@ -9198,7 +9915,7 @@
           <a:p>
             <a:fld id="{57E314E1-448B-4E82-884A-39F65482640B}" type="slidenum">
               <a:rPr lang="en-GB" smtClean="0"/>
-              <a:t>18</a:t>
+              <a:t>19</a:t>
             </a:fld>
             <a:endParaRPr lang="en-GB" dirty="0"/>
           </a:p>
@@ -11287,7 +12004,11 @@
             </a:r>
             <a:r>
               <a:rPr lang="en-GB" dirty="0" smtClean="0"/>
-              <a:t> (Owen) and C++ </a:t>
+              <a:t> (Owen) and </a:t>
+            </a:r>
+            <a:r>
+              <a:rPr lang="en-GB" dirty="0" smtClean="0"/>
+              <a:t>C </a:t>
             </a:r>
             <a:r>
               <a:rPr lang="en-GB" dirty="0" err="1" smtClean="0"/>

</xml_diff>